<commit_message>
publisher report prediction. got stats about accuracy of lag-based prediction
Former-commit-id: b0aeee0df9b5763bd71e02ec17eace00c05d365e
</commit_message>
<xml_diff>
--- a/RedShift/PublisherReport/served 1-day prediction using redshift data.pptx
+++ b/RedShift/PublisherReport/served 1-day prediction using redshift data.pptx
@@ -7,11 +7,13 @@
   <p:sldIdLst>
     <p:sldId id="258" r:id="rId2"/>
     <p:sldId id="259" r:id="rId3"/>
-    <p:sldId id="261" r:id="rId4"/>
-    <p:sldId id="262" r:id="rId5"/>
-    <p:sldId id="256" r:id="rId6"/>
-    <p:sldId id="257" r:id="rId7"/>
-    <p:sldId id="260" r:id="rId8"/>
+    <p:sldId id="263" r:id="rId4"/>
+    <p:sldId id="264" r:id="rId5"/>
+    <p:sldId id="261" r:id="rId6"/>
+    <p:sldId id="262" r:id="rId7"/>
+    <p:sldId id="256" r:id="rId8"/>
+    <p:sldId id="257" r:id="rId9"/>
+    <p:sldId id="260" r:id="rId10"/>
   </p:sldIdLst>
   <p:sldSz cx="12192000" cy="6858000"/>
   <p:notesSz cx="6858000" cy="9144000"/>
@@ -249,7 +251,7 @@
           <a:p>
             <a:fld id="{2CD3CBAC-0DE8-4C84-B15C-961A73A0026C}" type="datetimeFigureOut">
               <a:rPr lang="en-US" smtClean="0"/>
-              <a:t>3/20/2016</a:t>
+              <a:t>3/22/2016</a:t>
             </a:fld>
             <a:endParaRPr lang="en-US"/>
           </a:p>
@@ -419,7 +421,7 @@
           <a:p>
             <a:fld id="{2CD3CBAC-0DE8-4C84-B15C-961A73A0026C}" type="datetimeFigureOut">
               <a:rPr lang="en-US" smtClean="0"/>
-              <a:t>3/20/2016</a:t>
+              <a:t>3/22/2016</a:t>
             </a:fld>
             <a:endParaRPr lang="en-US"/>
           </a:p>
@@ -599,7 +601,7 @@
           <a:p>
             <a:fld id="{2CD3CBAC-0DE8-4C84-B15C-961A73A0026C}" type="datetimeFigureOut">
               <a:rPr lang="en-US" smtClean="0"/>
-              <a:t>3/20/2016</a:t>
+              <a:t>3/22/2016</a:t>
             </a:fld>
             <a:endParaRPr lang="en-US"/>
           </a:p>
@@ -769,7 +771,7 @@
           <a:p>
             <a:fld id="{2CD3CBAC-0DE8-4C84-B15C-961A73A0026C}" type="datetimeFigureOut">
               <a:rPr lang="en-US" smtClean="0"/>
-              <a:t>3/20/2016</a:t>
+              <a:t>3/22/2016</a:t>
             </a:fld>
             <a:endParaRPr lang="en-US"/>
           </a:p>
@@ -1015,7 +1017,7 @@
           <a:p>
             <a:fld id="{2CD3CBAC-0DE8-4C84-B15C-961A73A0026C}" type="datetimeFigureOut">
               <a:rPr lang="en-US" smtClean="0"/>
-              <a:t>3/20/2016</a:t>
+              <a:t>3/22/2016</a:t>
             </a:fld>
             <a:endParaRPr lang="en-US"/>
           </a:p>
@@ -1247,7 +1249,7 @@
           <a:p>
             <a:fld id="{2CD3CBAC-0DE8-4C84-B15C-961A73A0026C}" type="datetimeFigureOut">
               <a:rPr lang="en-US" smtClean="0"/>
-              <a:t>3/20/2016</a:t>
+              <a:t>3/22/2016</a:t>
             </a:fld>
             <a:endParaRPr lang="en-US"/>
           </a:p>
@@ -1614,7 +1616,7 @@
           <a:p>
             <a:fld id="{2CD3CBAC-0DE8-4C84-B15C-961A73A0026C}" type="datetimeFigureOut">
               <a:rPr lang="en-US" smtClean="0"/>
-              <a:t>3/20/2016</a:t>
+              <a:t>3/22/2016</a:t>
             </a:fld>
             <a:endParaRPr lang="en-US"/>
           </a:p>
@@ -1732,7 +1734,7 @@
           <a:p>
             <a:fld id="{2CD3CBAC-0DE8-4C84-B15C-961A73A0026C}" type="datetimeFigureOut">
               <a:rPr lang="en-US" smtClean="0"/>
-              <a:t>3/20/2016</a:t>
+              <a:t>3/22/2016</a:t>
             </a:fld>
             <a:endParaRPr lang="en-US"/>
           </a:p>
@@ -1827,7 +1829,7 @@
           <a:p>
             <a:fld id="{2CD3CBAC-0DE8-4C84-B15C-961A73A0026C}" type="datetimeFigureOut">
               <a:rPr lang="en-US" smtClean="0"/>
-              <a:t>3/20/2016</a:t>
+              <a:t>3/22/2016</a:t>
             </a:fld>
             <a:endParaRPr lang="en-US"/>
           </a:p>
@@ -2104,7 +2106,7 @@
           <a:p>
             <a:fld id="{2CD3CBAC-0DE8-4C84-B15C-961A73A0026C}" type="datetimeFigureOut">
               <a:rPr lang="en-US" smtClean="0"/>
-              <a:t>3/20/2016</a:t>
+              <a:t>3/22/2016</a:t>
             </a:fld>
             <a:endParaRPr lang="en-US"/>
           </a:p>
@@ -2357,7 +2359,7 @@
           <a:p>
             <a:fld id="{2CD3CBAC-0DE8-4C84-B15C-961A73A0026C}" type="datetimeFigureOut">
               <a:rPr lang="en-US" smtClean="0"/>
-              <a:t>3/20/2016</a:t>
+              <a:t>3/22/2016</a:t>
             </a:fld>
             <a:endParaRPr lang="en-US"/>
           </a:p>
@@ -2570,7 +2572,7 @@
           <a:p>
             <a:fld id="{2CD3CBAC-0DE8-4C84-B15C-961A73A0026C}" type="datetimeFigureOut">
               <a:rPr lang="en-US" smtClean="0"/>
-              <a:t>3/20/2016</a:t>
+              <a:t>3/22/2016</a:t>
             </a:fld>
             <a:endParaRPr lang="en-US"/>
           </a:p>
@@ -3287,6 +3289,33 @@
       </p:grpSpPr>
       <p:sp>
         <p:nvSpPr>
+          <p:cNvPr id="2" name="Title 1"/>
+          <p:cNvSpPr>
+            <a:spLocks noGrp="1"/>
+          </p:cNvSpPr>
+          <p:nvPr>
+            <p:ph type="title"/>
+          </p:nvPr>
+        </p:nvSpPr>
+        <p:spPr/>
+        <p:txBody>
+          <a:bodyPr/>
+          <a:lstStyle/>
+          <a:p>
+            <a:r>
+              <a:rPr lang="en-US" dirty="0" err="1" smtClean="0"/>
+              <a:t>eCPM</a:t>
+            </a:r>
+            <a:r>
+              <a:rPr lang="en-US" dirty="0" smtClean="0"/>
+              <a:t> prediction</a:t>
+            </a:r>
+            <a:endParaRPr lang="en-US" dirty="0"/>
+          </a:p>
+        </p:txBody>
+      </p:sp>
+      <p:sp>
+        <p:nvSpPr>
           <p:cNvPr id="3" name="Content Placeholder 2"/>
           <p:cNvSpPr>
             <a:spLocks noGrp="1"/>
@@ -3300,473 +3329,74 @@
           <a:bodyPr/>
           <a:lstStyle/>
           <a:p>
-            <a:endParaRPr lang="en-US"/>
-          </a:p>
-        </p:txBody>
-      </p:sp>
-      <p:pic>
-        <p:nvPicPr>
-          <p:cNvPr id="4" name="Picture 3"/>
-          <p:cNvPicPr>
-            <a:picLocks noChangeAspect="1"/>
-          </p:cNvPicPr>
-          <p:nvPr/>
-        </p:nvPicPr>
-        <p:blipFill>
-          <a:blip r:embed="rId2"/>
-          <a:stretch>
-            <a:fillRect/>
-          </a:stretch>
-        </p:blipFill>
-        <p:spPr>
-          <a:xfrm>
-            <a:off x="503495" y="1117088"/>
-            <a:ext cx="10850305" cy="5598145"/>
-          </a:xfrm>
-          <a:prstGeom prst="rect">
-            <a:avLst/>
-          </a:prstGeom>
-        </p:spPr>
-      </p:pic>
-      <p:sp>
-        <p:nvSpPr>
-          <p:cNvPr id="5" name="Oval 4"/>
-          <p:cNvSpPr/>
-          <p:nvPr/>
-        </p:nvSpPr>
-        <p:spPr>
-          <a:xfrm>
-            <a:off x="3441940" y="5663691"/>
-            <a:ext cx="250166" cy="1026544"/>
-          </a:xfrm>
-          <a:prstGeom prst="ellipse">
-            <a:avLst/>
-          </a:prstGeom>
-          <a:noFill/>
-          <a:ln w="38100">
-            <a:solidFill>
-              <a:schemeClr val="accent2">
-                <a:lumMod val="75000"/>
-                <a:alpha val="60000"/>
-              </a:schemeClr>
-            </a:solidFill>
-          </a:ln>
-        </p:spPr>
-        <p:style>
-          <a:lnRef idx="2">
-            <a:schemeClr val="accent1">
-              <a:shade val="50000"/>
-            </a:schemeClr>
-          </a:lnRef>
-          <a:fillRef idx="1">
-            <a:schemeClr val="accent1"/>
-          </a:fillRef>
-          <a:effectRef idx="0">
-            <a:schemeClr val="accent1"/>
-          </a:effectRef>
-          <a:fontRef idx="minor">
-            <a:schemeClr val="lt1"/>
-          </a:fontRef>
-        </p:style>
-        <p:txBody>
-          <a:bodyPr rtlCol="0" anchor="ctr"/>
-          <a:lstStyle/>
-          <a:p>
-            <a:pPr algn="ctr"/>
-            <a:endParaRPr lang="en-US"/>
-          </a:p>
-        </p:txBody>
-      </p:sp>
-      <p:sp>
-        <p:nvSpPr>
-          <p:cNvPr id="6" name="TextBox 5"/>
-          <p:cNvSpPr txBox="1"/>
-          <p:nvPr/>
-        </p:nvSpPr>
-        <p:spPr>
-          <a:xfrm>
-            <a:off x="3006306" y="5017360"/>
-            <a:ext cx="871268" cy="646331"/>
-          </a:xfrm>
-          <a:prstGeom prst="rect">
-            <a:avLst/>
-          </a:prstGeom>
-          <a:noFill/>
-        </p:spPr>
-        <p:txBody>
-          <a:bodyPr wrap="square" rtlCol="0">
-            <a:spAutoFit/>
-          </a:bodyPr>
-          <a:lstStyle/>
-          <a:p>
-            <a:r>
-              <a:rPr lang="en-US" dirty="0" smtClean="0">
-                <a:solidFill>
-                  <a:schemeClr val="accent2">
-                    <a:lumMod val="75000"/>
-                  </a:schemeClr>
-                </a:solidFill>
-              </a:rPr>
-              <a:t>0’s in </a:t>
-            </a:r>
-            <a:r>
-              <a:rPr lang="en-US" dirty="0" err="1" smtClean="0">
-                <a:solidFill>
-                  <a:schemeClr val="accent2">
-                    <a:lumMod val="75000"/>
-                  </a:schemeClr>
-                </a:solidFill>
-              </a:rPr>
-              <a:t>mysql</a:t>
-            </a:r>
-            <a:endParaRPr lang="en-US" dirty="0">
-              <a:solidFill>
-                <a:schemeClr val="accent2">
-                  <a:lumMod val="75000"/>
-                </a:schemeClr>
-              </a:solidFill>
-            </a:endParaRPr>
-          </a:p>
-        </p:txBody>
-      </p:sp>
-      <p:sp>
-        <p:nvSpPr>
-          <p:cNvPr id="9" name="Oval 8"/>
-          <p:cNvSpPr/>
-          <p:nvPr/>
-        </p:nvSpPr>
-        <p:spPr>
-          <a:xfrm>
-            <a:off x="9844311" y="5444552"/>
-            <a:ext cx="250166" cy="1026544"/>
-          </a:xfrm>
-          <a:prstGeom prst="ellipse">
-            <a:avLst/>
-          </a:prstGeom>
-          <a:noFill/>
-          <a:ln w="38100">
-            <a:solidFill>
-              <a:schemeClr val="accent2">
-                <a:lumMod val="75000"/>
-                <a:alpha val="60000"/>
-              </a:schemeClr>
-            </a:solidFill>
-          </a:ln>
-        </p:spPr>
-        <p:style>
-          <a:lnRef idx="2">
-            <a:schemeClr val="accent1">
-              <a:shade val="50000"/>
-            </a:schemeClr>
-          </a:lnRef>
-          <a:fillRef idx="1">
-            <a:schemeClr val="accent1"/>
-          </a:fillRef>
-          <a:effectRef idx="0">
-            <a:schemeClr val="accent1"/>
-          </a:effectRef>
-          <a:fontRef idx="minor">
-            <a:schemeClr val="lt1"/>
-          </a:fontRef>
-        </p:style>
-        <p:txBody>
-          <a:bodyPr rtlCol="0" anchor="ctr"/>
-          <a:lstStyle/>
-          <a:p>
-            <a:pPr algn="ctr"/>
-            <a:endParaRPr lang="en-US"/>
-          </a:p>
-        </p:txBody>
-      </p:sp>
-      <p:sp>
-        <p:nvSpPr>
-          <p:cNvPr id="10" name="TextBox 9"/>
-          <p:cNvSpPr txBox="1"/>
-          <p:nvPr/>
-        </p:nvSpPr>
-        <p:spPr>
-          <a:xfrm>
-            <a:off x="9492671" y="4755654"/>
-            <a:ext cx="951381" cy="646331"/>
-          </a:xfrm>
-          <a:prstGeom prst="rect">
-            <a:avLst/>
-          </a:prstGeom>
-          <a:noFill/>
-        </p:spPr>
-        <p:txBody>
-          <a:bodyPr wrap="square" rtlCol="0">
-            <a:spAutoFit/>
-          </a:bodyPr>
-          <a:lstStyle/>
-          <a:p>
-            <a:r>
-              <a:rPr lang="en-US" dirty="0" smtClean="0">
-                <a:solidFill>
-                  <a:schemeClr val="accent2">
-                    <a:lumMod val="75000"/>
-                  </a:schemeClr>
-                </a:solidFill>
-              </a:rPr>
-              <a:t>0’s in redshift</a:t>
-            </a:r>
-            <a:endParaRPr lang="en-US" dirty="0">
-              <a:solidFill>
-                <a:schemeClr val="accent2">
-                  <a:lumMod val="75000"/>
-                </a:schemeClr>
-              </a:solidFill>
-            </a:endParaRPr>
-          </a:p>
-        </p:txBody>
-      </p:sp>
-      <p:sp>
-        <p:nvSpPr>
-          <p:cNvPr id="11" name="TextBox 10"/>
-          <p:cNvSpPr txBox="1"/>
-          <p:nvPr/>
-        </p:nvSpPr>
-        <p:spPr>
-          <a:xfrm>
-            <a:off x="980388" y="1346826"/>
-            <a:ext cx="1008668" cy="369332"/>
-          </a:xfrm>
-          <a:prstGeom prst="rect">
-            <a:avLst/>
-          </a:prstGeom>
-          <a:noFill/>
-        </p:spPr>
-        <p:txBody>
-          <a:bodyPr wrap="square" rtlCol="0">
-            <a:spAutoFit/>
-          </a:bodyPr>
-          <a:lstStyle/>
-          <a:p>
-            <a:r>
-              <a:rPr lang="en-US" dirty="0" smtClean="0"/>
-              <a:t>OpenX</a:t>
+            <a:r>
+              <a:rPr lang="en-US" dirty="0" err="1" smtClean="0"/>
+              <a:t>eCPM</a:t>
+            </a:r>
+            <a:r>
+              <a:rPr lang="en-US" dirty="0" smtClean="0"/>
+              <a:t> prediction can be obtained in one of the following ways</a:t>
+            </a:r>
+          </a:p>
+          <a:p>
+            <a:pPr lvl="1"/>
+            <a:r>
+              <a:rPr lang="en-US" dirty="0" smtClean="0"/>
+              <a:t>Historical data from same tag</a:t>
+            </a:r>
+          </a:p>
+          <a:p>
+            <a:pPr lvl="1"/>
+            <a:r>
+              <a:rPr lang="en-US" dirty="0" smtClean="0"/>
+              <a:t>Historical data from same placement and network</a:t>
+            </a:r>
+          </a:p>
+          <a:p>
+            <a:pPr lvl="1"/>
+            <a:r>
+              <a:rPr lang="en-US" dirty="0" smtClean="0"/>
+              <a:t>Historical data from same network</a:t>
+            </a:r>
+          </a:p>
+          <a:p>
+            <a:pPr lvl="1"/>
+            <a:r>
+              <a:rPr lang="en-US" dirty="0" smtClean="0"/>
+              <a:t>Based on tag’s network and floor price</a:t>
+            </a:r>
+          </a:p>
+          <a:p>
+            <a:r>
+              <a:rPr lang="en-US" dirty="0" err="1" smtClean="0"/>
+              <a:t>eCPM</a:t>
+            </a:r>
+            <a:r>
+              <a:rPr lang="en-US" dirty="0" smtClean="0"/>
+              <a:t> prediction in current code</a:t>
+            </a:r>
+          </a:p>
+          <a:p>
+            <a:pPr lvl="1"/>
+            <a:r>
+              <a:rPr lang="en-US" dirty="0" smtClean="0"/>
+              <a:t>Based on model per network per order</a:t>
+            </a:r>
+          </a:p>
+          <a:p>
+            <a:pPr lvl="1"/>
+            <a:r>
+              <a:rPr lang="en-US" dirty="0" smtClean="0"/>
+              <a:t>If model is missing, uses tag history, or similar network</a:t>
             </a:r>
             <a:endParaRPr lang="en-US" dirty="0"/>
-          </a:p>
-        </p:txBody>
-      </p:sp>
-      <p:sp>
-        <p:nvSpPr>
-          <p:cNvPr id="12" name="TextBox 11"/>
-          <p:cNvSpPr txBox="1"/>
-          <p:nvPr/>
-        </p:nvSpPr>
-        <p:spPr>
-          <a:xfrm>
-            <a:off x="2501972" y="1371159"/>
-            <a:ext cx="1008668" cy="369332"/>
-          </a:xfrm>
-          <a:prstGeom prst="rect">
-            <a:avLst/>
-          </a:prstGeom>
-          <a:noFill/>
-        </p:spPr>
-        <p:txBody>
-          <a:bodyPr wrap="square" rtlCol="0">
-            <a:spAutoFit/>
-          </a:bodyPr>
-          <a:lstStyle/>
-          <a:p>
-            <a:r>
-              <a:rPr lang="en-US" dirty="0" smtClean="0"/>
-              <a:t>Index</a:t>
-            </a:r>
-            <a:endParaRPr lang="en-US" dirty="0"/>
-          </a:p>
-        </p:txBody>
-      </p:sp>
-      <p:sp>
-        <p:nvSpPr>
-          <p:cNvPr id="13" name="TextBox 12"/>
-          <p:cNvSpPr txBox="1"/>
-          <p:nvPr/>
-        </p:nvSpPr>
-        <p:spPr>
-          <a:xfrm>
-            <a:off x="4034139" y="1371159"/>
-            <a:ext cx="1008668" cy="369332"/>
-          </a:xfrm>
-          <a:prstGeom prst="rect">
-            <a:avLst/>
-          </a:prstGeom>
-          <a:noFill/>
-        </p:spPr>
-        <p:txBody>
-          <a:bodyPr wrap="square" rtlCol="0">
-            <a:spAutoFit/>
-          </a:bodyPr>
-          <a:lstStyle/>
-          <a:p>
-            <a:r>
-              <a:rPr lang="en-US" dirty="0" smtClean="0"/>
-              <a:t>AOL</a:t>
-            </a:r>
-            <a:endParaRPr lang="en-US" dirty="0"/>
-          </a:p>
-        </p:txBody>
-      </p:sp>
-      <p:sp>
-        <p:nvSpPr>
-          <p:cNvPr id="14" name="TextBox 13"/>
-          <p:cNvSpPr txBox="1"/>
-          <p:nvPr/>
-        </p:nvSpPr>
-        <p:spPr>
-          <a:xfrm>
-            <a:off x="5509743" y="1371159"/>
-            <a:ext cx="1126725" cy="369332"/>
-          </a:xfrm>
-          <a:prstGeom prst="rect">
-            <a:avLst/>
-          </a:prstGeom>
-          <a:noFill/>
-        </p:spPr>
-        <p:txBody>
-          <a:bodyPr wrap="square" rtlCol="0">
-            <a:spAutoFit/>
-          </a:bodyPr>
-          <a:lstStyle/>
-          <a:p>
-            <a:r>
-              <a:rPr lang="en-US" dirty="0" err="1" smtClean="0"/>
-              <a:t>Pubmatic</a:t>
-            </a:r>
-            <a:endParaRPr lang="en-US" dirty="0"/>
-          </a:p>
-        </p:txBody>
-      </p:sp>
-      <p:sp>
-        <p:nvSpPr>
-          <p:cNvPr id="15" name="TextBox 14"/>
-          <p:cNvSpPr txBox="1"/>
-          <p:nvPr/>
-        </p:nvSpPr>
-        <p:spPr>
-          <a:xfrm>
-            <a:off x="6843861" y="1371159"/>
-            <a:ext cx="1268212" cy="369332"/>
-          </a:xfrm>
-          <a:prstGeom prst="rect">
-            <a:avLst/>
-          </a:prstGeom>
-          <a:noFill/>
-        </p:spPr>
-        <p:txBody>
-          <a:bodyPr wrap="square" rtlCol="0">
-            <a:spAutoFit/>
-          </a:bodyPr>
-          <a:lstStyle/>
-          <a:p>
-            <a:r>
-              <a:rPr lang="en-US" dirty="0" err="1" smtClean="0"/>
-              <a:t>PulsePoint</a:t>
-            </a:r>
-            <a:endParaRPr lang="en-US" dirty="0"/>
-          </a:p>
-        </p:txBody>
-      </p:sp>
-      <p:sp>
-        <p:nvSpPr>
-          <p:cNvPr id="16" name="TextBox 15"/>
-          <p:cNvSpPr txBox="1"/>
-          <p:nvPr/>
-        </p:nvSpPr>
-        <p:spPr>
-          <a:xfrm>
-            <a:off x="8446778" y="1346826"/>
-            <a:ext cx="1268212" cy="369332"/>
-          </a:xfrm>
-          <a:prstGeom prst="rect">
-            <a:avLst/>
-          </a:prstGeom>
-          <a:noFill/>
-        </p:spPr>
-        <p:txBody>
-          <a:bodyPr wrap="square" rtlCol="0">
-            <a:spAutoFit/>
-          </a:bodyPr>
-          <a:lstStyle/>
-          <a:p>
-            <a:pPr algn="ctr"/>
-            <a:r>
-              <a:rPr lang="en-US" dirty="0" err="1" smtClean="0"/>
-              <a:t>Adx</a:t>
-            </a:r>
-            <a:endParaRPr lang="en-US" dirty="0"/>
-          </a:p>
-        </p:txBody>
-      </p:sp>
-      <p:sp>
-        <p:nvSpPr>
-          <p:cNvPr id="17" name="TextBox 16"/>
-          <p:cNvSpPr txBox="1"/>
-          <p:nvPr/>
-        </p:nvSpPr>
-        <p:spPr>
-          <a:xfrm>
-            <a:off x="9968362" y="1371159"/>
-            <a:ext cx="1268212" cy="369332"/>
-          </a:xfrm>
-          <a:prstGeom prst="rect">
-            <a:avLst/>
-          </a:prstGeom>
-          <a:noFill/>
-        </p:spPr>
-        <p:txBody>
-          <a:bodyPr wrap="square" rtlCol="0">
-            <a:spAutoFit/>
-          </a:bodyPr>
-          <a:lstStyle/>
-          <a:p>
-            <a:r>
-              <a:rPr lang="en-US" dirty="0" err="1" smtClean="0"/>
-              <a:t>Smaato</a:t>
-            </a:r>
-            <a:endParaRPr lang="en-US" dirty="0"/>
-          </a:p>
-        </p:txBody>
-      </p:sp>
-      <p:sp>
-        <p:nvSpPr>
-          <p:cNvPr id="2" name="Title 1"/>
-          <p:cNvSpPr>
-            <a:spLocks noGrp="1"/>
-          </p:cNvSpPr>
-          <p:nvPr>
-            <p:ph type="title"/>
-          </p:nvPr>
-        </p:nvSpPr>
-        <p:spPr>
-          <a:xfrm>
-            <a:off x="838200" y="145793"/>
-            <a:ext cx="10515600" cy="1325563"/>
-          </a:xfrm>
-        </p:spPr>
-        <p:txBody>
-          <a:bodyPr/>
-          <a:lstStyle/>
-          <a:p>
-            <a:r>
-              <a:rPr lang="en-US" dirty="0" smtClean="0"/>
-              <a:t>Deviation per network </a:t>
-            </a:r>
-            <a:r>
-              <a:rPr lang="en-US" sz="2400" dirty="0" smtClean="0"/>
-              <a:t>(count of rows with each deviation between -1 and 1)</a:t>
-            </a:r>
-            <a:endParaRPr lang="en-US" sz="2400" dirty="0"/>
           </a:p>
         </p:txBody>
       </p:sp>
     </p:spTree>
     <p:extLst>
       <p:ext uri="{BB962C8B-B14F-4D97-AF65-F5344CB8AC3E}">
-        <p14:creationId xmlns:p14="http://schemas.microsoft.com/office/powerpoint/2010/main" val="3568551172"/>
+        <p14:creationId xmlns:p14="http://schemas.microsoft.com/office/powerpoint/2010/main" val="3460039066"/>
       </p:ext>
     </p:extLst>
   </p:cSld>
@@ -3817,7 +3447,7 @@
           <a:p>
             <a:r>
               <a:rPr lang="en-US" dirty="0" smtClean="0"/>
-              <a:t>Important notes</a:t>
+              <a:t>Result</a:t>
             </a:r>
             <a:endParaRPr lang="en-US" dirty="0"/>
           </a:p>
@@ -3836,47 +3466,88 @@
         <p:spPr/>
         <p:txBody>
           <a:bodyPr>
-            <a:normAutofit fontScale="92500"/>
+            <a:normAutofit/>
           </a:bodyPr>
           <a:lstStyle/>
           <a:p>
             <a:r>
-              <a:rPr lang="en-US" dirty="0" smtClean="0"/>
-              <a:t>For the dates 3/3 – 5/3, far fewer served events appeared in RS than actual number. This affected almost all placements and networks.  “Representation rate” dropped on these days from around 90% to about 40%. These dates were ignored in the analysis presented in earlier slides.</a:t>
-            </a:r>
-          </a:p>
-          <a:p>
-            <a:r>
-              <a:rPr lang="en-US" dirty="0" smtClean="0"/>
-              <a:t>AOL deviations have a similar pattern (deviation per day) across many placements from several users. This non-random effect should be investigated. See next slide.</a:t>
-            </a:r>
-          </a:p>
-          <a:p>
-            <a:r>
               <a:rPr lang="en-US" dirty="0" err="1" smtClean="0"/>
-              <a:t>Smaato</a:t>
-            </a:r>
-            <a:r>
-              <a:rPr lang="en-US" dirty="0" smtClean="0"/>
-              <a:t> deviation is -98%, i.e. less than 2% of served events are detected.</a:t>
-            </a:r>
-          </a:p>
-          <a:p>
-            <a:r>
-              <a:rPr lang="en-US" dirty="0" err="1" smtClean="0"/>
-              <a:t>MySql</a:t>
-            </a:r>
-            <a:r>
-              <a:rPr lang="en-US" dirty="0" smtClean="0"/>
-              <a:t> data was substantially incomplete for both 13/3 and 14/3 (data was retrieved early afternoon on 15/3).</a:t>
-            </a:r>
+              <a:t>Ecpm</a:t>
+            </a:r>
+            <a:r>
+              <a:rPr lang="en-US" dirty="0" smtClean="0"/>
+              <a:t> prediction based on same tag at same floor price, when available</a:t>
+            </a:r>
+          </a:p>
+          <a:p>
+            <a:r>
+              <a:rPr lang="en-US" dirty="0" smtClean="0"/>
+              <a:t>When not available, model should be based on tag’s floor price with a network-specific coefficient:</a:t>
+            </a:r>
+          </a:p>
+          <a:p>
+            <a:pPr lvl="1"/>
+            <a:r>
+              <a:rPr lang="pt-BR" dirty="0" smtClean="0"/>
+              <a:t>OpenX, 		1.18</a:t>
+            </a:r>
+          </a:p>
+          <a:p>
+            <a:pPr lvl="1"/>
+            <a:r>
+              <a:rPr lang="pt-BR" dirty="0" smtClean="0"/>
+              <a:t>Index, 		1.01</a:t>
+            </a:r>
+            <a:endParaRPr lang="pt-BR" dirty="0"/>
+          </a:p>
+          <a:p>
+            <a:pPr lvl="1"/>
+            <a:r>
+              <a:rPr lang="pt-BR" dirty="0" smtClean="0"/>
+              <a:t>AOL, 	</a:t>
+            </a:r>
+            <a:r>
+              <a:rPr lang="pt-BR" smtClean="0"/>
+              <a:t>	0.90 </a:t>
+            </a:r>
+            <a:endParaRPr lang="pt-BR" dirty="0" smtClean="0"/>
+          </a:p>
+          <a:p>
+            <a:pPr lvl="1"/>
+            <a:r>
+              <a:rPr lang="pt-BR" dirty="0" smtClean="0"/>
+              <a:t>Pubmatic, 	0.99</a:t>
+            </a:r>
+          </a:p>
+          <a:p>
+            <a:pPr lvl="1"/>
+            <a:r>
+              <a:rPr lang="pt-BR" dirty="0" smtClean="0"/>
+              <a:t>PlusePoint, 	1.00</a:t>
+            </a:r>
+          </a:p>
+          <a:p>
+            <a:pPr lvl="1"/>
+            <a:r>
+              <a:rPr lang="pt-BR" dirty="0" smtClean="0"/>
+              <a:t>Adx</a:t>
+            </a:r>
+            <a:r>
+              <a:rPr lang="pt-BR" dirty="0"/>
+              <a:t>, </a:t>
+            </a:r>
+            <a:r>
+              <a:rPr lang="pt-BR" dirty="0" smtClean="0"/>
+              <a:t>		1.11</a:t>
+            </a:r>
+            <a:endParaRPr lang="en-US" dirty="0"/>
           </a:p>
         </p:txBody>
       </p:sp>
     </p:spTree>
     <p:extLst>
       <p:ext uri="{BB962C8B-B14F-4D97-AF65-F5344CB8AC3E}">
-        <p14:creationId xmlns:p14="http://schemas.microsoft.com/office/powerpoint/2010/main" val="1036927113"/>
+        <p14:creationId xmlns:p14="http://schemas.microsoft.com/office/powerpoint/2010/main" val="2288416879"/>
       </p:ext>
     </p:extLst>
   </p:cSld>
@@ -3912,31 +3583,12 @@
       </p:grpSpPr>
       <p:sp>
         <p:nvSpPr>
-          <p:cNvPr id="2" name="Title 1"/>
-          <p:cNvSpPr>
-            <a:spLocks noGrp="1"/>
-          </p:cNvSpPr>
-          <p:nvPr>
-            <p:ph type="ctrTitle"/>
-          </p:nvPr>
-        </p:nvSpPr>
-        <p:spPr/>
-        <p:txBody>
-          <a:bodyPr/>
-          <a:lstStyle/>
-          <a:p>
-            <a:endParaRPr lang="en-US"/>
-          </a:p>
-        </p:txBody>
-      </p:sp>
-      <p:sp>
-        <p:nvSpPr>
-          <p:cNvPr id="3" name="Subtitle 2"/>
-          <p:cNvSpPr>
-            <a:spLocks noGrp="1"/>
-          </p:cNvSpPr>
-          <p:nvPr>
-            <p:ph type="subTitle" idx="1"/>
+          <p:cNvPr id="3" name="Content Placeholder 2"/>
+          <p:cNvSpPr>
+            <a:spLocks noGrp="1"/>
+          </p:cNvSpPr>
+          <p:nvPr>
+            <p:ph idx="1"/>
           </p:nvPr>
         </p:nvSpPr>
         <p:spPr/>
@@ -3950,7 +3602,7 @@
       </p:sp>
       <p:pic>
         <p:nvPicPr>
-          <p:cNvPr id="5" name="Picture 4"/>
+          <p:cNvPr id="4" name="Picture 3"/>
           <p:cNvPicPr>
             <a:picLocks noChangeAspect="1"/>
           </p:cNvPicPr>
@@ -3964,8 +3616,8 @@
         </p:blipFill>
         <p:spPr>
           <a:xfrm>
-            <a:off x="124905" y="574926"/>
-            <a:ext cx="12207874" cy="6377342"/>
+            <a:off x="503495" y="1117088"/>
+            <a:ext cx="10850305" cy="5598145"/>
           </a:xfrm>
           <a:prstGeom prst="rect">
             <a:avLst/>
@@ -3974,52 +3626,25 @@
       </p:pic>
       <p:sp>
         <p:nvSpPr>
-          <p:cNvPr id="4" name="TextBox 3"/>
-          <p:cNvSpPr txBox="1"/>
+          <p:cNvPr id="5" name="Oval 4"/>
+          <p:cNvSpPr/>
           <p:nvPr/>
         </p:nvSpPr>
         <p:spPr>
           <a:xfrm>
-            <a:off x="245098" y="75414"/>
-            <a:ext cx="11946902" cy="646331"/>
-          </a:xfrm>
-          <a:prstGeom prst="rect">
+            <a:off x="3441940" y="5663691"/>
+            <a:ext cx="250166" cy="1026544"/>
+          </a:xfrm>
+          <a:prstGeom prst="ellipse">
             <a:avLst/>
           </a:prstGeom>
           <a:noFill/>
-        </p:spPr>
-        <p:txBody>
-          <a:bodyPr wrap="square" rtlCol="0">
-            <a:spAutoFit/>
-          </a:bodyPr>
-          <a:lstStyle/>
-          <a:p>
-            <a:r>
-              <a:rPr lang="en-US" dirty="0" smtClean="0"/>
-              <a:t>Deviation time-series: tile = placement, color=network. The “bad days” are the dip in the middle of each x-axis. Placements with similar AOL pattern are circled.</a:t>
-            </a:r>
-            <a:endParaRPr lang="en-US" dirty="0"/>
-          </a:p>
-        </p:txBody>
-      </p:sp>
-      <p:sp>
-        <p:nvSpPr>
-          <p:cNvPr id="6" name="Rectangle 5"/>
-          <p:cNvSpPr/>
-          <p:nvPr/>
-        </p:nvSpPr>
-        <p:spPr>
-          <a:xfrm>
-            <a:off x="8663233" y="556181"/>
-            <a:ext cx="829559" cy="566182"/>
-          </a:xfrm>
-          <a:prstGeom prst="rect">
-            <a:avLst/>
-          </a:prstGeom>
-          <a:noFill/>
-          <a:ln w="19050">
+          <a:ln w="38100">
             <a:solidFill>
-              <a:srgbClr val="FF0000"/>
+              <a:schemeClr val="accent2">
+                <a:lumMod val="75000"/>
+                <a:alpha val="60000"/>
+              </a:schemeClr>
             </a:solidFill>
           </a:ln>
         </p:spPr>
@@ -4050,22 +3675,77 @@
       </p:sp>
       <p:sp>
         <p:nvSpPr>
-          <p:cNvPr id="8" name="Rectangle 7"/>
-          <p:cNvSpPr/>
+          <p:cNvPr id="6" name="TextBox 5"/>
+          <p:cNvSpPr txBox="1"/>
           <p:nvPr/>
         </p:nvSpPr>
         <p:spPr>
           <a:xfrm>
-            <a:off x="9494051" y="557836"/>
-            <a:ext cx="829559" cy="566182"/>
+            <a:off x="3006306" y="5017360"/>
+            <a:ext cx="871268" cy="646331"/>
           </a:xfrm>
           <a:prstGeom prst="rect">
             <a:avLst/>
           </a:prstGeom>
           <a:noFill/>
-          <a:ln w="19050">
+        </p:spPr>
+        <p:txBody>
+          <a:bodyPr wrap="square" rtlCol="0">
+            <a:spAutoFit/>
+          </a:bodyPr>
+          <a:lstStyle/>
+          <a:p>
+            <a:r>
+              <a:rPr lang="en-US" dirty="0" smtClean="0">
+                <a:solidFill>
+                  <a:schemeClr val="accent2">
+                    <a:lumMod val="75000"/>
+                  </a:schemeClr>
+                </a:solidFill>
+              </a:rPr>
+              <a:t>0’s in </a:t>
+            </a:r>
+            <a:r>
+              <a:rPr lang="en-US" dirty="0" err="1" smtClean="0">
+                <a:solidFill>
+                  <a:schemeClr val="accent2">
+                    <a:lumMod val="75000"/>
+                  </a:schemeClr>
+                </a:solidFill>
+              </a:rPr>
+              <a:t>mysql</a:t>
+            </a:r>
+            <a:endParaRPr lang="en-US" dirty="0">
+              <a:solidFill>
+                <a:schemeClr val="accent2">
+                  <a:lumMod val="75000"/>
+                </a:schemeClr>
+              </a:solidFill>
+            </a:endParaRPr>
+          </a:p>
+        </p:txBody>
+      </p:sp>
+      <p:sp>
+        <p:nvSpPr>
+          <p:cNvPr id="9" name="Oval 8"/>
+          <p:cNvSpPr/>
+          <p:nvPr/>
+        </p:nvSpPr>
+        <p:spPr>
+          <a:xfrm>
+            <a:off x="9844311" y="5444552"/>
+            <a:ext cx="250166" cy="1026544"/>
+          </a:xfrm>
+          <a:prstGeom prst="ellipse">
+            <a:avLst/>
+          </a:prstGeom>
+          <a:noFill/>
+          <a:ln w="38100">
             <a:solidFill>
-              <a:srgbClr val="FF0000"/>
+              <a:schemeClr val="accent2">
+                <a:lumMod val="75000"/>
+                <a:alpha val="60000"/>
+              </a:schemeClr>
             </a:solidFill>
           </a:ln>
         </p:spPr>
@@ -4096,468 +3776,293 @@
       </p:sp>
       <p:sp>
         <p:nvSpPr>
-          <p:cNvPr id="9" name="Rectangle 8"/>
-          <p:cNvSpPr/>
+          <p:cNvPr id="10" name="TextBox 9"/>
+          <p:cNvSpPr txBox="1"/>
           <p:nvPr/>
         </p:nvSpPr>
         <p:spPr>
           <a:xfrm>
-            <a:off x="9473511" y="1002797"/>
-            <a:ext cx="829559" cy="566182"/>
+            <a:off x="9492671" y="4755654"/>
+            <a:ext cx="951381" cy="646331"/>
           </a:xfrm>
           <a:prstGeom prst="rect">
             <a:avLst/>
           </a:prstGeom>
           <a:noFill/>
-          <a:ln w="19050">
-            <a:solidFill>
-              <a:srgbClr val="FF0000"/>
-            </a:solidFill>
-          </a:ln>
-        </p:spPr>
-        <p:style>
-          <a:lnRef idx="2">
-            <a:schemeClr val="accent1">
-              <a:shade val="50000"/>
-            </a:schemeClr>
-          </a:lnRef>
-          <a:fillRef idx="1">
-            <a:schemeClr val="accent1"/>
-          </a:fillRef>
-          <a:effectRef idx="0">
-            <a:schemeClr val="accent1"/>
-          </a:effectRef>
-          <a:fontRef idx="minor">
-            <a:schemeClr val="lt1"/>
-          </a:fontRef>
-        </p:style>
-        <p:txBody>
-          <a:bodyPr rtlCol="0" anchor="ctr"/>
-          <a:lstStyle/>
-          <a:p>
-            <a:pPr algn="ctr"/>
-            <a:endParaRPr lang="en-US"/>
-          </a:p>
-        </p:txBody>
-      </p:sp>
-      <p:sp>
-        <p:nvSpPr>
-          <p:cNvPr id="10" name="Rectangle 9"/>
-          <p:cNvSpPr/>
+        </p:spPr>
+        <p:txBody>
+          <a:bodyPr wrap="square" rtlCol="0">
+            <a:spAutoFit/>
+          </a:bodyPr>
+          <a:lstStyle/>
+          <a:p>
+            <a:r>
+              <a:rPr lang="en-US" dirty="0" smtClean="0">
+                <a:solidFill>
+                  <a:schemeClr val="accent2">
+                    <a:lumMod val="75000"/>
+                  </a:schemeClr>
+                </a:solidFill>
+              </a:rPr>
+              <a:t>0’s in redshift</a:t>
+            </a:r>
+            <a:endParaRPr lang="en-US" dirty="0">
+              <a:solidFill>
+                <a:schemeClr val="accent2">
+                  <a:lumMod val="75000"/>
+                </a:schemeClr>
+              </a:solidFill>
+            </a:endParaRPr>
+          </a:p>
+        </p:txBody>
+      </p:sp>
+      <p:sp>
+        <p:nvSpPr>
+          <p:cNvPr id="11" name="TextBox 10"/>
+          <p:cNvSpPr txBox="1"/>
           <p:nvPr/>
         </p:nvSpPr>
         <p:spPr>
           <a:xfrm>
-            <a:off x="8653593" y="989475"/>
-            <a:ext cx="829559" cy="566182"/>
+            <a:off x="980388" y="1346826"/>
+            <a:ext cx="1008668" cy="369332"/>
           </a:xfrm>
           <a:prstGeom prst="rect">
             <a:avLst/>
           </a:prstGeom>
           <a:noFill/>
-          <a:ln w="19050">
-            <a:solidFill>
-              <a:srgbClr val="FF0000"/>
-            </a:solidFill>
-          </a:ln>
-        </p:spPr>
-        <p:style>
-          <a:lnRef idx="2">
-            <a:schemeClr val="accent1">
-              <a:shade val="50000"/>
-            </a:schemeClr>
-          </a:lnRef>
-          <a:fillRef idx="1">
-            <a:schemeClr val="accent1"/>
-          </a:fillRef>
-          <a:effectRef idx="0">
-            <a:schemeClr val="accent1"/>
-          </a:effectRef>
-          <a:fontRef idx="minor">
-            <a:schemeClr val="lt1"/>
-          </a:fontRef>
-        </p:style>
-        <p:txBody>
-          <a:bodyPr rtlCol="0" anchor="ctr"/>
-          <a:lstStyle/>
-          <a:p>
-            <a:pPr algn="ctr"/>
-            <a:endParaRPr lang="en-US"/>
-          </a:p>
-        </p:txBody>
-      </p:sp>
-      <p:sp>
-        <p:nvSpPr>
-          <p:cNvPr id="11" name="Rectangle 10"/>
-          <p:cNvSpPr/>
+        </p:spPr>
+        <p:txBody>
+          <a:bodyPr wrap="square" rtlCol="0">
+            <a:spAutoFit/>
+          </a:bodyPr>
+          <a:lstStyle/>
+          <a:p>
+            <a:r>
+              <a:rPr lang="en-US" dirty="0" smtClean="0"/>
+              <a:t>OpenX</a:t>
+            </a:r>
+            <a:endParaRPr lang="en-US" dirty="0"/>
+          </a:p>
+        </p:txBody>
+      </p:sp>
+      <p:sp>
+        <p:nvSpPr>
+          <p:cNvPr id="12" name="TextBox 11"/>
+          <p:cNvSpPr txBox="1"/>
           <p:nvPr/>
         </p:nvSpPr>
         <p:spPr>
           <a:xfrm>
-            <a:off x="7833675" y="976153"/>
-            <a:ext cx="829559" cy="566182"/>
+            <a:off x="2501972" y="1371159"/>
+            <a:ext cx="1008668" cy="369332"/>
           </a:xfrm>
           <a:prstGeom prst="rect">
             <a:avLst/>
           </a:prstGeom>
           <a:noFill/>
-          <a:ln w="19050">
-            <a:solidFill>
-              <a:srgbClr val="FF0000"/>
-            </a:solidFill>
-          </a:ln>
-        </p:spPr>
-        <p:style>
-          <a:lnRef idx="2">
-            <a:schemeClr val="accent1">
-              <a:shade val="50000"/>
-            </a:schemeClr>
-          </a:lnRef>
-          <a:fillRef idx="1">
-            <a:schemeClr val="accent1"/>
-          </a:fillRef>
-          <a:effectRef idx="0">
-            <a:schemeClr val="accent1"/>
-          </a:effectRef>
-          <a:fontRef idx="minor">
-            <a:schemeClr val="lt1"/>
-          </a:fontRef>
-        </p:style>
-        <p:txBody>
-          <a:bodyPr rtlCol="0" anchor="ctr"/>
-          <a:lstStyle/>
-          <a:p>
-            <a:pPr algn="ctr"/>
-            <a:endParaRPr lang="en-US"/>
-          </a:p>
-        </p:txBody>
-      </p:sp>
-      <p:sp>
-        <p:nvSpPr>
-          <p:cNvPr id="12" name="Rectangle 11"/>
-          <p:cNvSpPr/>
+        </p:spPr>
+        <p:txBody>
+          <a:bodyPr wrap="square" rtlCol="0">
+            <a:spAutoFit/>
+          </a:bodyPr>
+          <a:lstStyle/>
+          <a:p>
+            <a:r>
+              <a:rPr lang="en-US" dirty="0" smtClean="0"/>
+              <a:t>Index</a:t>
+            </a:r>
+            <a:endParaRPr lang="en-US" dirty="0"/>
+          </a:p>
+        </p:txBody>
+      </p:sp>
+      <p:sp>
+        <p:nvSpPr>
+          <p:cNvPr id="13" name="TextBox 12"/>
+          <p:cNvSpPr txBox="1"/>
           <p:nvPr/>
         </p:nvSpPr>
         <p:spPr>
           <a:xfrm>
-            <a:off x="7828224" y="542859"/>
-            <a:ext cx="829559" cy="566182"/>
+            <a:off x="4034139" y="1371159"/>
+            <a:ext cx="1008668" cy="369332"/>
           </a:xfrm>
           <a:prstGeom prst="rect">
             <a:avLst/>
           </a:prstGeom>
           <a:noFill/>
-          <a:ln w="19050">
-            <a:solidFill>
-              <a:srgbClr val="FF0000"/>
-            </a:solidFill>
-          </a:ln>
-        </p:spPr>
-        <p:style>
-          <a:lnRef idx="2">
-            <a:schemeClr val="accent1">
-              <a:shade val="50000"/>
-            </a:schemeClr>
-          </a:lnRef>
-          <a:fillRef idx="1">
-            <a:schemeClr val="accent1"/>
-          </a:fillRef>
-          <a:effectRef idx="0">
-            <a:schemeClr val="accent1"/>
-          </a:effectRef>
-          <a:fontRef idx="minor">
-            <a:schemeClr val="lt1"/>
-          </a:fontRef>
-        </p:style>
-        <p:txBody>
-          <a:bodyPr rtlCol="0" anchor="ctr"/>
-          <a:lstStyle/>
-          <a:p>
-            <a:pPr algn="ctr"/>
-            <a:endParaRPr lang="en-US"/>
-          </a:p>
-        </p:txBody>
-      </p:sp>
-      <p:sp>
-        <p:nvSpPr>
-          <p:cNvPr id="13" name="Rectangle 12"/>
-          <p:cNvSpPr/>
+        </p:spPr>
+        <p:txBody>
+          <a:bodyPr wrap="square" rtlCol="0">
+            <a:spAutoFit/>
+          </a:bodyPr>
+          <a:lstStyle/>
+          <a:p>
+            <a:r>
+              <a:rPr lang="en-US" dirty="0" smtClean="0"/>
+              <a:t>AOL</a:t>
+            </a:r>
+            <a:endParaRPr lang="en-US" dirty="0"/>
+          </a:p>
+        </p:txBody>
+      </p:sp>
+      <p:sp>
+        <p:nvSpPr>
+          <p:cNvPr id="14" name="TextBox 13"/>
+          <p:cNvSpPr txBox="1"/>
           <p:nvPr/>
         </p:nvSpPr>
         <p:spPr>
           <a:xfrm>
-            <a:off x="11098711" y="1068639"/>
-            <a:ext cx="829559" cy="566182"/>
+            <a:off x="5509743" y="1371159"/>
+            <a:ext cx="1126725" cy="369332"/>
           </a:xfrm>
           <a:prstGeom prst="rect">
             <a:avLst/>
           </a:prstGeom>
           <a:noFill/>
-          <a:ln w="19050">
-            <a:solidFill>
-              <a:srgbClr val="FF0000"/>
-            </a:solidFill>
-          </a:ln>
-        </p:spPr>
-        <p:style>
-          <a:lnRef idx="2">
-            <a:schemeClr val="accent1">
-              <a:shade val="50000"/>
-            </a:schemeClr>
-          </a:lnRef>
-          <a:fillRef idx="1">
-            <a:schemeClr val="accent1"/>
-          </a:fillRef>
-          <a:effectRef idx="0">
-            <a:schemeClr val="accent1"/>
-          </a:effectRef>
-          <a:fontRef idx="minor">
-            <a:schemeClr val="lt1"/>
-          </a:fontRef>
-        </p:style>
-        <p:txBody>
-          <a:bodyPr rtlCol="0" anchor="ctr"/>
-          <a:lstStyle/>
-          <a:p>
-            <a:pPr algn="ctr"/>
-            <a:endParaRPr lang="en-US"/>
-          </a:p>
-        </p:txBody>
-      </p:sp>
-      <p:sp>
-        <p:nvSpPr>
-          <p:cNvPr id="14" name="Rectangle 13"/>
-          <p:cNvSpPr/>
+        </p:spPr>
+        <p:txBody>
+          <a:bodyPr wrap="square" rtlCol="0">
+            <a:spAutoFit/>
+          </a:bodyPr>
+          <a:lstStyle/>
+          <a:p>
+            <a:r>
+              <a:rPr lang="en-US" dirty="0" err="1" smtClean="0"/>
+              <a:t>Pubmatic</a:t>
+            </a:r>
+            <a:endParaRPr lang="en-US" dirty="0"/>
+          </a:p>
+        </p:txBody>
+      </p:sp>
+      <p:sp>
+        <p:nvSpPr>
+          <p:cNvPr id="15" name="TextBox 14"/>
+          <p:cNvSpPr txBox="1"/>
           <p:nvPr/>
         </p:nvSpPr>
         <p:spPr>
           <a:xfrm>
-            <a:off x="10303070" y="2316163"/>
-            <a:ext cx="829559" cy="566182"/>
+            <a:off x="6843861" y="1371159"/>
+            <a:ext cx="1268212" cy="369332"/>
           </a:xfrm>
           <a:prstGeom prst="rect">
             <a:avLst/>
           </a:prstGeom>
           <a:noFill/>
-          <a:ln w="19050">
-            <a:solidFill>
-              <a:srgbClr val="FF0000"/>
-            </a:solidFill>
-          </a:ln>
-        </p:spPr>
-        <p:style>
-          <a:lnRef idx="2">
-            <a:schemeClr val="accent1">
-              <a:shade val="50000"/>
-            </a:schemeClr>
-          </a:lnRef>
-          <a:fillRef idx="1">
-            <a:schemeClr val="accent1"/>
-          </a:fillRef>
-          <a:effectRef idx="0">
-            <a:schemeClr val="accent1"/>
-          </a:effectRef>
-          <a:fontRef idx="minor">
-            <a:schemeClr val="lt1"/>
-          </a:fontRef>
-        </p:style>
-        <p:txBody>
-          <a:bodyPr rtlCol="0" anchor="ctr"/>
-          <a:lstStyle/>
-          <a:p>
-            <a:pPr algn="ctr"/>
-            <a:endParaRPr lang="en-US"/>
-          </a:p>
-        </p:txBody>
-      </p:sp>
-      <p:sp>
-        <p:nvSpPr>
-          <p:cNvPr id="15" name="Rectangle 14"/>
-          <p:cNvSpPr/>
+        </p:spPr>
+        <p:txBody>
+          <a:bodyPr wrap="square" rtlCol="0">
+            <a:spAutoFit/>
+          </a:bodyPr>
+          <a:lstStyle/>
+          <a:p>
+            <a:r>
+              <a:rPr lang="en-US" dirty="0" err="1" smtClean="0"/>
+              <a:t>PulsePoint</a:t>
+            </a:r>
+            <a:endParaRPr lang="en-US" dirty="0"/>
+          </a:p>
+        </p:txBody>
+      </p:sp>
+      <p:sp>
+        <p:nvSpPr>
+          <p:cNvPr id="16" name="TextBox 15"/>
+          <p:cNvSpPr txBox="1"/>
           <p:nvPr/>
         </p:nvSpPr>
         <p:spPr>
           <a:xfrm>
-            <a:off x="9473510" y="4135926"/>
-            <a:ext cx="829559" cy="566182"/>
+            <a:off x="8446778" y="1346826"/>
+            <a:ext cx="1268212" cy="369332"/>
           </a:xfrm>
           <a:prstGeom prst="rect">
             <a:avLst/>
           </a:prstGeom>
           <a:noFill/>
-          <a:ln w="19050">
-            <a:solidFill>
-              <a:srgbClr val="FF0000"/>
-            </a:solidFill>
-          </a:ln>
-        </p:spPr>
-        <p:style>
-          <a:lnRef idx="2">
-            <a:schemeClr val="accent1">
-              <a:shade val="50000"/>
-            </a:schemeClr>
-          </a:lnRef>
-          <a:fillRef idx="1">
-            <a:schemeClr val="accent1"/>
-          </a:fillRef>
-          <a:effectRef idx="0">
-            <a:schemeClr val="accent1"/>
-          </a:effectRef>
-          <a:fontRef idx="minor">
-            <a:schemeClr val="lt1"/>
-          </a:fontRef>
-        </p:style>
-        <p:txBody>
-          <a:bodyPr rtlCol="0" anchor="ctr"/>
+        </p:spPr>
+        <p:txBody>
+          <a:bodyPr wrap="square" rtlCol="0">
+            <a:spAutoFit/>
+          </a:bodyPr>
           <a:lstStyle/>
           <a:p>
             <a:pPr algn="ctr"/>
-            <a:endParaRPr lang="en-US"/>
-          </a:p>
-        </p:txBody>
-      </p:sp>
-      <p:sp>
-        <p:nvSpPr>
-          <p:cNvPr id="16" name="Rectangle 15"/>
-          <p:cNvSpPr/>
+            <a:r>
+              <a:rPr lang="en-US" dirty="0" err="1" smtClean="0"/>
+              <a:t>Adx</a:t>
+            </a:r>
+            <a:endParaRPr lang="en-US" dirty="0"/>
+          </a:p>
+        </p:txBody>
+      </p:sp>
+      <p:sp>
+        <p:nvSpPr>
+          <p:cNvPr id="17" name="TextBox 16"/>
+          <p:cNvSpPr txBox="1"/>
           <p:nvPr/>
         </p:nvSpPr>
         <p:spPr>
           <a:xfrm>
-            <a:off x="9494051" y="5821943"/>
-            <a:ext cx="829559" cy="566182"/>
+            <a:off x="9968362" y="1371159"/>
+            <a:ext cx="1268212" cy="369332"/>
           </a:xfrm>
           <a:prstGeom prst="rect">
             <a:avLst/>
           </a:prstGeom>
           <a:noFill/>
-          <a:ln w="19050">
-            <a:solidFill>
-              <a:srgbClr val="FF0000"/>
-            </a:solidFill>
-          </a:ln>
-        </p:spPr>
-        <p:style>
-          <a:lnRef idx="2">
-            <a:schemeClr val="accent1">
-              <a:shade val="50000"/>
-            </a:schemeClr>
-          </a:lnRef>
-          <a:fillRef idx="1">
-            <a:schemeClr val="accent1"/>
-          </a:fillRef>
-          <a:effectRef idx="0">
-            <a:schemeClr val="accent1"/>
-          </a:effectRef>
-          <a:fontRef idx="minor">
-            <a:schemeClr val="lt1"/>
-          </a:fontRef>
-        </p:style>
-        <p:txBody>
-          <a:bodyPr rtlCol="0" anchor="ctr"/>
-          <a:lstStyle/>
-          <a:p>
-            <a:pPr algn="ctr"/>
-            <a:endParaRPr lang="en-US"/>
-          </a:p>
-        </p:txBody>
-      </p:sp>
-      <p:sp>
-        <p:nvSpPr>
-          <p:cNvPr id="17" name="Rectangle 16"/>
-          <p:cNvSpPr/>
-          <p:nvPr/>
-        </p:nvSpPr>
-        <p:spPr>
-          <a:xfrm>
-            <a:off x="11098710" y="5914830"/>
-            <a:ext cx="829559" cy="566182"/>
-          </a:xfrm>
-          <a:prstGeom prst="rect">
-            <a:avLst/>
-          </a:prstGeom>
-          <a:noFill/>
-          <a:ln w="19050">
-            <a:solidFill>
-              <a:srgbClr val="FF0000"/>
-            </a:solidFill>
-          </a:ln>
-        </p:spPr>
-        <p:style>
-          <a:lnRef idx="2">
-            <a:schemeClr val="accent1">
-              <a:shade val="50000"/>
-            </a:schemeClr>
-          </a:lnRef>
-          <a:fillRef idx="1">
-            <a:schemeClr val="accent1"/>
-          </a:fillRef>
-          <a:effectRef idx="0">
-            <a:schemeClr val="accent1"/>
-          </a:effectRef>
-          <a:fontRef idx="minor">
-            <a:schemeClr val="lt1"/>
-          </a:fontRef>
-        </p:style>
-        <p:txBody>
-          <a:bodyPr rtlCol="0" anchor="ctr"/>
-          <a:lstStyle/>
-          <a:p>
-            <a:pPr algn="ctr"/>
-            <a:endParaRPr lang="en-US"/>
-          </a:p>
-        </p:txBody>
-      </p:sp>
-      <p:sp>
-        <p:nvSpPr>
-          <p:cNvPr id="18" name="Rectangle 17"/>
-          <p:cNvSpPr/>
-          <p:nvPr/>
-        </p:nvSpPr>
-        <p:spPr>
-          <a:xfrm>
-            <a:off x="1193241" y="2786100"/>
-            <a:ext cx="829559" cy="566182"/>
-          </a:xfrm>
-          <a:prstGeom prst="rect">
-            <a:avLst/>
-          </a:prstGeom>
-          <a:noFill/>
-          <a:ln w="19050">
-            <a:solidFill>
-              <a:srgbClr val="FF0000"/>
-            </a:solidFill>
-          </a:ln>
-        </p:spPr>
-        <p:style>
-          <a:lnRef idx="2">
-            <a:schemeClr val="accent1">
-              <a:shade val="50000"/>
-            </a:schemeClr>
-          </a:lnRef>
-          <a:fillRef idx="1">
-            <a:schemeClr val="accent1"/>
-          </a:fillRef>
-          <a:effectRef idx="0">
-            <a:schemeClr val="accent1"/>
-          </a:effectRef>
-          <a:fontRef idx="minor">
-            <a:schemeClr val="lt1"/>
-          </a:fontRef>
-        </p:style>
-        <p:txBody>
-          <a:bodyPr rtlCol="0" anchor="ctr"/>
-          <a:lstStyle/>
-          <a:p>
-            <a:pPr algn="ctr"/>
-            <a:endParaRPr lang="en-US"/>
+        </p:spPr>
+        <p:txBody>
+          <a:bodyPr wrap="square" rtlCol="0">
+            <a:spAutoFit/>
+          </a:bodyPr>
+          <a:lstStyle/>
+          <a:p>
+            <a:r>
+              <a:rPr lang="en-US" dirty="0" err="1" smtClean="0"/>
+              <a:t>Smaato</a:t>
+            </a:r>
+            <a:endParaRPr lang="en-US" dirty="0"/>
+          </a:p>
+        </p:txBody>
+      </p:sp>
+      <p:sp>
+        <p:nvSpPr>
+          <p:cNvPr id="2" name="Title 1"/>
+          <p:cNvSpPr>
+            <a:spLocks noGrp="1"/>
+          </p:cNvSpPr>
+          <p:nvPr>
+            <p:ph type="title"/>
+          </p:nvPr>
+        </p:nvSpPr>
+        <p:spPr>
+          <a:xfrm>
+            <a:off x="838200" y="145793"/>
+            <a:ext cx="10515600" cy="1325563"/>
+          </a:xfrm>
+        </p:spPr>
+        <p:txBody>
+          <a:bodyPr/>
+          <a:lstStyle/>
+          <a:p>
+            <a:r>
+              <a:rPr lang="en-US" dirty="0" smtClean="0"/>
+              <a:t>Deviation per network </a:t>
+            </a:r>
+            <a:r>
+              <a:rPr lang="en-US" sz="2400" dirty="0" smtClean="0"/>
+              <a:t>(count of rows with each deviation between -1 and 1)</a:t>
+            </a:r>
+            <a:endParaRPr lang="en-US" sz="2400" dirty="0"/>
           </a:p>
         </p:txBody>
       </p:sp>
     </p:spTree>
     <p:extLst>
       <p:ext uri="{BB962C8B-B14F-4D97-AF65-F5344CB8AC3E}">
-        <p14:creationId xmlns:p14="http://schemas.microsoft.com/office/powerpoint/2010/main" val="2679827199"/>
+        <p14:creationId xmlns:p14="http://schemas.microsoft.com/office/powerpoint/2010/main" val="3568551172"/>
       </p:ext>
     </p:extLst>
   </p:cSld>
@@ -4606,6 +4111,797 @@
           <a:bodyPr/>
           <a:lstStyle/>
           <a:p>
+            <a:r>
+              <a:rPr lang="en-US" dirty="0" smtClean="0"/>
+              <a:t>Important notes</a:t>
+            </a:r>
+            <a:endParaRPr lang="en-US" dirty="0"/>
+          </a:p>
+        </p:txBody>
+      </p:sp>
+      <p:sp>
+        <p:nvSpPr>
+          <p:cNvPr id="3" name="Content Placeholder 2"/>
+          <p:cNvSpPr>
+            <a:spLocks noGrp="1"/>
+          </p:cNvSpPr>
+          <p:nvPr>
+            <p:ph idx="1"/>
+          </p:nvPr>
+        </p:nvSpPr>
+        <p:spPr/>
+        <p:txBody>
+          <a:bodyPr>
+            <a:normAutofit fontScale="92500"/>
+          </a:bodyPr>
+          <a:lstStyle/>
+          <a:p>
+            <a:r>
+              <a:rPr lang="en-US" dirty="0" smtClean="0"/>
+              <a:t>For the dates 3/3 – 5/3, far fewer served events appeared in RS than actual number. This affected almost all placements and networks.  “Representation rate” dropped on these days from around 90% to about 40%. These dates were ignored in the analysis presented in earlier slides.</a:t>
+            </a:r>
+          </a:p>
+          <a:p>
+            <a:r>
+              <a:rPr lang="en-US" dirty="0" smtClean="0"/>
+              <a:t>AOL deviations have a similar pattern (deviation per day) across many placements from several users. This non-random effect should be investigated. See next slide.</a:t>
+            </a:r>
+          </a:p>
+          <a:p>
+            <a:r>
+              <a:rPr lang="en-US" dirty="0" err="1" smtClean="0"/>
+              <a:t>Smaato</a:t>
+            </a:r>
+            <a:r>
+              <a:rPr lang="en-US" dirty="0" smtClean="0"/>
+              <a:t> deviation is -98%, i.e. less than 2% of served events are detected.</a:t>
+            </a:r>
+          </a:p>
+          <a:p>
+            <a:r>
+              <a:rPr lang="en-US" dirty="0" err="1" smtClean="0"/>
+              <a:t>MySql</a:t>
+            </a:r>
+            <a:r>
+              <a:rPr lang="en-US" dirty="0" smtClean="0"/>
+              <a:t> data was substantially incomplete for both 13/3 and 14/3 (data was retrieved early afternoon on 15/3).</a:t>
+            </a:r>
+          </a:p>
+        </p:txBody>
+      </p:sp>
+    </p:spTree>
+    <p:extLst>
+      <p:ext uri="{BB962C8B-B14F-4D97-AF65-F5344CB8AC3E}">
+        <p14:creationId xmlns:p14="http://schemas.microsoft.com/office/powerpoint/2010/main" val="1036927113"/>
+      </p:ext>
+    </p:extLst>
+  </p:cSld>
+  <p:clrMapOvr>
+    <a:masterClrMapping/>
+  </p:clrMapOvr>
+  <p:timing>
+    <p:tnLst>
+      <p:par>
+        <p:cTn id="1" dur="indefinite" restart="never" nodeType="tmRoot"/>
+      </p:par>
+    </p:tnLst>
+  </p:timing>
+</p:sld>
+</file>
+
+<file path=ppt/slides/slide7.xml><?xml version="1.0" encoding="utf-8"?>
+<p:sld xmlns:a="http://schemas.openxmlformats.org/drawingml/2006/main" xmlns:r="http://schemas.openxmlformats.org/officeDocument/2006/relationships" xmlns:p="http://schemas.openxmlformats.org/presentationml/2006/main">
+  <p:cSld>
+    <p:spTree>
+      <p:nvGrpSpPr>
+        <p:cNvPr id="1" name=""/>
+        <p:cNvGrpSpPr/>
+        <p:nvPr/>
+      </p:nvGrpSpPr>
+      <p:grpSpPr>
+        <a:xfrm>
+          <a:off x="0" y="0"/>
+          <a:ext cx="0" cy="0"/>
+          <a:chOff x="0" y="0"/>
+          <a:chExt cx="0" cy="0"/>
+        </a:xfrm>
+      </p:grpSpPr>
+      <p:sp>
+        <p:nvSpPr>
+          <p:cNvPr id="2" name="Title 1"/>
+          <p:cNvSpPr>
+            <a:spLocks noGrp="1"/>
+          </p:cNvSpPr>
+          <p:nvPr>
+            <p:ph type="ctrTitle"/>
+          </p:nvPr>
+        </p:nvSpPr>
+        <p:spPr/>
+        <p:txBody>
+          <a:bodyPr/>
+          <a:lstStyle/>
+          <a:p>
+            <a:endParaRPr lang="en-US"/>
+          </a:p>
+        </p:txBody>
+      </p:sp>
+      <p:sp>
+        <p:nvSpPr>
+          <p:cNvPr id="3" name="Subtitle 2"/>
+          <p:cNvSpPr>
+            <a:spLocks noGrp="1"/>
+          </p:cNvSpPr>
+          <p:nvPr>
+            <p:ph type="subTitle" idx="1"/>
+          </p:nvPr>
+        </p:nvSpPr>
+        <p:spPr/>
+        <p:txBody>
+          <a:bodyPr/>
+          <a:lstStyle/>
+          <a:p>
+            <a:endParaRPr lang="en-US"/>
+          </a:p>
+        </p:txBody>
+      </p:sp>
+      <p:pic>
+        <p:nvPicPr>
+          <p:cNvPr id="5" name="Picture 4"/>
+          <p:cNvPicPr>
+            <a:picLocks noChangeAspect="1"/>
+          </p:cNvPicPr>
+          <p:nvPr/>
+        </p:nvPicPr>
+        <p:blipFill>
+          <a:blip r:embed="rId2"/>
+          <a:stretch>
+            <a:fillRect/>
+          </a:stretch>
+        </p:blipFill>
+        <p:spPr>
+          <a:xfrm>
+            <a:off x="124905" y="574926"/>
+            <a:ext cx="12207874" cy="6377342"/>
+          </a:xfrm>
+          <a:prstGeom prst="rect">
+            <a:avLst/>
+          </a:prstGeom>
+        </p:spPr>
+      </p:pic>
+      <p:sp>
+        <p:nvSpPr>
+          <p:cNvPr id="4" name="TextBox 3"/>
+          <p:cNvSpPr txBox="1"/>
+          <p:nvPr/>
+        </p:nvSpPr>
+        <p:spPr>
+          <a:xfrm>
+            <a:off x="245098" y="75414"/>
+            <a:ext cx="11946902" cy="646331"/>
+          </a:xfrm>
+          <a:prstGeom prst="rect">
+            <a:avLst/>
+          </a:prstGeom>
+          <a:noFill/>
+        </p:spPr>
+        <p:txBody>
+          <a:bodyPr wrap="square" rtlCol="0">
+            <a:spAutoFit/>
+          </a:bodyPr>
+          <a:lstStyle/>
+          <a:p>
+            <a:r>
+              <a:rPr lang="en-US" dirty="0" smtClean="0"/>
+              <a:t>Deviation time-series: tile = placement, color=network. The “bad days” are the dip in the middle of each x-axis. Placements with similar AOL pattern are circled.</a:t>
+            </a:r>
+            <a:endParaRPr lang="en-US" dirty="0"/>
+          </a:p>
+        </p:txBody>
+      </p:sp>
+      <p:sp>
+        <p:nvSpPr>
+          <p:cNvPr id="6" name="Rectangle 5"/>
+          <p:cNvSpPr/>
+          <p:nvPr/>
+        </p:nvSpPr>
+        <p:spPr>
+          <a:xfrm>
+            <a:off x="8663233" y="556181"/>
+            <a:ext cx="829559" cy="566182"/>
+          </a:xfrm>
+          <a:prstGeom prst="rect">
+            <a:avLst/>
+          </a:prstGeom>
+          <a:noFill/>
+          <a:ln w="19050">
+            <a:solidFill>
+              <a:srgbClr val="FF0000"/>
+            </a:solidFill>
+          </a:ln>
+        </p:spPr>
+        <p:style>
+          <a:lnRef idx="2">
+            <a:schemeClr val="accent1">
+              <a:shade val="50000"/>
+            </a:schemeClr>
+          </a:lnRef>
+          <a:fillRef idx="1">
+            <a:schemeClr val="accent1"/>
+          </a:fillRef>
+          <a:effectRef idx="0">
+            <a:schemeClr val="accent1"/>
+          </a:effectRef>
+          <a:fontRef idx="minor">
+            <a:schemeClr val="lt1"/>
+          </a:fontRef>
+        </p:style>
+        <p:txBody>
+          <a:bodyPr rtlCol="0" anchor="ctr"/>
+          <a:lstStyle/>
+          <a:p>
+            <a:pPr algn="ctr"/>
+            <a:endParaRPr lang="en-US"/>
+          </a:p>
+        </p:txBody>
+      </p:sp>
+      <p:sp>
+        <p:nvSpPr>
+          <p:cNvPr id="8" name="Rectangle 7"/>
+          <p:cNvSpPr/>
+          <p:nvPr/>
+        </p:nvSpPr>
+        <p:spPr>
+          <a:xfrm>
+            <a:off x="9494051" y="557836"/>
+            <a:ext cx="829559" cy="566182"/>
+          </a:xfrm>
+          <a:prstGeom prst="rect">
+            <a:avLst/>
+          </a:prstGeom>
+          <a:noFill/>
+          <a:ln w="19050">
+            <a:solidFill>
+              <a:srgbClr val="FF0000"/>
+            </a:solidFill>
+          </a:ln>
+        </p:spPr>
+        <p:style>
+          <a:lnRef idx="2">
+            <a:schemeClr val="accent1">
+              <a:shade val="50000"/>
+            </a:schemeClr>
+          </a:lnRef>
+          <a:fillRef idx="1">
+            <a:schemeClr val="accent1"/>
+          </a:fillRef>
+          <a:effectRef idx="0">
+            <a:schemeClr val="accent1"/>
+          </a:effectRef>
+          <a:fontRef idx="minor">
+            <a:schemeClr val="lt1"/>
+          </a:fontRef>
+        </p:style>
+        <p:txBody>
+          <a:bodyPr rtlCol="0" anchor="ctr"/>
+          <a:lstStyle/>
+          <a:p>
+            <a:pPr algn="ctr"/>
+            <a:endParaRPr lang="en-US"/>
+          </a:p>
+        </p:txBody>
+      </p:sp>
+      <p:sp>
+        <p:nvSpPr>
+          <p:cNvPr id="9" name="Rectangle 8"/>
+          <p:cNvSpPr/>
+          <p:nvPr/>
+        </p:nvSpPr>
+        <p:spPr>
+          <a:xfrm>
+            <a:off x="9473511" y="1002797"/>
+            <a:ext cx="829559" cy="566182"/>
+          </a:xfrm>
+          <a:prstGeom prst="rect">
+            <a:avLst/>
+          </a:prstGeom>
+          <a:noFill/>
+          <a:ln w="19050">
+            <a:solidFill>
+              <a:srgbClr val="FF0000"/>
+            </a:solidFill>
+          </a:ln>
+        </p:spPr>
+        <p:style>
+          <a:lnRef idx="2">
+            <a:schemeClr val="accent1">
+              <a:shade val="50000"/>
+            </a:schemeClr>
+          </a:lnRef>
+          <a:fillRef idx="1">
+            <a:schemeClr val="accent1"/>
+          </a:fillRef>
+          <a:effectRef idx="0">
+            <a:schemeClr val="accent1"/>
+          </a:effectRef>
+          <a:fontRef idx="minor">
+            <a:schemeClr val="lt1"/>
+          </a:fontRef>
+        </p:style>
+        <p:txBody>
+          <a:bodyPr rtlCol="0" anchor="ctr"/>
+          <a:lstStyle/>
+          <a:p>
+            <a:pPr algn="ctr"/>
+            <a:endParaRPr lang="en-US"/>
+          </a:p>
+        </p:txBody>
+      </p:sp>
+      <p:sp>
+        <p:nvSpPr>
+          <p:cNvPr id="10" name="Rectangle 9"/>
+          <p:cNvSpPr/>
+          <p:nvPr/>
+        </p:nvSpPr>
+        <p:spPr>
+          <a:xfrm>
+            <a:off x="8653593" y="989475"/>
+            <a:ext cx="829559" cy="566182"/>
+          </a:xfrm>
+          <a:prstGeom prst="rect">
+            <a:avLst/>
+          </a:prstGeom>
+          <a:noFill/>
+          <a:ln w="19050">
+            <a:solidFill>
+              <a:srgbClr val="FF0000"/>
+            </a:solidFill>
+          </a:ln>
+        </p:spPr>
+        <p:style>
+          <a:lnRef idx="2">
+            <a:schemeClr val="accent1">
+              <a:shade val="50000"/>
+            </a:schemeClr>
+          </a:lnRef>
+          <a:fillRef idx="1">
+            <a:schemeClr val="accent1"/>
+          </a:fillRef>
+          <a:effectRef idx="0">
+            <a:schemeClr val="accent1"/>
+          </a:effectRef>
+          <a:fontRef idx="minor">
+            <a:schemeClr val="lt1"/>
+          </a:fontRef>
+        </p:style>
+        <p:txBody>
+          <a:bodyPr rtlCol="0" anchor="ctr"/>
+          <a:lstStyle/>
+          <a:p>
+            <a:pPr algn="ctr"/>
+            <a:endParaRPr lang="en-US"/>
+          </a:p>
+        </p:txBody>
+      </p:sp>
+      <p:sp>
+        <p:nvSpPr>
+          <p:cNvPr id="11" name="Rectangle 10"/>
+          <p:cNvSpPr/>
+          <p:nvPr/>
+        </p:nvSpPr>
+        <p:spPr>
+          <a:xfrm>
+            <a:off x="7833675" y="976153"/>
+            <a:ext cx="829559" cy="566182"/>
+          </a:xfrm>
+          <a:prstGeom prst="rect">
+            <a:avLst/>
+          </a:prstGeom>
+          <a:noFill/>
+          <a:ln w="19050">
+            <a:solidFill>
+              <a:srgbClr val="FF0000"/>
+            </a:solidFill>
+          </a:ln>
+        </p:spPr>
+        <p:style>
+          <a:lnRef idx="2">
+            <a:schemeClr val="accent1">
+              <a:shade val="50000"/>
+            </a:schemeClr>
+          </a:lnRef>
+          <a:fillRef idx="1">
+            <a:schemeClr val="accent1"/>
+          </a:fillRef>
+          <a:effectRef idx="0">
+            <a:schemeClr val="accent1"/>
+          </a:effectRef>
+          <a:fontRef idx="minor">
+            <a:schemeClr val="lt1"/>
+          </a:fontRef>
+        </p:style>
+        <p:txBody>
+          <a:bodyPr rtlCol="0" anchor="ctr"/>
+          <a:lstStyle/>
+          <a:p>
+            <a:pPr algn="ctr"/>
+            <a:endParaRPr lang="en-US"/>
+          </a:p>
+        </p:txBody>
+      </p:sp>
+      <p:sp>
+        <p:nvSpPr>
+          <p:cNvPr id="12" name="Rectangle 11"/>
+          <p:cNvSpPr/>
+          <p:nvPr/>
+        </p:nvSpPr>
+        <p:spPr>
+          <a:xfrm>
+            <a:off x="7828224" y="542859"/>
+            <a:ext cx="829559" cy="566182"/>
+          </a:xfrm>
+          <a:prstGeom prst="rect">
+            <a:avLst/>
+          </a:prstGeom>
+          <a:noFill/>
+          <a:ln w="19050">
+            <a:solidFill>
+              <a:srgbClr val="FF0000"/>
+            </a:solidFill>
+          </a:ln>
+        </p:spPr>
+        <p:style>
+          <a:lnRef idx="2">
+            <a:schemeClr val="accent1">
+              <a:shade val="50000"/>
+            </a:schemeClr>
+          </a:lnRef>
+          <a:fillRef idx="1">
+            <a:schemeClr val="accent1"/>
+          </a:fillRef>
+          <a:effectRef idx="0">
+            <a:schemeClr val="accent1"/>
+          </a:effectRef>
+          <a:fontRef idx="minor">
+            <a:schemeClr val="lt1"/>
+          </a:fontRef>
+        </p:style>
+        <p:txBody>
+          <a:bodyPr rtlCol="0" anchor="ctr"/>
+          <a:lstStyle/>
+          <a:p>
+            <a:pPr algn="ctr"/>
+            <a:endParaRPr lang="en-US"/>
+          </a:p>
+        </p:txBody>
+      </p:sp>
+      <p:sp>
+        <p:nvSpPr>
+          <p:cNvPr id="13" name="Rectangle 12"/>
+          <p:cNvSpPr/>
+          <p:nvPr/>
+        </p:nvSpPr>
+        <p:spPr>
+          <a:xfrm>
+            <a:off x="11098711" y="1068639"/>
+            <a:ext cx="829559" cy="566182"/>
+          </a:xfrm>
+          <a:prstGeom prst="rect">
+            <a:avLst/>
+          </a:prstGeom>
+          <a:noFill/>
+          <a:ln w="19050">
+            <a:solidFill>
+              <a:srgbClr val="FF0000"/>
+            </a:solidFill>
+          </a:ln>
+        </p:spPr>
+        <p:style>
+          <a:lnRef idx="2">
+            <a:schemeClr val="accent1">
+              <a:shade val="50000"/>
+            </a:schemeClr>
+          </a:lnRef>
+          <a:fillRef idx="1">
+            <a:schemeClr val="accent1"/>
+          </a:fillRef>
+          <a:effectRef idx="0">
+            <a:schemeClr val="accent1"/>
+          </a:effectRef>
+          <a:fontRef idx="minor">
+            <a:schemeClr val="lt1"/>
+          </a:fontRef>
+        </p:style>
+        <p:txBody>
+          <a:bodyPr rtlCol="0" anchor="ctr"/>
+          <a:lstStyle/>
+          <a:p>
+            <a:pPr algn="ctr"/>
+            <a:endParaRPr lang="en-US"/>
+          </a:p>
+        </p:txBody>
+      </p:sp>
+      <p:sp>
+        <p:nvSpPr>
+          <p:cNvPr id="14" name="Rectangle 13"/>
+          <p:cNvSpPr/>
+          <p:nvPr/>
+        </p:nvSpPr>
+        <p:spPr>
+          <a:xfrm>
+            <a:off x="10303070" y="2316163"/>
+            <a:ext cx="829559" cy="566182"/>
+          </a:xfrm>
+          <a:prstGeom prst="rect">
+            <a:avLst/>
+          </a:prstGeom>
+          <a:noFill/>
+          <a:ln w="19050">
+            <a:solidFill>
+              <a:srgbClr val="FF0000"/>
+            </a:solidFill>
+          </a:ln>
+        </p:spPr>
+        <p:style>
+          <a:lnRef idx="2">
+            <a:schemeClr val="accent1">
+              <a:shade val="50000"/>
+            </a:schemeClr>
+          </a:lnRef>
+          <a:fillRef idx="1">
+            <a:schemeClr val="accent1"/>
+          </a:fillRef>
+          <a:effectRef idx="0">
+            <a:schemeClr val="accent1"/>
+          </a:effectRef>
+          <a:fontRef idx="minor">
+            <a:schemeClr val="lt1"/>
+          </a:fontRef>
+        </p:style>
+        <p:txBody>
+          <a:bodyPr rtlCol="0" anchor="ctr"/>
+          <a:lstStyle/>
+          <a:p>
+            <a:pPr algn="ctr"/>
+            <a:endParaRPr lang="en-US"/>
+          </a:p>
+        </p:txBody>
+      </p:sp>
+      <p:sp>
+        <p:nvSpPr>
+          <p:cNvPr id="15" name="Rectangle 14"/>
+          <p:cNvSpPr/>
+          <p:nvPr/>
+        </p:nvSpPr>
+        <p:spPr>
+          <a:xfrm>
+            <a:off x="9473510" y="4135926"/>
+            <a:ext cx="829559" cy="566182"/>
+          </a:xfrm>
+          <a:prstGeom prst="rect">
+            <a:avLst/>
+          </a:prstGeom>
+          <a:noFill/>
+          <a:ln w="19050">
+            <a:solidFill>
+              <a:srgbClr val="FF0000"/>
+            </a:solidFill>
+          </a:ln>
+        </p:spPr>
+        <p:style>
+          <a:lnRef idx="2">
+            <a:schemeClr val="accent1">
+              <a:shade val="50000"/>
+            </a:schemeClr>
+          </a:lnRef>
+          <a:fillRef idx="1">
+            <a:schemeClr val="accent1"/>
+          </a:fillRef>
+          <a:effectRef idx="0">
+            <a:schemeClr val="accent1"/>
+          </a:effectRef>
+          <a:fontRef idx="minor">
+            <a:schemeClr val="lt1"/>
+          </a:fontRef>
+        </p:style>
+        <p:txBody>
+          <a:bodyPr rtlCol="0" anchor="ctr"/>
+          <a:lstStyle/>
+          <a:p>
+            <a:pPr algn="ctr"/>
+            <a:endParaRPr lang="en-US"/>
+          </a:p>
+        </p:txBody>
+      </p:sp>
+      <p:sp>
+        <p:nvSpPr>
+          <p:cNvPr id="16" name="Rectangle 15"/>
+          <p:cNvSpPr/>
+          <p:nvPr/>
+        </p:nvSpPr>
+        <p:spPr>
+          <a:xfrm>
+            <a:off x="9494051" y="5821943"/>
+            <a:ext cx="829559" cy="566182"/>
+          </a:xfrm>
+          <a:prstGeom prst="rect">
+            <a:avLst/>
+          </a:prstGeom>
+          <a:noFill/>
+          <a:ln w="19050">
+            <a:solidFill>
+              <a:srgbClr val="FF0000"/>
+            </a:solidFill>
+          </a:ln>
+        </p:spPr>
+        <p:style>
+          <a:lnRef idx="2">
+            <a:schemeClr val="accent1">
+              <a:shade val="50000"/>
+            </a:schemeClr>
+          </a:lnRef>
+          <a:fillRef idx="1">
+            <a:schemeClr val="accent1"/>
+          </a:fillRef>
+          <a:effectRef idx="0">
+            <a:schemeClr val="accent1"/>
+          </a:effectRef>
+          <a:fontRef idx="minor">
+            <a:schemeClr val="lt1"/>
+          </a:fontRef>
+        </p:style>
+        <p:txBody>
+          <a:bodyPr rtlCol="0" anchor="ctr"/>
+          <a:lstStyle/>
+          <a:p>
+            <a:pPr algn="ctr"/>
+            <a:endParaRPr lang="en-US"/>
+          </a:p>
+        </p:txBody>
+      </p:sp>
+      <p:sp>
+        <p:nvSpPr>
+          <p:cNvPr id="17" name="Rectangle 16"/>
+          <p:cNvSpPr/>
+          <p:nvPr/>
+        </p:nvSpPr>
+        <p:spPr>
+          <a:xfrm>
+            <a:off x="11098710" y="5914830"/>
+            <a:ext cx="829559" cy="566182"/>
+          </a:xfrm>
+          <a:prstGeom prst="rect">
+            <a:avLst/>
+          </a:prstGeom>
+          <a:noFill/>
+          <a:ln w="19050">
+            <a:solidFill>
+              <a:srgbClr val="FF0000"/>
+            </a:solidFill>
+          </a:ln>
+        </p:spPr>
+        <p:style>
+          <a:lnRef idx="2">
+            <a:schemeClr val="accent1">
+              <a:shade val="50000"/>
+            </a:schemeClr>
+          </a:lnRef>
+          <a:fillRef idx="1">
+            <a:schemeClr val="accent1"/>
+          </a:fillRef>
+          <a:effectRef idx="0">
+            <a:schemeClr val="accent1"/>
+          </a:effectRef>
+          <a:fontRef idx="minor">
+            <a:schemeClr val="lt1"/>
+          </a:fontRef>
+        </p:style>
+        <p:txBody>
+          <a:bodyPr rtlCol="0" anchor="ctr"/>
+          <a:lstStyle/>
+          <a:p>
+            <a:pPr algn="ctr"/>
+            <a:endParaRPr lang="en-US"/>
+          </a:p>
+        </p:txBody>
+      </p:sp>
+      <p:sp>
+        <p:nvSpPr>
+          <p:cNvPr id="18" name="Rectangle 17"/>
+          <p:cNvSpPr/>
+          <p:nvPr/>
+        </p:nvSpPr>
+        <p:spPr>
+          <a:xfrm>
+            <a:off x="1193241" y="2786100"/>
+            <a:ext cx="829559" cy="566182"/>
+          </a:xfrm>
+          <a:prstGeom prst="rect">
+            <a:avLst/>
+          </a:prstGeom>
+          <a:noFill/>
+          <a:ln w="19050">
+            <a:solidFill>
+              <a:srgbClr val="FF0000"/>
+            </a:solidFill>
+          </a:ln>
+        </p:spPr>
+        <p:style>
+          <a:lnRef idx="2">
+            <a:schemeClr val="accent1">
+              <a:shade val="50000"/>
+            </a:schemeClr>
+          </a:lnRef>
+          <a:fillRef idx="1">
+            <a:schemeClr val="accent1"/>
+          </a:fillRef>
+          <a:effectRef idx="0">
+            <a:schemeClr val="accent1"/>
+          </a:effectRef>
+          <a:fontRef idx="minor">
+            <a:schemeClr val="lt1"/>
+          </a:fontRef>
+        </p:style>
+        <p:txBody>
+          <a:bodyPr rtlCol="0" anchor="ctr"/>
+          <a:lstStyle/>
+          <a:p>
+            <a:pPr algn="ctr"/>
+            <a:endParaRPr lang="en-US"/>
+          </a:p>
+        </p:txBody>
+      </p:sp>
+    </p:spTree>
+    <p:extLst>
+      <p:ext uri="{BB962C8B-B14F-4D97-AF65-F5344CB8AC3E}">
+        <p14:creationId xmlns:p14="http://schemas.microsoft.com/office/powerpoint/2010/main" val="2679827199"/>
+      </p:ext>
+    </p:extLst>
+  </p:cSld>
+  <p:clrMapOvr>
+    <a:masterClrMapping/>
+  </p:clrMapOvr>
+  <p:timing>
+    <p:tnLst>
+      <p:par>
+        <p:cTn id="1" dur="indefinite" restart="never" nodeType="tmRoot"/>
+      </p:par>
+    </p:tnLst>
+  </p:timing>
+</p:sld>
+</file>
+
+<file path=ppt/slides/slide8.xml><?xml version="1.0" encoding="utf-8"?>
+<p:sld xmlns:a="http://schemas.openxmlformats.org/drawingml/2006/main" xmlns:r="http://schemas.openxmlformats.org/officeDocument/2006/relationships" xmlns:p="http://schemas.openxmlformats.org/presentationml/2006/main">
+  <p:cSld>
+    <p:spTree>
+      <p:nvGrpSpPr>
+        <p:cNvPr id="1" name=""/>
+        <p:cNvGrpSpPr/>
+        <p:nvPr/>
+      </p:nvGrpSpPr>
+      <p:grpSpPr>
+        <a:xfrm>
+          <a:off x="0" y="0"/>
+          <a:ext cx="0" cy="0"/>
+          <a:chOff x="0" y="0"/>
+          <a:chExt cx="0" cy="0"/>
+        </a:xfrm>
+      </p:grpSpPr>
+      <p:sp>
+        <p:nvSpPr>
+          <p:cNvPr id="2" name="Title 1"/>
+          <p:cNvSpPr>
+            <a:spLocks noGrp="1"/>
+          </p:cNvSpPr>
+          <p:nvPr>
+            <p:ph type="title"/>
+          </p:nvPr>
+        </p:nvSpPr>
+        <p:spPr/>
+        <p:txBody>
+          <a:bodyPr/>
+          <a:lstStyle/>
+          <a:p>
             <a:endParaRPr lang="en-US"/>
           </a:p>
         </p:txBody>
@@ -4703,7 +4999,7 @@
 </p:sld>
 </file>
 
-<file path=ppt/slides/slide7.xml><?xml version="1.0" encoding="utf-8"?>
+<file path=ppt/slides/slide9.xml><?xml version="1.0" encoding="utf-8"?>
 <p:sld xmlns:a="http://schemas.openxmlformats.org/drawingml/2006/main" xmlns:r="http://schemas.openxmlformats.org/officeDocument/2006/relationships" xmlns:p="http://schemas.openxmlformats.org/presentationml/2006/main" show="0">
   <p:cSld>
     <p:spTree>
@@ -4873,11 +5169,11 @@
   <p:clrMapOvr>
     <a:masterClrMapping/>
   </p:clrMapOvr>
-  <mc:AlternateContent xmlns:mc="http://schemas.openxmlformats.org/markup-compatibility/2006">
-    <mc:Choice xmlns:p14="http://schemas.microsoft.com/office/powerpoint/2010/main" Requires="p14">
+  <mc:AlternateContent xmlns:mc="http://schemas.openxmlformats.org/markup-compatibility/2006" xmlns:p14="http://schemas.microsoft.com/office/powerpoint/2010/main">
+    <mc:Choice Requires="p14">
       <p:transition spd="slow" p14:dur="2000"/>
     </mc:Choice>
-    <mc:Fallback>
+    <mc:Fallback xmlns="">
       <p:transition spd="slow"/>
     </mc:Fallback>
   </mc:AlternateContent>

</xml_diff>

<commit_message>
publisher report: models for fill, cpm, and combined
Former-commit-id: b2d527a77d70e30c5354f2aabc211ba99ed11f73
</commit_message>
<xml_diff>
--- a/RedShift/PublisherReport/served 1-day prediction using redshift data.pptx
+++ b/RedShift/PublisherReport/served 1-day prediction using redshift data.pptx
@@ -7,13 +7,18 @@
   <p:sldIdLst>
     <p:sldId id="258" r:id="rId2"/>
     <p:sldId id="259" r:id="rId3"/>
-    <p:sldId id="263" r:id="rId4"/>
-    <p:sldId id="264" r:id="rId5"/>
-    <p:sldId id="261" r:id="rId6"/>
-    <p:sldId id="262" r:id="rId7"/>
-    <p:sldId id="256" r:id="rId8"/>
-    <p:sldId id="257" r:id="rId9"/>
-    <p:sldId id="260" r:id="rId10"/>
+    <p:sldId id="265" r:id="rId4"/>
+    <p:sldId id="263" r:id="rId5"/>
+    <p:sldId id="264" r:id="rId6"/>
+    <p:sldId id="266" r:id="rId7"/>
+    <p:sldId id="267" r:id="rId8"/>
+    <p:sldId id="261" r:id="rId9"/>
+    <p:sldId id="262" r:id="rId10"/>
+    <p:sldId id="256" r:id="rId11"/>
+    <p:sldId id="257" r:id="rId12"/>
+    <p:sldId id="260" r:id="rId13"/>
+    <p:sldId id="268" r:id="rId14"/>
+    <p:sldId id="269" r:id="rId15"/>
   </p:sldIdLst>
   <p:sldSz cx="12192000" cy="6858000"/>
   <p:notesSz cx="6858000" cy="9144000"/>
@@ -251,7 +256,7 @@
           <a:p>
             <a:fld id="{2CD3CBAC-0DE8-4C84-B15C-961A73A0026C}" type="datetimeFigureOut">
               <a:rPr lang="en-US" smtClean="0"/>
-              <a:t>3/22/2016</a:t>
+              <a:t>4/4/2016</a:t>
             </a:fld>
             <a:endParaRPr lang="en-US"/>
           </a:p>
@@ -421,7 +426,7 @@
           <a:p>
             <a:fld id="{2CD3CBAC-0DE8-4C84-B15C-961A73A0026C}" type="datetimeFigureOut">
               <a:rPr lang="en-US" smtClean="0"/>
-              <a:t>3/22/2016</a:t>
+              <a:t>4/4/2016</a:t>
             </a:fld>
             <a:endParaRPr lang="en-US"/>
           </a:p>
@@ -601,7 +606,7 @@
           <a:p>
             <a:fld id="{2CD3CBAC-0DE8-4C84-B15C-961A73A0026C}" type="datetimeFigureOut">
               <a:rPr lang="en-US" smtClean="0"/>
-              <a:t>3/22/2016</a:t>
+              <a:t>4/4/2016</a:t>
             </a:fld>
             <a:endParaRPr lang="en-US"/>
           </a:p>
@@ -771,7 +776,7 @@
           <a:p>
             <a:fld id="{2CD3CBAC-0DE8-4C84-B15C-961A73A0026C}" type="datetimeFigureOut">
               <a:rPr lang="en-US" smtClean="0"/>
-              <a:t>3/22/2016</a:t>
+              <a:t>4/4/2016</a:t>
             </a:fld>
             <a:endParaRPr lang="en-US"/>
           </a:p>
@@ -1017,7 +1022,7 @@
           <a:p>
             <a:fld id="{2CD3CBAC-0DE8-4C84-B15C-961A73A0026C}" type="datetimeFigureOut">
               <a:rPr lang="en-US" smtClean="0"/>
-              <a:t>3/22/2016</a:t>
+              <a:t>4/4/2016</a:t>
             </a:fld>
             <a:endParaRPr lang="en-US"/>
           </a:p>
@@ -1249,7 +1254,7 @@
           <a:p>
             <a:fld id="{2CD3CBAC-0DE8-4C84-B15C-961A73A0026C}" type="datetimeFigureOut">
               <a:rPr lang="en-US" smtClean="0"/>
-              <a:t>3/22/2016</a:t>
+              <a:t>4/4/2016</a:t>
             </a:fld>
             <a:endParaRPr lang="en-US"/>
           </a:p>
@@ -1616,7 +1621,7 @@
           <a:p>
             <a:fld id="{2CD3CBAC-0DE8-4C84-B15C-961A73A0026C}" type="datetimeFigureOut">
               <a:rPr lang="en-US" smtClean="0"/>
-              <a:t>3/22/2016</a:t>
+              <a:t>4/4/2016</a:t>
             </a:fld>
             <a:endParaRPr lang="en-US"/>
           </a:p>
@@ -1734,7 +1739,7 @@
           <a:p>
             <a:fld id="{2CD3CBAC-0DE8-4C84-B15C-961A73A0026C}" type="datetimeFigureOut">
               <a:rPr lang="en-US" smtClean="0"/>
-              <a:t>3/22/2016</a:t>
+              <a:t>4/4/2016</a:t>
             </a:fld>
             <a:endParaRPr lang="en-US"/>
           </a:p>
@@ -1829,7 +1834,7 @@
           <a:p>
             <a:fld id="{2CD3CBAC-0DE8-4C84-B15C-961A73A0026C}" type="datetimeFigureOut">
               <a:rPr lang="en-US" smtClean="0"/>
-              <a:t>3/22/2016</a:t>
+              <a:t>4/4/2016</a:t>
             </a:fld>
             <a:endParaRPr lang="en-US"/>
           </a:p>
@@ -2106,7 +2111,7 @@
           <a:p>
             <a:fld id="{2CD3CBAC-0DE8-4C84-B15C-961A73A0026C}" type="datetimeFigureOut">
               <a:rPr lang="en-US" smtClean="0"/>
-              <a:t>3/22/2016</a:t>
+              <a:t>4/4/2016</a:t>
             </a:fld>
             <a:endParaRPr lang="en-US"/>
           </a:p>
@@ -2359,7 +2364,7 @@
           <a:p>
             <a:fld id="{2CD3CBAC-0DE8-4C84-B15C-961A73A0026C}" type="datetimeFigureOut">
               <a:rPr lang="en-US" smtClean="0"/>
-              <a:t>3/22/2016</a:t>
+              <a:t>4/4/2016</a:t>
             </a:fld>
             <a:endParaRPr lang="en-US"/>
           </a:p>
@@ -2572,7 +2577,7 @@
           <a:p>
             <a:fld id="{2CD3CBAC-0DE8-4C84-B15C-961A73A0026C}" type="datetimeFigureOut">
               <a:rPr lang="en-US" smtClean="0"/>
-              <a:t>3/22/2016</a:t>
+              <a:t>4/4/2016</a:t>
             </a:fld>
             <a:endParaRPr lang="en-US"/>
           </a:p>
@@ -2994,7 +2999,7 @@
           <a:p>
             <a:r>
               <a:rPr lang="en-US" dirty="0" smtClean="0"/>
-              <a:t>Methodology</a:t>
+              <a:t>Methodology – served prediction</a:t>
             </a:r>
             <a:endParaRPr lang="en-US" dirty="0"/>
           </a:p>
@@ -3082,6 +3087,1267 @@
     <p:extLst>
       <p:ext uri="{BB962C8B-B14F-4D97-AF65-F5344CB8AC3E}">
         <p14:creationId xmlns:p14="http://schemas.microsoft.com/office/powerpoint/2010/main" val="3463425596"/>
+      </p:ext>
+    </p:extLst>
+  </p:cSld>
+  <p:clrMapOvr>
+    <a:masterClrMapping/>
+  </p:clrMapOvr>
+  <p:timing>
+    <p:tnLst>
+      <p:par>
+        <p:cTn id="1" dur="indefinite" restart="never" nodeType="tmRoot"/>
+      </p:par>
+    </p:tnLst>
+  </p:timing>
+</p:sld>
+</file>
+
+<file path=ppt/slides/slide10.xml><?xml version="1.0" encoding="utf-8"?>
+<p:sld xmlns:a="http://schemas.openxmlformats.org/drawingml/2006/main" xmlns:r="http://schemas.openxmlformats.org/officeDocument/2006/relationships" xmlns:p="http://schemas.openxmlformats.org/presentationml/2006/main" show="0">
+  <p:cSld>
+    <p:spTree>
+      <p:nvGrpSpPr>
+        <p:cNvPr id="1" name=""/>
+        <p:cNvGrpSpPr/>
+        <p:nvPr/>
+      </p:nvGrpSpPr>
+      <p:grpSpPr>
+        <a:xfrm>
+          <a:off x="0" y="0"/>
+          <a:ext cx="0" cy="0"/>
+          <a:chOff x="0" y="0"/>
+          <a:chExt cx="0" cy="0"/>
+        </a:xfrm>
+      </p:grpSpPr>
+      <p:sp>
+        <p:nvSpPr>
+          <p:cNvPr id="2" name="Title 1"/>
+          <p:cNvSpPr>
+            <a:spLocks noGrp="1"/>
+          </p:cNvSpPr>
+          <p:nvPr>
+            <p:ph type="ctrTitle"/>
+          </p:nvPr>
+        </p:nvSpPr>
+        <p:spPr/>
+        <p:txBody>
+          <a:bodyPr/>
+          <a:lstStyle/>
+          <a:p>
+            <a:endParaRPr lang="en-US"/>
+          </a:p>
+        </p:txBody>
+      </p:sp>
+      <p:sp>
+        <p:nvSpPr>
+          <p:cNvPr id="3" name="Subtitle 2"/>
+          <p:cNvSpPr>
+            <a:spLocks noGrp="1"/>
+          </p:cNvSpPr>
+          <p:nvPr>
+            <p:ph type="subTitle" idx="1"/>
+          </p:nvPr>
+        </p:nvSpPr>
+        <p:spPr/>
+        <p:txBody>
+          <a:bodyPr/>
+          <a:lstStyle/>
+          <a:p>
+            <a:endParaRPr lang="en-US"/>
+          </a:p>
+        </p:txBody>
+      </p:sp>
+      <p:pic>
+        <p:nvPicPr>
+          <p:cNvPr id="5" name="Picture 4"/>
+          <p:cNvPicPr>
+            <a:picLocks noChangeAspect="1"/>
+          </p:cNvPicPr>
+          <p:nvPr/>
+        </p:nvPicPr>
+        <p:blipFill>
+          <a:blip r:embed="rId2"/>
+          <a:stretch>
+            <a:fillRect/>
+          </a:stretch>
+        </p:blipFill>
+        <p:spPr>
+          <a:xfrm>
+            <a:off x="0" y="556181"/>
+            <a:ext cx="12207874" cy="6377342"/>
+          </a:xfrm>
+          <a:prstGeom prst="rect">
+            <a:avLst/>
+          </a:prstGeom>
+        </p:spPr>
+      </p:pic>
+      <p:sp>
+        <p:nvSpPr>
+          <p:cNvPr id="4" name="TextBox 3"/>
+          <p:cNvSpPr txBox="1"/>
+          <p:nvPr/>
+        </p:nvSpPr>
+        <p:spPr>
+          <a:xfrm>
+            <a:off x="245098" y="75414"/>
+            <a:ext cx="11946902" cy="646331"/>
+          </a:xfrm>
+          <a:prstGeom prst="rect">
+            <a:avLst/>
+          </a:prstGeom>
+          <a:noFill/>
+        </p:spPr>
+        <p:txBody>
+          <a:bodyPr wrap="square" rtlCol="0">
+            <a:spAutoFit/>
+          </a:bodyPr>
+          <a:lstStyle/>
+          <a:p>
+            <a:r>
+              <a:rPr lang="en-US" dirty="0" smtClean="0"/>
+              <a:t>Deviation time-series: tile = placement, color=network. The “bad days” are the dip in the middle of each x-axis. Placements with similar AOL pattern are </a:t>
+            </a:r>
+            <a:r>
+              <a:rPr lang="en-US" dirty="0" smtClean="0"/>
+              <a:t>framed.</a:t>
+            </a:r>
+            <a:endParaRPr lang="en-US" dirty="0"/>
+          </a:p>
+        </p:txBody>
+      </p:sp>
+      <p:sp>
+        <p:nvSpPr>
+          <p:cNvPr id="6" name="Rectangle 5"/>
+          <p:cNvSpPr/>
+          <p:nvPr/>
+        </p:nvSpPr>
+        <p:spPr>
+          <a:xfrm>
+            <a:off x="8663233" y="556181"/>
+            <a:ext cx="829559" cy="566182"/>
+          </a:xfrm>
+          <a:prstGeom prst="rect">
+            <a:avLst/>
+          </a:prstGeom>
+          <a:noFill/>
+          <a:ln w="19050">
+            <a:solidFill>
+              <a:srgbClr val="FF0000"/>
+            </a:solidFill>
+          </a:ln>
+        </p:spPr>
+        <p:style>
+          <a:lnRef idx="2">
+            <a:schemeClr val="accent1">
+              <a:shade val="50000"/>
+            </a:schemeClr>
+          </a:lnRef>
+          <a:fillRef idx="1">
+            <a:schemeClr val="accent1"/>
+          </a:fillRef>
+          <a:effectRef idx="0">
+            <a:schemeClr val="accent1"/>
+          </a:effectRef>
+          <a:fontRef idx="minor">
+            <a:schemeClr val="lt1"/>
+          </a:fontRef>
+        </p:style>
+        <p:txBody>
+          <a:bodyPr rtlCol="0" anchor="ctr"/>
+          <a:lstStyle/>
+          <a:p>
+            <a:pPr algn="ctr"/>
+            <a:endParaRPr lang="en-US"/>
+          </a:p>
+        </p:txBody>
+      </p:sp>
+      <p:sp>
+        <p:nvSpPr>
+          <p:cNvPr id="8" name="Rectangle 7"/>
+          <p:cNvSpPr/>
+          <p:nvPr/>
+        </p:nvSpPr>
+        <p:spPr>
+          <a:xfrm>
+            <a:off x="9494051" y="557836"/>
+            <a:ext cx="829559" cy="566182"/>
+          </a:xfrm>
+          <a:prstGeom prst="rect">
+            <a:avLst/>
+          </a:prstGeom>
+          <a:noFill/>
+          <a:ln w="19050">
+            <a:solidFill>
+              <a:srgbClr val="FF0000"/>
+            </a:solidFill>
+          </a:ln>
+        </p:spPr>
+        <p:style>
+          <a:lnRef idx="2">
+            <a:schemeClr val="accent1">
+              <a:shade val="50000"/>
+            </a:schemeClr>
+          </a:lnRef>
+          <a:fillRef idx="1">
+            <a:schemeClr val="accent1"/>
+          </a:fillRef>
+          <a:effectRef idx="0">
+            <a:schemeClr val="accent1"/>
+          </a:effectRef>
+          <a:fontRef idx="minor">
+            <a:schemeClr val="lt1"/>
+          </a:fontRef>
+        </p:style>
+        <p:txBody>
+          <a:bodyPr rtlCol="0" anchor="ctr"/>
+          <a:lstStyle/>
+          <a:p>
+            <a:pPr algn="ctr"/>
+            <a:endParaRPr lang="en-US"/>
+          </a:p>
+        </p:txBody>
+      </p:sp>
+      <p:sp>
+        <p:nvSpPr>
+          <p:cNvPr id="9" name="Rectangle 8"/>
+          <p:cNvSpPr/>
+          <p:nvPr/>
+        </p:nvSpPr>
+        <p:spPr>
+          <a:xfrm>
+            <a:off x="9473511" y="1002797"/>
+            <a:ext cx="829559" cy="566182"/>
+          </a:xfrm>
+          <a:prstGeom prst="rect">
+            <a:avLst/>
+          </a:prstGeom>
+          <a:noFill/>
+          <a:ln w="19050">
+            <a:solidFill>
+              <a:srgbClr val="FF0000"/>
+            </a:solidFill>
+          </a:ln>
+        </p:spPr>
+        <p:style>
+          <a:lnRef idx="2">
+            <a:schemeClr val="accent1">
+              <a:shade val="50000"/>
+            </a:schemeClr>
+          </a:lnRef>
+          <a:fillRef idx="1">
+            <a:schemeClr val="accent1"/>
+          </a:fillRef>
+          <a:effectRef idx="0">
+            <a:schemeClr val="accent1"/>
+          </a:effectRef>
+          <a:fontRef idx="minor">
+            <a:schemeClr val="lt1"/>
+          </a:fontRef>
+        </p:style>
+        <p:txBody>
+          <a:bodyPr rtlCol="0" anchor="ctr"/>
+          <a:lstStyle/>
+          <a:p>
+            <a:pPr algn="ctr"/>
+            <a:endParaRPr lang="en-US"/>
+          </a:p>
+        </p:txBody>
+      </p:sp>
+      <p:sp>
+        <p:nvSpPr>
+          <p:cNvPr id="10" name="Rectangle 9"/>
+          <p:cNvSpPr/>
+          <p:nvPr/>
+        </p:nvSpPr>
+        <p:spPr>
+          <a:xfrm>
+            <a:off x="8653593" y="989475"/>
+            <a:ext cx="829559" cy="566182"/>
+          </a:xfrm>
+          <a:prstGeom prst="rect">
+            <a:avLst/>
+          </a:prstGeom>
+          <a:noFill/>
+          <a:ln w="19050">
+            <a:solidFill>
+              <a:srgbClr val="FF0000"/>
+            </a:solidFill>
+          </a:ln>
+        </p:spPr>
+        <p:style>
+          <a:lnRef idx="2">
+            <a:schemeClr val="accent1">
+              <a:shade val="50000"/>
+            </a:schemeClr>
+          </a:lnRef>
+          <a:fillRef idx="1">
+            <a:schemeClr val="accent1"/>
+          </a:fillRef>
+          <a:effectRef idx="0">
+            <a:schemeClr val="accent1"/>
+          </a:effectRef>
+          <a:fontRef idx="minor">
+            <a:schemeClr val="lt1"/>
+          </a:fontRef>
+        </p:style>
+        <p:txBody>
+          <a:bodyPr rtlCol="0" anchor="ctr"/>
+          <a:lstStyle/>
+          <a:p>
+            <a:pPr algn="ctr"/>
+            <a:endParaRPr lang="en-US"/>
+          </a:p>
+        </p:txBody>
+      </p:sp>
+      <p:sp>
+        <p:nvSpPr>
+          <p:cNvPr id="11" name="Rectangle 10"/>
+          <p:cNvSpPr/>
+          <p:nvPr/>
+        </p:nvSpPr>
+        <p:spPr>
+          <a:xfrm>
+            <a:off x="7833675" y="976153"/>
+            <a:ext cx="829559" cy="566182"/>
+          </a:xfrm>
+          <a:prstGeom prst="rect">
+            <a:avLst/>
+          </a:prstGeom>
+          <a:noFill/>
+          <a:ln w="19050">
+            <a:solidFill>
+              <a:srgbClr val="FF0000"/>
+            </a:solidFill>
+          </a:ln>
+        </p:spPr>
+        <p:style>
+          <a:lnRef idx="2">
+            <a:schemeClr val="accent1">
+              <a:shade val="50000"/>
+            </a:schemeClr>
+          </a:lnRef>
+          <a:fillRef idx="1">
+            <a:schemeClr val="accent1"/>
+          </a:fillRef>
+          <a:effectRef idx="0">
+            <a:schemeClr val="accent1"/>
+          </a:effectRef>
+          <a:fontRef idx="minor">
+            <a:schemeClr val="lt1"/>
+          </a:fontRef>
+        </p:style>
+        <p:txBody>
+          <a:bodyPr rtlCol="0" anchor="ctr"/>
+          <a:lstStyle/>
+          <a:p>
+            <a:pPr algn="ctr"/>
+            <a:endParaRPr lang="en-US"/>
+          </a:p>
+        </p:txBody>
+      </p:sp>
+      <p:sp>
+        <p:nvSpPr>
+          <p:cNvPr id="12" name="Rectangle 11"/>
+          <p:cNvSpPr/>
+          <p:nvPr/>
+        </p:nvSpPr>
+        <p:spPr>
+          <a:xfrm>
+            <a:off x="7828224" y="542859"/>
+            <a:ext cx="829559" cy="566182"/>
+          </a:xfrm>
+          <a:prstGeom prst="rect">
+            <a:avLst/>
+          </a:prstGeom>
+          <a:noFill/>
+          <a:ln w="19050">
+            <a:solidFill>
+              <a:srgbClr val="FF0000"/>
+            </a:solidFill>
+          </a:ln>
+        </p:spPr>
+        <p:style>
+          <a:lnRef idx="2">
+            <a:schemeClr val="accent1">
+              <a:shade val="50000"/>
+            </a:schemeClr>
+          </a:lnRef>
+          <a:fillRef idx="1">
+            <a:schemeClr val="accent1"/>
+          </a:fillRef>
+          <a:effectRef idx="0">
+            <a:schemeClr val="accent1"/>
+          </a:effectRef>
+          <a:fontRef idx="minor">
+            <a:schemeClr val="lt1"/>
+          </a:fontRef>
+        </p:style>
+        <p:txBody>
+          <a:bodyPr rtlCol="0" anchor="ctr"/>
+          <a:lstStyle/>
+          <a:p>
+            <a:pPr algn="ctr"/>
+            <a:endParaRPr lang="en-US"/>
+          </a:p>
+        </p:txBody>
+      </p:sp>
+      <p:sp>
+        <p:nvSpPr>
+          <p:cNvPr id="13" name="Rectangle 12"/>
+          <p:cNvSpPr/>
+          <p:nvPr/>
+        </p:nvSpPr>
+        <p:spPr>
+          <a:xfrm>
+            <a:off x="11098711" y="1068639"/>
+            <a:ext cx="829559" cy="566182"/>
+          </a:xfrm>
+          <a:prstGeom prst="rect">
+            <a:avLst/>
+          </a:prstGeom>
+          <a:noFill/>
+          <a:ln w="19050">
+            <a:solidFill>
+              <a:srgbClr val="FF0000"/>
+            </a:solidFill>
+          </a:ln>
+        </p:spPr>
+        <p:style>
+          <a:lnRef idx="2">
+            <a:schemeClr val="accent1">
+              <a:shade val="50000"/>
+            </a:schemeClr>
+          </a:lnRef>
+          <a:fillRef idx="1">
+            <a:schemeClr val="accent1"/>
+          </a:fillRef>
+          <a:effectRef idx="0">
+            <a:schemeClr val="accent1"/>
+          </a:effectRef>
+          <a:fontRef idx="minor">
+            <a:schemeClr val="lt1"/>
+          </a:fontRef>
+        </p:style>
+        <p:txBody>
+          <a:bodyPr rtlCol="0" anchor="ctr"/>
+          <a:lstStyle/>
+          <a:p>
+            <a:pPr algn="ctr"/>
+            <a:endParaRPr lang="en-US"/>
+          </a:p>
+        </p:txBody>
+      </p:sp>
+      <p:sp>
+        <p:nvSpPr>
+          <p:cNvPr id="14" name="Rectangle 13"/>
+          <p:cNvSpPr/>
+          <p:nvPr/>
+        </p:nvSpPr>
+        <p:spPr>
+          <a:xfrm>
+            <a:off x="10303070" y="2316163"/>
+            <a:ext cx="829559" cy="566182"/>
+          </a:xfrm>
+          <a:prstGeom prst="rect">
+            <a:avLst/>
+          </a:prstGeom>
+          <a:noFill/>
+          <a:ln w="19050">
+            <a:solidFill>
+              <a:srgbClr val="FF0000"/>
+            </a:solidFill>
+          </a:ln>
+        </p:spPr>
+        <p:style>
+          <a:lnRef idx="2">
+            <a:schemeClr val="accent1">
+              <a:shade val="50000"/>
+            </a:schemeClr>
+          </a:lnRef>
+          <a:fillRef idx="1">
+            <a:schemeClr val="accent1"/>
+          </a:fillRef>
+          <a:effectRef idx="0">
+            <a:schemeClr val="accent1"/>
+          </a:effectRef>
+          <a:fontRef idx="minor">
+            <a:schemeClr val="lt1"/>
+          </a:fontRef>
+        </p:style>
+        <p:txBody>
+          <a:bodyPr rtlCol="0" anchor="ctr"/>
+          <a:lstStyle/>
+          <a:p>
+            <a:pPr algn="ctr"/>
+            <a:endParaRPr lang="en-US"/>
+          </a:p>
+        </p:txBody>
+      </p:sp>
+      <p:sp>
+        <p:nvSpPr>
+          <p:cNvPr id="15" name="Rectangle 14"/>
+          <p:cNvSpPr/>
+          <p:nvPr/>
+        </p:nvSpPr>
+        <p:spPr>
+          <a:xfrm>
+            <a:off x="9473510" y="4135926"/>
+            <a:ext cx="829559" cy="566182"/>
+          </a:xfrm>
+          <a:prstGeom prst="rect">
+            <a:avLst/>
+          </a:prstGeom>
+          <a:noFill/>
+          <a:ln w="19050">
+            <a:solidFill>
+              <a:srgbClr val="FF0000"/>
+            </a:solidFill>
+          </a:ln>
+        </p:spPr>
+        <p:style>
+          <a:lnRef idx="2">
+            <a:schemeClr val="accent1">
+              <a:shade val="50000"/>
+            </a:schemeClr>
+          </a:lnRef>
+          <a:fillRef idx="1">
+            <a:schemeClr val="accent1"/>
+          </a:fillRef>
+          <a:effectRef idx="0">
+            <a:schemeClr val="accent1"/>
+          </a:effectRef>
+          <a:fontRef idx="minor">
+            <a:schemeClr val="lt1"/>
+          </a:fontRef>
+        </p:style>
+        <p:txBody>
+          <a:bodyPr rtlCol="0" anchor="ctr"/>
+          <a:lstStyle/>
+          <a:p>
+            <a:pPr algn="ctr"/>
+            <a:endParaRPr lang="en-US"/>
+          </a:p>
+        </p:txBody>
+      </p:sp>
+      <p:sp>
+        <p:nvSpPr>
+          <p:cNvPr id="16" name="Rectangle 15"/>
+          <p:cNvSpPr/>
+          <p:nvPr/>
+        </p:nvSpPr>
+        <p:spPr>
+          <a:xfrm>
+            <a:off x="9494051" y="5821943"/>
+            <a:ext cx="829559" cy="566182"/>
+          </a:xfrm>
+          <a:prstGeom prst="rect">
+            <a:avLst/>
+          </a:prstGeom>
+          <a:noFill/>
+          <a:ln w="19050">
+            <a:solidFill>
+              <a:srgbClr val="FF0000"/>
+            </a:solidFill>
+          </a:ln>
+        </p:spPr>
+        <p:style>
+          <a:lnRef idx="2">
+            <a:schemeClr val="accent1">
+              <a:shade val="50000"/>
+            </a:schemeClr>
+          </a:lnRef>
+          <a:fillRef idx="1">
+            <a:schemeClr val="accent1"/>
+          </a:fillRef>
+          <a:effectRef idx="0">
+            <a:schemeClr val="accent1"/>
+          </a:effectRef>
+          <a:fontRef idx="minor">
+            <a:schemeClr val="lt1"/>
+          </a:fontRef>
+        </p:style>
+        <p:txBody>
+          <a:bodyPr rtlCol="0" anchor="ctr"/>
+          <a:lstStyle/>
+          <a:p>
+            <a:pPr algn="ctr"/>
+            <a:endParaRPr lang="en-US"/>
+          </a:p>
+        </p:txBody>
+      </p:sp>
+      <p:sp>
+        <p:nvSpPr>
+          <p:cNvPr id="17" name="Rectangle 16"/>
+          <p:cNvSpPr/>
+          <p:nvPr/>
+        </p:nvSpPr>
+        <p:spPr>
+          <a:xfrm>
+            <a:off x="11098710" y="5914830"/>
+            <a:ext cx="829559" cy="566182"/>
+          </a:xfrm>
+          <a:prstGeom prst="rect">
+            <a:avLst/>
+          </a:prstGeom>
+          <a:noFill/>
+          <a:ln w="19050">
+            <a:solidFill>
+              <a:srgbClr val="FF0000"/>
+            </a:solidFill>
+          </a:ln>
+        </p:spPr>
+        <p:style>
+          <a:lnRef idx="2">
+            <a:schemeClr val="accent1">
+              <a:shade val="50000"/>
+            </a:schemeClr>
+          </a:lnRef>
+          <a:fillRef idx="1">
+            <a:schemeClr val="accent1"/>
+          </a:fillRef>
+          <a:effectRef idx="0">
+            <a:schemeClr val="accent1"/>
+          </a:effectRef>
+          <a:fontRef idx="minor">
+            <a:schemeClr val="lt1"/>
+          </a:fontRef>
+        </p:style>
+        <p:txBody>
+          <a:bodyPr rtlCol="0" anchor="ctr"/>
+          <a:lstStyle/>
+          <a:p>
+            <a:pPr algn="ctr"/>
+            <a:endParaRPr lang="en-US"/>
+          </a:p>
+        </p:txBody>
+      </p:sp>
+      <p:sp>
+        <p:nvSpPr>
+          <p:cNvPr id="18" name="Rectangle 17"/>
+          <p:cNvSpPr/>
+          <p:nvPr/>
+        </p:nvSpPr>
+        <p:spPr>
+          <a:xfrm>
+            <a:off x="1193241" y="2786100"/>
+            <a:ext cx="829559" cy="566182"/>
+          </a:xfrm>
+          <a:prstGeom prst="rect">
+            <a:avLst/>
+          </a:prstGeom>
+          <a:noFill/>
+          <a:ln w="19050">
+            <a:solidFill>
+              <a:srgbClr val="FF0000"/>
+            </a:solidFill>
+          </a:ln>
+        </p:spPr>
+        <p:style>
+          <a:lnRef idx="2">
+            <a:schemeClr val="accent1">
+              <a:shade val="50000"/>
+            </a:schemeClr>
+          </a:lnRef>
+          <a:fillRef idx="1">
+            <a:schemeClr val="accent1"/>
+          </a:fillRef>
+          <a:effectRef idx="0">
+            <a:schemeClr val="accent1"/>
+          </a:effectRef>
+          <a:fontRef idx="minor">
+            <a:schemeClr val="lt1"/>
+          </a:fontRef>
+        </p:style>
+        <p:txBody>
+          <a:bodyPr rtlCol="0" anchor="ctr"/>
+          <a:lstStyle/>
+          <a:p>
+            <a:pPr algn="ctr"/>
+            <a:endParaRPr lang="en-US"/>
+          </a:p>
+        </p:txBody>
+      </p:sp>
+    </p:spTree>
+    <p:extLst>
+      <p:ext uri="{BB962C8B-B14F-4D97-AF65-F5344CB8AC3E}">
+        <p14:creationId xmlns:p14="http://schemas.microsoft.com/office/powerpoint/2010/main" val="2679827199"/>
+      </p:ext>
+    </p:extLst>
+  </p:cSld>
+  <p:clrMapOvr>
+    <a:masterClrMapping/>
+  </p:clrMapOvr>
+  <mc:AlternateContent xmlns:mc="http://schemas.openxmlformats.org/markup-compatibility/2006" xmlns:p14="http://schemas.microsoft.com/office/powerpoint/2010/main">
+    <mc:Choice Requires="p14">
+      <p:transition spd="slow" p14:dur="2000"/>
+    </mc:Choice>
+    <mc:Fallback xmlns="">
+      <p:transition spd="slow"/>
+    </mc:Fallback>
+  </mc:AlternateContent>
+  <p:timing>
+    <p:tnLst>
+      <p:par>
+        <p:cTn id="1" dur="indefinite" restart="never" nodeType="tmRoot"/>
+      </p:par>
+    </p:tnLst>
+  </p:timing>
+</p:sld>
+</file>
+
+<file path=ppt/slides/slide11.xml><?xml version="1.0" encoding="utf-8"?>
+<p:sld xmlns:a="http://schemas.openxmlformats.org/drawingml/2006/main" xmlns:r="http://schemas.openxmlformats.org/officeDocument/2006/relationships" xmlns:p="http://schemas.openxmlformats.org/presentationml/2006/main" show="0">
+  <p:cSld>
+    <p:spTree>
+      <p:nvGrpSpPr>
+        <p:cNvPr id="1" name=""/>
+        <p:cNvGrpSpPr/>
+        <p:nvPr/>
+      </p:nvGrpSpPr>
+      <p:grpSpPr>
+        <a:xfrm>
+          <a:off x="0" y="0"/>
+          <a:ext cx="0" cy="0"/>
+          <a:chOff x="0" y="0"/>
+          <a:chExt cx="0" cy="0"/>
+        </a:xfrm>
+      </p:grpSpPr>
+      <p:sp>
+        <p:nvSpPr>
+          <p:cNvPr id="2" name="Title 1"/>
+          <p:cNvSpPr>
+            <a:spLocks noGrp="1"/>
+          </p:cNvSpPr>
+          <p:nvPr>
+            <p:ph type="title"/>
+          </p:nvPr>
+        </p:nvSpPr>
+        <p:spPr/>
+        <p:txBody>
+          <a:bodyPr/>
+          <a:lstStyle/>
+          <a:p>
+            <a:endParaRPr lang="en-US"/>
+          </a:p>
+        </p:txBody>
+      </p:sp>
+      <p:sp>
+        <p:nvSpPr>
+          <p:cNvPr id="3" name="Content Placeholder 2"/>
+          <p:cNvSpPr>
+            <a:spLocks noGrp="1"/>
+          </p:cNvSpPr>
+          <p:nvPr>
+            <p:ph idx="1"/>
+          </p:nvPr>
+        </p:nvSpPr>
+        <p:spPr/>
+        <p:txBody>
+          <a:bodyPr/>
+          <a:lstStyle/>
+          <a:p>
+            <a:endParaRPr lang="en-US"/>
+          </a:p>
+        </p:txBody>
+      </p:sp>
+      <p:pic>
+        <p:nvPicPr>
+          <p:cNvPr id="4" name="Picture 3"/>
+          <p:cNvPicPr>
+            <a:picLocks noChangeAspect="1"/>
+          </p:cNvPicPr>
+          <p:nvPr/>
+        </p:nvPicPr>
+        <p:blipFill>
+          <a:blip r:embed="rId2"/>
+          <a:stretch>
+            <a:fillRect/>
+          </a:stretch>
+        </p:blipFill>
+        <p:spPr>
+          <a:xfrm>
+            <a:off x="380999" y="365125"/>
+            <a:ext cx="11551921" cy="6034675"/>
+          </a:xfrm>
+          <a:prstGeom prst="rect">
+            <a:avLst/>
+          </a:prstGeom>
+        </p:spPr>
+      </p:pic>
+      <p:sp>
+        <p:nvSpPr>
+          <p:cNvPr id="5" name="TextBox 4"/>
+          <p:cNvSpPr txBox="1"/>
+          <p:nvPr/>
+        </p:nvSpPr>
+        <p:spPr>
+          <a:xfrm>
+            <a:off x="1300899" y="75414"/>
+            <a:ext cx="8154186" cy="369332"/>
+          </a:xfrm>
+          <a:prstGeom prst="rect">
+            <a:avLst/>
+          </a:prstGeom>
+          <a:noFill/>
+        </p:spPr>
+        <p:txBody>
+          <a:bodyPr wrap="square" rtlCol="0">
+            <a:spAutoFit/>
+          </a:bodyPr>
+          <a:lstStyle/>
+          <a:p>
+            <a:r>
+              <a:rPr lang="en-US" dirty="0" smtClean="0"/>
+              <a:t>served day over day relative change: tile = placement, color=network</a:t>
+            </a:r>
+            <a:endParaRPr lang="en-US" dirty="0"/>
+          </a:p>
+        </p:txBody>
+      </p:sp>
+    </p:spTree>
+    <p:extLst>
+      <p:ext uri="{BB962C8B-B14F-4D97-AF65-F5344CB8AC3E}">
+        <p14:creationId xmlns:p14="http://schemas.microsoft.com/office/powerpoint/2010/main" val="2516549617"/>
+      </p:ext>
+    </p:extLst>
+  </p:cSld>
+  <p:clrMapOvr>
+    <a:masterClrMapping/>
+  </p:clrMapOvr>
+  <mc:AlternateContent xmlns:mc="http://schemas.openxmlformats.org/markup-compatibility/2006" xmlns:p14="http://schemas.microsoft.com/office/powerpoint/2010/main">
+    <mc:Choice Requires="p14">
+      <p:transition spd="slow" p14:dur="2000"/>
+    </mc:Choice>
+    <mc:Fallback xmlns="">
+      <p:transition spd="slow"/>
+    </mc:Fallback>
+  </mc:AlternateContent>
+  <p:timing>
+    <p:tnLst>
+      <p:par>
+        <p:cTn id="1" dur="indefinite" restart="never" nodeType="tmRoot"/>
+      </p:par>
+    </p:tnLst>
+  </p:timing>
+</p:sld>
+</file>
+
+<file path=ppt/slides/slide12.xml><?xml version="1.0" encoding="utf-8"?>
+<p:sld xmlns:a="http://schemas.openxmlformats.org/drawingml/2006/main" xmlns:r="http://schemas.openxmlformats.org/officeDocument/2006/relationships" xmlns:p="http://schemas.openxmlformats.org/presentationml/2006/main" show="0">
+  <p:cSld>
+    <p:spTree>
+      <p:nvGrpSpPr>
+        <p:cNvPr id="1" name=""/>
+        <p:cNvGrpSpPr/>
+        <p:nvPr/>
+      </p:nvGrpSpPr>
+      <p:grpSpPr>
+        <a:xfrm>
+          <a:off x="0" y="0"/>
+          <a:ext cx="0" cy="0"/>
+          <a:chOff x="0" y="0"/>
+          <a:chExt cx="0" cy="0"/>
+        </a:xfrm>
+      </p:grpSpPr>
+      <p:sp>
+        <p:nvSpPr>
+          <p:cNvPr id="2" name="Title 1"/>
+          <p:cNvSpPr>
+            <a:spLocks noGrp="1"/>
+          </p:cNvSpPr>
+          <p:nvPr>
+            <p:ph type="title"/>
+          </p:nvPr>
+        </p:nvSpPr>
+        <p:spPr/>
+        <p:txBody>
+          <a:bodyPr/>
+          <a:lstStyle/>
+          <a:p>
+            <a:r>
+              <a:rPr lang="en-US" dirty="0" smtClean="0"/>
+              <a:t>Technical details</a:t>
+            </a:r>
+            <a:endParaRPr lang="en-US" dirty="0"/>
+          </a:p>
+        </p:txBody>
+      </p:sp>
+      <p:sp>
+        <p:nvSpPr>
+          <p:cNvPr id="3" name="Content Placeholder 2"/>
+          <p:cNvSpPr>
+            <a:spLocks noGrp="1"/>
+          </p:cNvSpPr>
+          <p:nvPr>
+            <p:ph idx="1"/>
+          </p:nvPr>
+        </p:nvSpPr>
+        <p:spPr/>
+        <p:txBody>
+          <a:bodyPr>
+            <a:normAutofit lnSpcReduction="10000"/>
+          </a:bodyPr>
+          <a:lstStyle/>
+          <a:p>
+            <a:r>
+              <a:rPr lang="en-US" dirty="0" smtClean="0"/>
+              <a:t>RS rows:</a:t>
+            </a:r>
+          </a:p>
+          <a:p>
+            <a:pPr lvl="1"/>
+            <a:r>
+              <a:rPr lang="en-US" dirty="0" smtClean="0"/>
+              <a:t>Total: 25763 </a:t>
+            </a:r>
+          </a:p>
+          <a:p>
+            <a:pPr lvl="1"/>
+            <a:r>
+              <a:rPr lang="en-US" dirty="0" smtClean="0"/>
+              <a:t>Served network == “h”: 5399 </a:t>
+            </a:r>
+          </a:p>
+          <a:p>
+            <a:pPr lvl="1"/>
+            <a:r>
+              <a:rPr lang="en-US" dirty="0" smtClean="0"/>
+              <a:t>Served network blank: 5387 (21%)</a:t>
+            </a:r>
+          </a:p>
+          <a:p>
+            <a:pPr lvl="1"/>
+            <a:r>
+              <a:rPr lang="en-US" dirty="0" smtClean="0">
+                <a:sym typeface="Wingdings" panose="05000000000000000000" pitchFamily="2" charset="2"/>
+              </a:rPr>
+              <a:t>--&gt; </a:t>
+            </a:r>
+            <a:r>
+              <a:rPr lang="en-US" dirty="0" smtClean="0"/>
+              <a:t>Rows expected to be matched in </a:t>
+            </a:r>
+            <a:r>
+              <a:rPr lang="en-US" dirty="0" err="1" smtClean="0"/>
+              <a:t>mysql</a:t>
+            </a:r>
+            <a:r>
+              <a:rPr lang="en-US" dirty="0" smtClean="0"/>
+              <a:t>: 14977</a:t>
+            </a:r>
+          </a:p>
+          <a:p>
+            <a:r>
+              <a:rPr lang="en-US" dirty="0" smtClean="0"/>
+              <a:t>RS rows unmatched by a corresponding </a:t>
+            </a:r>
+            <a:r>
+              <a:rPr lang="en-US" dirty="0" err="1" smtClean="0"/>
+              <a:t>MySql</a:t>
+            </a:r>
+            <a:r>
+              <a:rPr lang="en-US" dirty="0" smtClean="0"/>
+              <a:t> row: 999, most of them from 13/3 and 14/3 (data was collected on 15/3). </a:t>
+            </a:r>
+          </a:p>
+          <a:p>
+            <a:r>
+              <a:rPr lang="en-US" dirty="0" smtClean="0"/>
+              <a:t>Rows from </a:t>
+            </a:r>
+            <a:r>
+              <a:rPr lang="en-US" dirty="0" err="1" smtClean="0"/>
+              <a:t>MySql</a:t>
+            </a:r>
+            <a:r>
+              <a:rPr lang="en-US" dirty="0" smtClean="0"/>
+              <a:t> with at least 10 served, but no matching RS data: 22 rows.</a:t>
+            </a:r>
+          </a:p>
+          <a:p>
+            <a:pPr lvl="1"/>
+            <a:r>
+              <a:rPr lang="en-US" dirty="0" smtClean="0"/>
+              <a:t>16 of them are </a:t>
+            </a:r>
+            <a:r>
+              <a:rPr lang="en-US" dirty="0" err="1" smtClean="0"/>
+              <a:t>smaato</a:t>
+            </a:r>
+            <a:r>
+              <a:rPr lang="en-US" dirty="0" smtClean="0"/>
+              <a:t>.</a:t>
+            </a:r>
+          </a:p>
+          <a:p>
+            <a:pPr lvl="1"/>
+            <a:r>
+              <a:rPr lang="en-US" dirty="0" smtClean="0"/>
+              <a:t>Average served count in these 22 unmatched rows: 97.</a:t>
+            </a:r>
+          </a:p>
+          <a:p>
+            <a:pPr lvl="1"/>
+            <a:endParaRPr lang="en-US" dirty="0"/>
+          </a:p>
+        </p:txBody>
+      </p:sp>
+    </p:spTree>
+    <p:extLst>
+      <p:ext uri="{BB962C8B-B14F-4D97-AF65-F5344CB8AC3E}">
+        <p14:creationId xmlns:p14="http://schemas.microsoft.com/office/powerpoint/2010/main" val="1641192365"/>
+      </p:ext>
+    </p:extLst>
+  </p:cSld>
+  <p:clrMapOvr>
+    <a:masterClrMapping/>
+  </p:clrMapOvr>
+  <mc:AlternateContent xmlns:mc="http://schemas.openxmlformats.org/markup-compatibility/2006" xmlns:p14="http://schemas.microsoft.com/office/powerpoint/2010/main">
+    <mc:Choice Requires="p14">
+      <p:transition spd="slow" p14:dur="2000"/>
+    </mc:Choice>
+    <mc:Fallback xmlns="">
+      <p:transition spd="slow"/>
+    </mc:Fallback>
+  </mc:AlternateContent>
+  <p:timing>
+    <p:tnLst>
+      <p:par>
+        <p:cTn id="1" dur="indefinite" restart="never" nodeType="tmRoot"/>
+      </p:par>
+    </p:tnLst>
+  </p:timing>
+</p:sld>
+</file>
+
+<file path=ppt/slides/slide13.xml><?xml version="1.0" encoding="utf-8"?>
+<p:sld xmlns:a="http://schemas.openxmlformats.org/drawingml/2006/main" xmlns:r="http://schemas.openxmlformats.org/officeDocument/2006/relationships" xmlns:p="http://schemas.openxmlformats.org/presentationml/2006/main">
+  <p:cSld>
+    <p:spTree>
+      <p:nvGrpSpPr>
+        <p:cNvPr id="1" name=""/>
+        <p:cNvGrpSpPr/>
+        <p:nvPr/>
+      </p:nvGrpSpPr>
+      <p:grpSpPr>
+        <a:xfrm>
+          <a:off x="0" y="0"/>
+          <a:ext cx="0" cy="0"/>
+          <a:chOff x="0" y="0"/>
+          <a:chExt cx="0" cy="0"/>
+        </a:xfrm>
+      </p:grpSpPr>
+      <p:sp>
+        <p:nvSpPr>
+          <p:cNvPr id="2" name="Title 1"/>
+          <p:cNvSpPr>
+            <a:spLocks noGrp="1"/>
+          </p:cNvSpPr>
+          <p:nvPr>
+            <p:ph type="title"/>
+          </p:nvPr>
+        </p:nvSpPr>
+        <p:spPr>
+          <a:xfrm>
+            <a:off x="838200" y="365125"/>
+            <a:ext cx="9746411" cy="461419"/>
+          </a:xfrm>
+        </p:spPr>
+        <p:txBody>
+          <a:bodyPr>
+            <a:normAutofit fontScale="90000"/>
+          </a:bodyPr>
+          <a:lstStyle/>
+          <a:p>
+            <a:r>
+              <a:rPr lang="en-US" dirty="0" smtClean="0"/>
+              <a:t>No filtering</a:t>
+            </a:r>
+            <a:endParaRPr lang="en-US" dirty="0"/>
+          </a:p>
+        </p:txBody>
+      </p:sp>
+      <p:sp>
+        <p:nvSpPr>
+          <p:cNvPr id="3" name="Content Placeholder 2"/>
+          <p:cNvSpPr>
+            <a:spLocks noGrp="1"/>
+          </p:cNvSpPr>
+          <p:nvPr>
+            <p:ph idx="1"/>
+          </p:nvPr>
+        </p:nvSpPr>
+        <p:spPr/>
+        <p:txBody>
+          <a:bodyPr/>
+          <a:lstStyle/>
+          <a:p>
+            <a:endParaRPr lang="en-US"/>
+          </a:p>
+        </p:txBody>
+      </p:sp>
+      <p:pic>
+        <p:nvPicPr>
+          <p:cNvPr id="4" name="Picture 3"/>
+          <p:cNvPicPr>
+            <a:picLocks noChangeAspect="1"/>
+          </p:cNvPicPr>
+          <p:nvPr/>
+        </p:nvPicPr>
+        <p:blipFill>
+          <a:blip r:embed="rId2"/>
+          <a:stretch>
+            <a:fillRect/>
+          </a:stretch>
+        </p:blipFill>
+        <p:spPr>
+          <a:xfrm>
+            <a:off x="1435966" y="826544"/>
+            <a:ext cx="9320068" cy="5204911"/>
+          </a:xfrm>
+          <a:prstGeom prst="rect">
+            <a:avLst/>
+          </a:prstGeom>
+        </p:spPr>
+      </p:pic>
+    </p:spTree>
+    <p:extLst>
+      <p:ext uri="{BB962C8B-B14F-4D97-AF65-F5344CB8AC3E}">
+        <p14:creationId xmlns:p14="http://schemas.microsoft.com/office/powerpoint/2010/main" val="82412323"/>
+      </p:ext>
+    </p:extLst>
+  </p:cSld>
+  <p:clrMapOvr>
+    <a:masterClrMapping/>
+  </p:clrMapOvr>
+  <p:timing>
+    <p:tnLst>
+      <p:par>
+        <p:cTn id="1" dur="indefinite" restart="never" nodeType="tmRoot"/>
+      </p:par>
+    </p:tnLst>
+  </p:timing>
+</p:sld>
+</file>
+
+<file path=ppt/slides/slide14.xml><?xml version="1.0" encoding="utf-8"?>
+<p:sld xmlns:a="http://schemas.openxmlformats.org/drawingml/2006/main" xmlns:r="http://schemas.openxmlformats.org/officeDocument/2006/relationships" xmlns:p="http://schemas.openxmlformats.org/presentationml/2006/main">
+  <p:cSld>
+    <p:spTree>
+      <p:nvGrpSpPr>
+        <p:cNvPr id="1" name=""/>
+        <p:cNvGrpSpPr/>
+        <p:nvPr/>
+      </p:nvGrpSpPr>
+      <p:grpSpPr>
+        <a:xfrm>
+          <a:off x="0" y="0"/>
+          <a:ext cx="0" cy="0"/>
+          <a:chOff x="0" y="0"/>
+          <a:chExt cx="0" cy="0"/>
+        </a:xfrm>
+      </p:grpSpPr>
+      <p:sp>
+        <p:nvSpPr>
+          <p:cNvPr id="2" name="Title 1"/>
+          <p:cNvSpPr>
+            <a:spLocks noGrp="1"/>
+          </p:cNvSpPr>
+          <p:nvPr>
+            <p:ph type="title"/>
+          </p:nvPr>
+        </p:nvSpPr>
+        <p:spPr>
+          <a:xfrm>
+            <a:off x="838200" y="365125"/>
+            <a:ext cx="10515600" cy="583781"/>
+          </a:xfrm>
+        </p:spPr>
+        <p:txBody>
+          <a:bodyPr>
+            <a:normAutofit fontScale="90000"/>
+          </a:bodyPr>
+          <a:lstStyle/>
+          <a:p>
+            <a:r>
+              <a:rPr lang="en-US" dirty="0" smtClean="0"/>
+              <a:t>With Filtering</a:t>
+            </a:r>
+            <a:endParaRPr lang="en-US" dirty="0"/>
+          </a:p>
+        </p:txBody>
+      </p:sp>
+      <p:sp>
+        <p:nvSpPr>
+          <p:cNvPr id="3" name="Content Placeholder 2"/>
+          <p:cNvSpPr>
+            <a:spLocks noGrp="1"/>
+          </p:cNvSpPr>
+          <p:nvPr>
+            <p:ph idx="1"/>
+          </p:nvPr>
+        </p:nvSpPr>
+        <p:spPr>
+          <a:xfrm>
+            <a:off x="838200" y="6116128"/>
+            <a:ext cx="10515600" cy="492155"/>
+          </a:xfrm>
+        </p:spPr>
+        <p:txBody>
+          <a:bodyPr>
+            <a:normAutofit fontScale="62500" lnSpcReduction="20000"/>
+          </a:bodyPr>
+          <a:lstStyle/>
+          <a:p>
+            <a:r>
+              <a:rPr lang="en-US" dirty="0" smtClean="0"/>
+              <a:t>Seems that filtering </a:t>
+            </a:r>
+            <a:r>
+              <a:rPr lang="en-US" dirty="0" err="1" smtClean="0"/>
+              <a:t>js</a:t>
+            </a:r>
+            <a:r>
+              <a:rPr lang="en-US" dirty="0" smtClean="0"/>
+              <a:t>-errs will allow us to better set an upper bound to the estimation and avoid upward </a:t>
+            </a:r>
+            <a:r>
+              <a:rPr lang="en-US" smtClean="0"/>
+              <a:t>errrors</a:t>
+            </a:r>
+            <a:endParaRPr lang="en-US" dirty="0"/>
+          </a:p>
+        </p:txBody>
+      </p:sp>
+      <p:pic>
+        <p:nvPicPr>
+          <p:cNvPr id="4" name="Picture 3"/>
+          <p:cNvPicPr>
+            <a:picLocks noChangeAspect="1"/>
+          </p:cNvPicPr>
+          <p:nvPr/>
+        </p:nvPicPr>
+        <p:blipFill>
+          <a:blip r:embed="rId2"/>
+          <a:stretch>
+            <a:fillRect/>
+          </a:stretch>
+        </p:blipFill>
+        <p:spPr>
+          <a:xfrm>
+            <a:off x="1439776" y="811303"/>
+            <a:ext cx="9312447" cy="5235394"/>
+          </a:xfrm>
+          <a:prstGeom prst="rect">
+            <a:avLst/>
+          </a:prstGeom>
+        </p:spPr>
+      </p:pic>
+    </p:spTree>
+    <p:extLst>
+      <p:ext uri="{BB962C8B-B14F-4D97-AF65-F5344CB8AC3E}">
+        <p14:creationId xmlns:p14="http://schemas.microsoft.com/office/powerpoint/2010/main" val="3532992828"/>
       </p:ext>
     </p:extLst>
   </p:cSld>
@@ -3137,7 +4403,7 @@
           <a:p>
             <a:r>
               <a:rPr lang="en-US" dirty="0" smtClean="0"/>
-              <a:t>Result</a:t>
+              <a:t>Served prediction Result</a:t>
             </a:r>
             <a:endParaRPr lang="en-US" dirty="0"/>
           </a:p>
@@ -3207,46 +4473,7 @@
             </a:r>
           </a:p>
           <a:p>
-            <a:r>
-              <a:rPr lang="en-US" dirty="0" smtClean="0"/>
-              <a:t>A safety margin of 15% will result in 15% of cases over-estimated.</a:t>
-            </a:r>
-          </a:p>
-          <a:p>
-            <a:r>
-              <a:rPr lang="en-US" dirty="0"/>
-              <a:t>A safety margin of </a:t>
-            </a:r>
-            <a:r>
-              <a:rPr lang="en-US" dirty="0" smtClean="0"/>
-              <a:t>20% </a:t>
-            </a:r>
-            <a:r>
-              <a:rPr lang="en-US" dirty="0"/>
-              <a:t>will result in </a:t>
-            </a:r>
-            <a:r>
-              <a:rPr lang="en-US" dirty="0" smtClean="0"/>
-              <a:t>10% </a:t>
-            </a:r>
-            <a:r>
-              <a:rPr lang="en-US" dirty="0"/>
-              <a:t>of cases </a:t>
-            </a:r>
-            <a:r>
-              <a:rPr lang="en-US" dirty="0" smtClean="0"/>
-              <a:t>over-estimated.</a:t>
-            </a:r>
-            <a:endParaRPr lang="en-US" dirty="0"/>
-          </a:p>
-          <a:p>
             <a:endParaRPr lang="en-US" dirty="0" smtClean="0"/>
-          </a:p>
-          <a:p>
-            <a:r>
-              <a:rPr lang="en-US" dirty="0" smtClean="0"/>
-              <a:t>Calculating safety margin per network may improve the result</a:t>
-            </a:r>
           </a:p>
         </p:txBody>
       </p:sp>
@@ -3303,12 +4530,8 @@
           <a:lstStyle/>
           <a:p>
             <a:r>
-              <a:rPr lang="en-US" dirty="0" err="1" smtClean="0"/>
-              <a:t>eCPM</a:t>
-            </a:r>
-            <a:r>
-              <a:rPr lang="en-US" dirty="0" smtClean="0"/>
-              <a:t> prediction</a:t>
+              <a:rPr lang="en-US" dirty="0" smtClean="0"/>
+              <a:t>Served prediction with safety margin</a:t>
             </a:r>
             <a:endParaRPr lang="en-US" dirty="0"/>
           </a:p>
@@ -3330,73 +4553,310 @@
           <a:lstStyle/>
           <a:p>
             <a:r>
-              <a:rPr lang="en-US" dirty="0" err="1" smtClean="0"/>
-              <a:t>eCPM</a:t>
-            </a:r>
-            <a:r>
-              <a:rPr lang="en-US" dirty="0" smtClean="0"/>
-              <a:t> prediction can be obtained in one of the following ways</a:t>
-            </a:r>
-          </a:p>
-          <a:p>
-            <a:pPr lvl="1"/>
-            <a:r>
-              <a:rPr lang="en-US" dirty="0" smtClean="0"/>
-              <a:t>Historical data from same tag</a:t>
-            </a:r>
-          </a:p>
-          <a:p>
-            <a:pPr lvl="1"/>
-            <a:r>
-              <a:rPr lang="en-US" dirty="0" smtClean="0"/>
-              <a:t>Historical data from same placement and network</a:t>
-            </a:r>
-          </a:p>
-          <a:p>
-            <a:pPr lvl="1"/>
-            <a:r>
-              <a:rPr lang="en-US" dirty="0" smtClean="0"/>
-              <a:t>Historical data from same network</a:t>
-            </a:r>
-          </a:p>
-          <a:p>
-            <a:pPr lvl="1"/>
-            <a:r>
-              <a:rPr lang="en-US" dirty="0" smtClean="0"/>
-              <a:t>Based on tag’s network and floor price</a:t>
-            </a:r>
-          </a:p>
-          <a:p>
-            <a:r>
-              <a:rPr lang="en-US" dirty="0" err="1" smtClean="0"/>
-              <a:t>eCPM</a:t>
-            </a:r>
-            <a:r>
-              <a:rPr lang="en-US" dirty="0" smtClean="0"/>
-              <a:t> prediction in current code</a:t>
-            </a:r>
-          </a:p>
-          <a:p>
-            <a:pPr lvl="1"/>
-            <a:r>
-              <a:rPr lang="en-US" dirty="0" smtClean="0"/>
-              <a:t>Based on model per network per order</a:t>
-            </a:r>
-          </a:p>
-          <a:p>
-            <a:pPr lvl="1"/>
-            <a:r>
-              <a:rPr lang="en-US" dirty="0" smtClean="0"/>
-              <a:t>If model is missing, uses tag history, or similar network</a:t>
-            </a:r>
-            <a:endParaRPr lang="en-US" dirty="0"/>
-          </a:p>
-        </p:txBody>
-      </p:sp>
+              <a:rPr lang="en-US" dirty="0" smtClean="0"/>
+              <a:t>Estimation error of more than 5% is to be expected in a certain percentage of case.</a:t>
+            </a:r>
+          </a:p>
+          <a:p>
+            <a:r>
+              <a:rPr lang="en-US" dirty="0" smtClean="0"/>
+              <a:t>In order to reduce frequency of over-estimation, one technique is to display to clients figures that are deliberately lower than projected</a:t>
+            </a:r>
+          </a:p>
+          <a:p>
+            <a:r>
+              <a:rPr lang="en-US" dirty="0" smtClean="0"/>
+              <a:t>The result is higher incidence of under-estimation.</a:t>
+            </a:r>
+          </a:p>
+        </p:txBody>
+      </p:sp>
+      <p:graphicFrame>
+        <p:nvGraphicFramePr>
+          <p:cNvPr id="4" name="Table 3"/>
+          <p:cNvGraphicFramePr>
+            <a:graphicFrameLocks noGrp="1"/>
+          </p:cNvGraphicFramePr>
+          <p:nvPr>
+            <p:extLst>
+              <p:ext uri="{D42A27DB-BD31-4B8C-83A1-F6EECF244321}">
+                <p14:modId xmlns:p14="http://schemas.microsoft.com/office/powerpoint/2010/main" val="2923585645"/>
+              </p:ext>
+            </p:extLst>
+          </p:nvPr>
+        </p:nvGraphicFramePr>
+        <p:xfrm>
+          <a:off x="1126226" y="4308254"/>
+          <a:ext cx="9259976" cy="1381760"/>
+        </p:xfrm>
+        <a:graphic>
+          <a:graphicData uri="http://schemas.openxmlformats.org/drawingml/2006/table">
+            <a:tbl>
+              <a:tblPr firstRow="1" bandRow="1">
+                <a:tableStyleId>{5C22544A-7EE6-4342-B048-85BDC9FD1C3A}</a:tableStyleId>
+              </a:tblPr>
+              <a:tblGrid>
+                <a:gridCol w="1594408"/>
+                <a:gridCol w="1594408"/>
+                <a:gridCol w="1594408"/>
+                <a:gridCol w="2233886"/>
+                <a:gridCol w="2242866"/>
+              </a:tblGrid>
+              <a:tr h="370840">
+                <a:tc>
+                  <a:txBody>
+                    <a:bodyPr/>
+                    <a:lstStyle/>
+                    <a:p>
+                      <a:pPr algn="ctr"/>
+                      <a:r>
+                        <a:rPr lang="en-US" b="0" dirty="0" smtClean="0"/>
+                        <a:t>Bias</a:t>
+                      </a:r>
+                      <a:endParaRPr lang="en-US" b="0" dirty="0"/>
+                    </a:p>
+                  </a:txBody>
+                  <a:tcPr/>
+                </a:tc>
+                <a:tc>
+                  <a:txBody>
+                    <a:bodyPr/>
+                    <a:lstStyle/>
+                    <a:p>
+                      <a:pPr algn="ctr"/>
+                      <a:r>
+                        <a:rPr lang="en-US" dirty="0" smtClean="0"/>
+                        <a:t>% accurate (±5%)</a:t>
+                      </a:r>
+                      <a:endParaRPr lang="en-US" dirty="0"/>
+                    </a:p>
+                  </a:txBody>
+                  <a:tcPr/>
+                </a:tc>
+                <a:tc>
+                  <a:txBody>
+                    <a:bodyPr/>
+                    <a:lstStyle/>
+                    <a:p>
+                      <a:pPr algn="ctr"/>
+                      <a:r>
+                        <a:rPr lang="en-US" dirty="0" smtClean="0"/>
+                        <a:t>% somewhat </a:t>
+                      </a:r>
+                      <a:r>
+                        <a:rPr lang="en-US" dirty="0" err="1" smtClean="0"/>
+                        <a:t>nonaccurate</a:t>
+                      </a:r>
+                      <a:endParaRPr lang="en-US" dirty="0"/>
+                    </a:p>
+                  </a:txBody>
+                  <a:tcPr/>
+                </a:tc>
+                <a:tc>
+                  <a:txBody>
+                    <a:bodyPr/>
+                    <a:lstStyle/>
+                    <a:p>
+                      <a:pPr algn="ctr"/>
+                      <a:r>
+                        <a:rPr lang="en-US" dirty="0" smtClean="0"/>
+                        <a:t>% seve</a:t>
+                      </a:r>
+                      <a:r>
+                        <a:rPr lang="en-US" baseline="0" dirty="0" smtClean="0"/>
+                        <a:t>re downward error</a:t>
+                      </a:r>
+                      <a:endParaRPr lang="en-US" dirty="0"/>
+                    </a:p>
+                  </a:txBody>
+                  <a:tcPr/>
+                </a:tc>
+                <a:tc>
+                  <a:txBody>
+                    <a:bodyPr/>
+                    <a:lstStyle/>
+                    <a:p>
+                      <a:pPr algn="ctr"/>
+                      <a:r>
+                        <a:rPr lang="en-US" dirty="0" smtClean="0"/>
+                        <a:t>% severe</a:t>
+                      </a:r>
+                      <a:r>
+                        <a:rPr lang="en-US" baseline="0" dirty="0" smtClean="0"/>
+                        <a:t> upward error</a:t>
+                      </a:r>
+                      <a:endParaRPr lang="en-US" dirty="0"/>
+                    </a:p>
+                  </a:txBody>
+                  <a:tcPr/>
+                </a:tc>
+              </a:tr>
+              <a:tr h="370840">
+                <a:tc>
+                  <a:txBody>
+                    <a:bodyPr/>
+                    <a:lstStyle/>
+                    <a:p>
+                      <a:pPr algn="r"/>
+                      <a:r>
+                        <a:rPr lang="en-US" dirty="0" smtClean="0"/>
+                        <a:t>No bias</a:t>
+                      </a:r>
+                      <a:endParaRPr lang="en-US" dirty="0"/>
+                    </a:p>
+                  </a:txBody>
+                  <a:tcPr/>
+                </a:tc>
+                <a:tc>
+                  <a:txBody>
+                    <a:bodyPr/>
+                    <a:lstStyle/>
+                    <a:p>
+                      <a:pPr algn="ctr"/>
+                      <a:r>
+                        <a:rPr lang="en-US" dirty="0" smtClean="0"/>
+                        <a:t>57%</a:t>
+                      </a:r>
+                      <a:endParaRPr lang="en-US" dirty="0"/>
+                    </a:p>
+                  </a:txBody>
+                  <a:tcPr/>
+                </a:tc>
+                <a:tc>
+                  <a:txBody>
+                    <a:bodyPr/>
+                    <a:lstStyle/>
+                    <a:p>
+                      <a:pPr algn="ctr"/>
+                      <a:r>
+                        <a:rPr lang="en-US" dirty="0" smtClean="0"/>
+                        <a:t>30%</a:t>
+                      </a:r>
+                      <a:endParaRPr lang="en-US" dirty="0"/>
+                    </a:p>
+                  </a:txBody>
+                  <a:tcPr/>
+                </a:tc>
+                <a:tc>
+                  <a:txBody>
+                    <a:bodyPr/>
+                    <a:lstStyle/>
+                    <a:p>
+                      <a:pPr algn="ctr"/>
+                      <a:r>
+                        <a:rPr lang="en-US" dirty="0" smtClean="0"/>
+                        <a:t>6%</a:t>
+                      </a:r>
+                      <a:endParaRPr lang="en-US" dirty="0"/>
+                    </a:p>
+                  </a:txBody>
+                  <a:tcPr/>
+                </a:tc>
+                <a:tc>
+                  <a:txBody>
+                    <a:bodyPr/>
+                    <a:lstStyle/>
+                    <a:p>
+                      <a:pPr algn="ctr"/>
+                      <a:r>
+                        <a:rPr lang="en-US" dirty="0" smtClean="0"/>
+                        <a:t>7%</a:t>
+                      </a:r>
+                      <a:endParaRPr lang="en-US" dirty="0"/>
+                    </a:p>
+                  </a:txBody>
+                  <a:tcPr/>
+                </a:tc>
+              </a:tr>
+              <a:tr h="370840">
+                <a:tc>
+                  <a:txBody>
+                    <a:bodyPr/>
+                    <a:lstStyle/>
+                    <a:p>
+                      <a:pPr algn="r"/>
+                      <a:r>
+                        <a:rPr lang="en-US" dirty="0" smtClean="0"/>
+                        <a:t>10%</a:t>
+                      </a:r>
+                      <a:r>
+                        <a:rPr lang="en-US" baseline="0" dirty="0" smtClean="0"/>
+                        <a:t> down</a:t>
+                      </a:r>
+                      <a:endParaRPr lang="en-US" dirty="0"/>
+                    </a:p>
+                  </a:txBody>
+                  <a:tcPr/>
+                </a:tc>
+                <a:tc>
+                  <a:txBody>
+                    <a:bodyPr/>
+                    <a:lstStyle/>
+                    <a:p>
+                      <a:pPr algn="ctr"/>
+                      <a:r>
+                        <a:rPr lang="en-US" dirty="0" smtClean="0"/>
+                        <a:t>11%</a:t>
+                      </a:r>
+                      <a:endParaRPr lang="en-US" dirty="0"/>
+                    </a:p>
+                  </a:txBody>
+                  <a:tcPr/>
+                </a:tc>
+                <a:tc>
+                  <a:txBody>
+                    <a:bodyPr/>
+                    <a:lstStyle/>
+                    <a:p>
+                      <a:pPr algn="ctr"/>
+                      <a:r>
+                        <a:rPr lang="en-US" dirty="0" smtClean="0"/>
+                        <a:t>64%</a:t>
+                      </a:r>
+                      <a:endParaRPr lang="en-US" dirty="0"/>
+                    </a:p>
+                  </a:txBody>
+                  <a:tcPr/>
+                </a:tc>
+                <a:tc>
+                  <a:txBody>
+                    <a:bodyPr/>
+                    <a:lstStyle/>
+                    <a:p>
+                      <a:pPr algn="ctr"/>
+                      <a:r>
+                        <a:rPr lang="en-US" dirty="0" smtClean="0"/>
+                        <a:t>23%</a:t>
+                      </a:r>
+                      <a:endParaRPr lang="en-US" dirty="0"/>
+                    </a:p>
+                  </a:txBody>
+                  <a:tcPr/>
+                </a:tc>
+                <a:tc>
+                  <a:txBody>
+                    <a:bodyPr/>
+                    <a:lstStyle/>
+                    <a:p>
+                      <a:pPr algn="ctr"/>
+                      <a:r>
+                        <a:rPr lang="en-US" dirty="0" smtClean="0"/>
+                        <a:t>2%</a:t>
+                      </a:r>
+                      <a:endParaRPr lang="en-US" dirty="0"/>
+                    </a:p>
+                  </a:txBody>
+                  <a:tcPr/>
+                </a:tc>
+              </a:tr>
+            </a:tbl>
+          </a:graphicData>
+        </a:graphic>
+      </p:graphicFrame>
     </p:spTree>
     <p:extLst>
       <p:ext uri="{BB962C8B-B14F-4D97-AF65-F5344CB8AC3E}">
-        <p14:creationId xmlns:p14="http://schemas.microsoft.com/office/powerpoint/2010/main" val="3460039066"/>
+        <p14:creationId xmlns:p14="http://schemas.microsoft.com/office/powerpoint/2010/main" val="1744092801"/>
       </p:ext>
     </p:extLst>
   </p:cSld>
@@ -3446,8 +4906,12 @@
           <a:lstStyle/>
           <a:p>
             <a:r>
-              <a:rPr lang="en-US" dirty="0" smtClean="0"/>
-              <a:t>Result</a:t>
+              <a:rPr lang="en-US" dirty="0" err="1" smtClean="0"/>
+              <a:t>eCPM</a:t>
+            </a:r>
+            <a:r>
+              <a:rPr lang="en-US" dirty="0" smtClean="0"/>
+              <a:t> prediction</a:t>
             </a:r>
             <a:endParaRPr lang="en-US" dirty="0"/>
           </a:p>
@@ -3463,82 +4927,137 @@
             <p:ph idx="1"/>
           </p:nvPr>
         </p:nvSpPr>
-        <p:spPr/>
+        <p:spPr>
+          <a:xfrm>
+            <a:off x="838200" y="1825625"/>
+            <a:ext cx="10515600" cy="4670066"/>
+          </a:xfrm>
+        </p:spPr>
         <p:txBody>
           <a:bodyPr>
-            <a:normAutofit/>
+            <a:normAutofit fontScale="85000" lnSpcReduction="10000"/>
           </a:bodyPr>
           <a:lstStyle/>
           <a:p>
             <a:r>
+              <a:rPr lang="en-US" dirty="0" smtClean="0"/>
+              <a:t>Current method of </a:t>
+            </a:r>
+            <a:r>
               <a:rPr lang="en-US" dirty="0" err="1" smtClean="0"/>
-              <a:t>Ecpm</a:t>
-            </a:r>
-            <a:r>
-              <a:rPr lang="en-US" dirty="0" smtClean="0"/>
-              <a:t> prediction based on same tag at same floor price, when available</a:t>
-            </a:r>
-          </a:p>
-          <a:p>
-            <a:r>
-              <a:rPr lang="en-US" dirty="0" smtClean="0"/>
+              <a:t>eCPM</a:t>
+            </a:r>
+            <a:r>
+              <a:rPr lang="en-US" dirty="0" smtClean="0"/>
+              <a:t> prediction </a:t>
+            </a:r>
+          </a:p>
+          <a:p>
+            <a:pPr lvl="1"/>
+            <a:r>
+              <a:rPr lang="en-US" dirty="0" smtClean="0"/>
+              <a:t>Based on model per network per order</a:t>
+            </a:r>
+          </a:p>
+          <a:p>
+            <a:pPr lvl="1"/>
+            <a:r>
+              <a:rPr lang="en-US" dirty="0" smtClean="0"/>
+              <a:t>If model is missing, uses tag’s own history, or a similar tag</a:t>
+            </a:r>
+          </a:p>
+          <a:p>
+            <a:r>
+              <a:rPr lang="en-US" dirty="0" smtClean="0"/>
+              <a:t>Suggested method</a:t>
+            </a:r>
+          </a:p>
+          <a:p>
+            <a:pPr lvl="1"/>
+            <a:r>
+              <a:rPr lang="en-US" dirty="0" smtClean="0"/>
+              <a:t>When available – tag’s own recent performance (if exists and floor price hasn’t changed)</a:t>
+            </a:r>
+          </a:p>
+          <a:p>
+            <a:pPr lvl="1"/>
+            <a:r>
+              <a:rPr lang="en-US" dirty="0"/>
               <a:t>When not available, model should be based on tag’s floor price with a network-specific coefficient:</a:t>
             </a:r>
           </a:p>
           <a:p>
-            <a:pPr lvl="1"/>
+            <a:pPr lvl="2"/>
+            <a:r>
+              <a:rPr lang="pt-BR" dirty="0"/>
+              <a:t>OpenX, 	</a:t>
+            </a:r>
             <a:r>
               <a:rPr lang="pt-BR" dirty="0" smtClean="0"/>
-              <a:t>OpenX, 		1.18</a:t>
-            </a:r>
-          </a:p>
-          <a:p>
-            <a:pPr lvl="1"/>
+              <a:t>1.18</a:t>
+            </a:r>
+            <a:endParaRPr lang="pt-BR" dirty="0"/>
+          </a:p>
+          <a:p>
+            <a:pPr lvl="2"/>
             <a:r>
               <a:rPr lang="pt-BR" dirty="0" smtClean="0"/>
-              <a:t>Index, 		1.01</a:t>
-            </a:r>
-            <a:endParaRPr lang="pt-BR" dirty="0"/>
-          </a:p>
-          <a:p>
-            <a:pPr lvl="1"/>
+              <a:t>Adx, 		1.11</a:t>
+            </a:r>
+            <a:endParaRPr lang="en-US" dirty="0" smtClean="0"/>
+          </a:p>
+          <a:p>
+            <a:pPr lvl="2"/>
             <a:r>
               <a:rPr lang="pt-BR" dirty="0" smtClean="0"/>
-              <a:t>AOL, 	</a:t>
-            </a:r>
-            <a:r>
-              <a:rPr lang="pt-BR" smtClean="0"/>
-              <a:t>	0.90 </a:t>
-            </a:r>
-            <a:endParaRPr lang="pt-BR" dirty="0" smtClean="0"/>
-          </a:p>
-          <a:p>
-            <a:pPr lvl="1"/>
+              <a:t>Index</a:t>
+            </a:r>
+            <a:r>
+              <a:rPr lang="pt-BR" dirty="0"/>
+              <a:t>, 		1.01</a:t>
+            </a:r>
+          </a:p>
+          <a:p>
+            <a:pPr lvl="2"/>
+            <a:r>
+              <a:rPr lang="pt-BR" dirty="0" smtClean="0"/>
+              <a:t>PlusePoint, 	1.00</a:t>
+            </a:r>
+          </a:p>
+          <a:p>
+            <a:pPr lvl="2"/>
             <a:r>
               <a:rPr lang="pt-BR" dirty="0" smtClean="0"/>
               <a:t>Pubmatic, 	0.99</a:t>
             </a:r>
           </a:p>
           <a:p>
+            <a:pPr lvl="2"/>
+            <a:r>
+              <a:rPr lang="pt-BR" dirty="0" smtClean="0"/>
+              <a:t>AOL</a:t>
+            </a:r>
+            <a:r>
+              <a:rPr lang="pt-BR" dirty="0"/>
+              <a:t>, 		0.90 </a:t>
+            </a:r>
+          </a:p>
+          <a:p>
             <a:pPr lvl="1"/>
-            <a:r>
-              <a:rPr lang="pt-BR" dirty="0" smtClean="0"/>
-              <a:t>PlusePoint, 	1.00</a:t>
-            </a:r>
-          </a:p>
-          <a:p>
-            <a:pPr lvl="1"/>
-            <a:r>
-              <a:rPr lang="pt-BR" dirty="0" smtClean="0"/>
-              <a:t>Adx</a:t>
-            </a:r>
-            <a:r>
-              <a:rPr lang="pt-BR" dirty="0"/>
-              <a:t>, </a:t>
-            </a:r>
-            <a:r>
-              <a:rPr lang="pt-BR" dirty="0" smtClean="0"/>
-              <a:t>		1.11</a:t>
+            <a:endParaRPr lang="en-US" dirty="0" smtClean="0"/>
+          </a:p>
+          <a:p>
+            <a:r>
+              <a:rPr lang="en-US" dirty="0" smtClean="0"/>
+              <a:t>Overall, </a:t>
+            </a:r>
+            <a:r>
+              <a:rPr lang="en-US" dirty="0" err="1" smtClean="0"/>
+              <a:t>eCPM</a:t>
+            </a:r>
+            <a:r>
+              <a:rPr lang="en-US" dirty="0" smtClean="0"/>
+              <a:t> prediction accuracy of 5-6% is expected </a:t>
             </a:r>
             <a:endParaRPr lang="en-US" dirty="0"/>
           </a:p>
@@ -3547,7 +5066,7 @@
     </p:spTree>
     <p:extLst>
       <p:ext uri="{BB962C8B-B14F-4D97-AF65-F5344CB8AC3E}">
-        <p14:creationId xmlns:p14="http://schemas.microsoft.com/office/powerpoint/2010/main" val="2288416879"/>
+        <p14:creationId xmlns:p14="http://schemas.microsoft.com/office/powerpoint/2010/main" val="3460039066"/>
       </p:ext>
     </p:extLst>
   </p:cSld>
@@ -3566,6 +5085,1318 @@
 
 <file path=ppt/slides/slide5.xml><?xml version="1.0" encoding="utf-8"?>
 <p:sld xmlns:a="http://schemas.openxmlformats.org/drawingml/2006/main" xmlns:r="http://schemas.openxmlformats.org/officeDocument/2006/relationships" xmlns:p="http://schemas.openxmlformats.org/presentationml/2006/main">
+  <p:cSld>
+    <p:spTree>
+      <p:nvGrpSpPr>
+        <p:cNvPr id="1" name=""/>
+        <p:cNvGrpSpPr/>
+        <p:nvPr/>
+      </p:nvGrpSpPr>
+      <p:grpSpPr>
+        <a:xfrm>
+          <a:off x="0" y="0"/>
+          <a:ext cx="0" cy="0"/>
+          <a:chOff x="0" y="0"/>
+          <a:chExt cx="0" cy="0"/>
+        </a:xfrm>
+      </p:grpSpPr>
+      <p:sp>
+        <p:nvSpPr>
+          <p:cNvPr id="2" name="Title 1"/>
+          <p:cNvSpPr>
+            <a:spLocks noGrp="1"/>
+          </p:cNvSpPr>
+          <p:nvPr>
+            <p:ph type="title"/>
+          </p:nvPr>
+        </p:nvSpPr>
+        <p:spPr/>
+        <p:txBody>
+          <a:bodyPr/>
+          <a:lstStyle/>
+          <a:p>
+            <a:r>
+              <a:rPr lang="en-US" dirty="0" err="1" smtClean="0"/>
+              <a:t>eCPM</a:t>
+            </a:r>
+            <a:r>
+              <a:rPr lang="en-US" dirty="0" smtClean="0"/>
+              <a:t> contribution to accuracy</a:t>
+            </a:r>
+            <a:endParaRPr lang="en-US" dirty="0"/>
+          </a:p>
+        </p:txBody>
+      </p:sp>
+      <p:sp>
+        <p:nvSpPr>
+          <p:cNvPr id="3" name="Content Placeholder 2"/>
+          <p:cNvSpPr>
+            <a:spLocks noGrp="1"/>
+          </p:cNvSpPr>
+          <p:nvPr>
+            <p:ph idx="1"/>
+          </p:nvPr>
+        </p:nvSpPr>
+        <p:spPr/>
+        <p:txBody>
+          <a:bodyPr/>
+          <a:lstStyle/>
+          <a:p>
+            <a:r>
+              <a:rPr lang="en-US" dirty="0" err="1" smtClean="0"/>
+              <a:t>eCpm</a:t>
+            </a:r>
+            <a:r>
+              <a:rPr lang="en-US" dirty="0" smtClean="0"/>
+              <a:t> from own tag: 2-3% error</a:t>
+            </a:r>
+          </a:p>
+          <a:p>
+            <a:r>
+              <a:rPr lang="en-US" dirty="0" err="1" smtClean="0"/>
+              <a:t>eCpm</a:t>
+            </a:r>
+            <a:r>
+              <a:rPr lang="en-US" dirty="0" smtClean="0"/>
+              <a:t> from network and floor price: 5% error</a:t>
+            </a:r>
+          </a:p>
+          <a:p>
+            <a:r>
+              <a:rPr lang="en-US" dirty="0" smtClean="0"/>
+              <a:t>Served (after filtering OpenX, </a:t>
+            </a:r>
+            <a:r>
+              <a:rPr lang="en-US" dirty="0" err="1" smtClean="0"/>
+              <a:t>Smaato</a:t>
+            </a:r>
+            <a:r>
+              <a:rPr lang="en-US" dirty="0" smtClean="0"/>
+              <a:t>, Index, </a:t>
+            </a:r>
+            <a:r>
+              <a:rPr lang="en-US" dirty="0" err="1" smtClean="0"/>
+              <a:t>Adx</a:t>
+            </a:r>
+            <a:r>
+              <a:rPr lang="en-US" dirty="0" smtClean="0"/>
+              <a:t>):</a:t>
+            </a:r>
+          </a:p>
+          <a:p>
+            <a:endParaRPr lang="en-US" dirty="0"/>
+          </a:p>
+        </p:txBody>
+      </p:sp>
+    </p:spTree>
+    <p:extLst>
+      <p:ext uri="{BB962C8B-B14F-4D97-AF65-F5344CB8AC3E}">
+        <p14:creationId xmlns:p14="http://schemas.microsoft.com/office/powerpoint/2010/main" val="963711055"/>
+      </p:ext>
+    </p:extLst>
+  </p:cSld>
+  <p:clrMapOvr>
+    <a:masterClrMapping/>
+  </p:clrMapOvr>
+  <p:timing>
+    <p:tnLst>
+      <p:par>
+        <p:cTn id="1" dur="indefinite" restart="never" nodeType="tmRoot"/>
+      </p:par>
+    </p:tnLst>
+  </p:timing>
+</p:sld>
+</file>
+
+<file path=ppt/slides/slide6.xml><?xml version="1.0" encoding="utf-8"?>
+<p:sld xmlns:a="http://schemas.openxmlformats.org/drawingml/2006/main" xmlns:r="http://schemas.openxmlformats.org/officeDocument/2006/relationships" xmlns:p="http://schemas.openxmlformats.org/presentationml/2006/main">
+  <p:cSld>
+    <p:spTree>
+      <p:nvGrpSpPr>
+        <p:cNvPr id="1" name=""/>
+        <p:cNvGrpSpPr/>
+        <p:nvPr/>
+      </p:nvGrpSpPr>
+      <p:grpSpPr>
+        <a:xfrm>
+          <a:off x="0" y="0"/>
+          <a:ext cx="0" cy="0"/>
+          <a:chOff x="0" y="0"/>
+          <a:chExt cx="0" cy="0"/>
+        </a:xfrm>
+      </p:grpSpPr>
+      <p:sp>
+        <p:nvSpPr>
+          <p:cNvPr id="2" name="Title 1"/>
+          <p:cNvSpPr>
+            <a:spLocks noGrp="1"/>
+          </p:cNvSpPr>
+          <p:nvPr>
+            <p:ph type="title"/>
+          </p:nvPr>
+        </p:nvSpPr>
+        <p:spPr>
+          <a:xfrm>
+            <a:off x="838200" y="201223"/>
+            <a:ext cx="10515600" cy="1325563"/>
+          </a:xfrm>
+        </p:spPr>
+        <p:txBody>
+          <a:bodyPr/>
+          <a:lstStyle/>
+          <a:p>
+            <a:r>
+              <a:rPr lang="en-US" dirty="0" smtClean="0"/>
+              <a:t>Ratio of placement by frequency of: days within </a:t>
+            </a:r>
+            <a:r>
+              <a:rPr lang="en-US" dirty="0"/>
+              <a:t>10% of actual value </a:t>
+            </a:r>
+          </a:p>
+        </p:txBody>
+      </p:sp>
+      <p:graphicFrame>
+        <p:nvGraphicFramePr>
+          <p:cNvPr id="5" name="Content Placeholder 4"/>
+          <p:cNvGraphicFramePr>
+            <a:graphicFrameLocks noGrp="1"/>
+          </p:cNvGraphicFramePr>
+          <p:nvPr>
+            <p:ph idx="1"/>
+            <p:extLst>
+              <p:ext uri="{D42A27DB-BD31-4B8C-83A1-F6EECF244321}">
+                <p14:modId xmlns:p14="http://schemas.microsoft.com/office/powerpoint/2010/main" val="3978728199"/>
+              </p:ext>
+            </p:extLst>
+          </p:nvPr>
+        </p:nvGraphicFramePr>
+        <p:xfrm>
+          <a:off x="838200" y="1615835"/>
+          <a:ext cx="10515600" cy="1828800"/>
+        </p:xfrm>
+        <a:graphic>
+          <a:graphicData uri="http://schemas.openxmlformats.org/drawingml/2006/table">
+            <a:tbl>
+              <a:tblPr firstRow="1" bandRow="1">
+                <a:tableStyleId>{5C22544A-7EE6-4342-B048-85BDC9FD1C3A}</a:tableStyleId>
+              </a:tblPr>
+              <a:tblGrid>
+                <a:gridCol w="1680713"/>
+                <a:gridCol w="1095555"/>
+                <a:gridCol w="1224951"/>
+                <a:gridCol w="1035170"/>
+                <a:gridCol w="1078302"/>
+                <a:gridCol w="1224951"/>
+                <a:gridCol w="1043796"/>
+                <a:gridCol w="963762"/>
+                <a:gridCol w="1168400"/>
+              </a:tblGrid>
+              <a:tr h="370840">
+                <a:tc>
+                  <a:txBody>
+                    <a:bodyPr/>
+                    <a:lstStyle/>
+                    <a:p>
+                      <a:r>
+                        <a:rPr lang="en-US" dirty="0" smtClean="0"/>
+                        <a:t>criterion</a:t>
+                      </a:r>
+                      <a:endParaRPr lang="en-US" dirty="0"/>
+                    </a:p>
+                  </a:txBody>
+                  <a:tcPr/>
+                </a:tc>
+                <a:tc>
+                  <a:txBody>
+                    <a:bodyPr/>
+                    <a:lstStyle/>
+                    <a:p>
+                      <a:r>
+                        <a:rPr lang="en-US" dirty="0" smtClean="0"/>
+                        <a:t>100%  of</a:t>
+                      </a:r>
+                      <a:r>
+                        <a:rPr lang="en-US" baseline="0" dirty="0" smtClean="0"/>
+                        <a:t> days </a:t>
+                      </a:r>
+                      <a:r>
+                        <a:rPr lang="en-US" dirty="0" smtClean="0"/>
+                        <a:t>within</a:t>
+                      </a:r>
+                      <a:endParaRPr lang="en-US" dirty="0"/>
+                    </a:p>
+                  </a:txBody>
+                  <a:tcPr/>
+                </a:tc>
+                <a:tc>
+                  <a:txBody>
+                    <a:bodyPr/>
+                    <a:lstStyle/>
+                    <a:p>
+                      <a:r>
+                        <a:rPr lang="en-US" dirty="0" smtClean="0"/>
+                        <a:t>95% of days within</a:t>
+                      </a:r>
+                      <a:endParaRPr lang="en-US" dirty="0"/>
+                    </a:p>
+                  </a:txBody>
+                  <a:tcPr/>
+                </a:tc>
+                <a:tc>
+                  <a:txBody>
+                    <a:bodyPr/>
+                    <a:lstStyle/>
+                    <a:p>
+                      <a:r>
+                        <a:rPr lang="en-US" dirty="0" smtClean="0"/>
+                        <a:t>90% or more</a:t>
+                      </a:r>
+                      <a:endParaRPr lang="en-US" dirty="0"/>
+                    </a:p>
+                  </a:txBody>
+                  <a:tcPr/>
+                </a:tc>
+                <a:tc>
+                  <a:txBody>
+                    <a:bodyPr/>
+                    <a:lstStyle/>
+                    <a:p>
+                      <a:r>
+                        <a:rPr lang="en-US" dirty="0" smtClean="0"/>
+                        <a:t>85%</a:t>
+                      </a:r>
+                      <a:endParaRPr lang="en-US" dirty="0"/>
+                    </a:p>
+                  </a:txBody>
+                  <a:tcPr/>
+                </a:tc>
+                <a:tc>
+                  <a:txBody>
+                    <a:bodyPr/>
+                    <a:lstStyle/>
+                    <a:p>
+                      <a:r>
+                        <a:rPr lang="en-US" dirty="0" smtClean="0"/>
+                        <a:t>80%</a:t>
+                      </a:r>
+                      <a:endParaRPr lang="en-US" dirty="0"/>
+                    </a:p>
+                  </a:txBody>
+                  <a:tcPr/>
+                </a:tc>
+                <a:tc>
+                  <a:txBody>
+                    <a:bodyPr/>
+                    <a:lstStyle/>
+                    <a:p>
+                      <a:r>
+                        <a:rPr lang="en-US" dirty="0" smtClean="0"/>
+                        <a:t>70%</a:t>
+                      </a:r>
+                      <a:endParaRPr lang="en-US" dirty="0"/>
+                    </a:p>
+                  </a:txBody>
+                  <a:tcPr/>
+                </a:tc>
+                <a:tc>
+                  <a:txBody>
+                    <a:bodyPr/>
+                    <a:lstStyle/>
+                    <a:p>
+                      <a:r>
+                        <a:rPr lang="en-US" dirty="0" smtClean="0"/>
+                        <a:t>60%</a:t>
+                      </a:r>
+                      <a:endParaRPr lang="en-US" dirty="0"/>
+                    </a:p>
+                  </a:txBody>
+                  <a:tcPr/>
+                </a:tc>
+                <a:tc>
+                  <a:txBody>
+                    <a:bodyPr/>
+                    <a:lstStyle/>
+                    <a:p>
+                      <a:r>
+                        <a:rPr lang="en-US" dirty="0" smtClean="0"/>
+                        <a:t>50%</a:t>
+                      </a:r>
+                      <a:endParaRPr lang="en-US" dirty="0"/>
+                    </a:p>
+                  </a:txBody>
+                  <a:tcPr/>
+                </a:tc>
+              </a:tr>
+              <a:tr h="370840">
+                <a:tc>
+                  <a:txBody>
+                    <a:bodyPr/>
+                    <a:lstStyle/>
+                    <a:p>
+                      <a:r>
+                        <a:rPr lang="en-US" dirty="0" smtClean="0"/>
+                        <a:t>Percent of placements within criterion</a:t>
+                      </a:r>
+                      <a:endParaRPr lang="en-US" dirty="0"/>
+                    </a:p>
+                  </a:txBody>
+                  <a:tcPr/>
+                </a:tc>
+                <a:tc>
+                  <a:txBody>
+                    <a:bodyPr/>
+                    <a:lstStyle/>
+                    <a:p>
+                      <a:r>
+                        <a:rPr lang="en-US" dirty="0" smtClean="0"/>
+                        <a:t>26%</a:t>
+                      </a:r>
+                      <a:endParaRPr lang="en-US" dirty="0"/>
+                    </a:p>
+                  </a:txBody>
+                  <a:tcPr/>
+                </a:tc>
+                <a:tc>
+                  <a:txBody>
+                    <a:bodyPr/>
+                    <a:lstStyle/>
+                    <a:p>
+                      <a:r>
+                        <a:rPr lang="en-US" dirty="0" smtClean="0"/>
+                        <a:t>26%</a:t>
+                      </a:r>
+                      <a:endParaRPr lang="en-US" dirty="0"/>
+                    </a:p>
+                  </a:txBody>
+                  <a:tcPr/>
+                </a:tc>
+                <a:tc>
+                  <a:txBody>
+                    <a:bodyPr/>
+                    <a:lstStyle/>
+                    <a:p>
+                      <a:r>
+                        <a:rPr lang="en-US" dirty="0" smtClean="0"/>
+                        <a:t>40%</a:t>
+                      </a:r>
+                      <a:endParaRPr lang="en-US" dirty="0"/>
+                    </a:p>
+                  </a:txBody>
+                  <a:tcPr/>
+                </a:tc>
+                <a:tc>
+                  <a:txBody>
+                    <a:bodyPr/>
+                    <a:lstStyle/>
+                    <a:p>
+                      <a:r>
+                        <a:rPr lang="en-US" dirty="0" smtClean="0"/>
+                        <a:t>54%</a:t>
+                      </a:r>
+                      <a:endParaRPr lang="en-US" dirty="0"/>
+                    </a:p>
+                  </a:txBody>
+                  <a:tcPr/>
+                </a:tc>
+                <a:tc>
+                  <a:txBody>
+                    <a:bodyPr/>
+                    <a:lstStyle/>
+                    <a:p>
+                      <a:r>
+                        <a:rPr lang="en-US" dirty="0" smtClean="0"/>
+                        <a:t>63%</a:t>
+                      </a:r>
+                      <a:endParaRPr lang="en-US" dirty="0"/>
+                    </a:p>
+                  </a:txBody>
+                  <a:tcPr/>
+                </a:tc>
+                <a:tc>
+                  <a:txBody>
+                    <a:bodyPr/>
+                    <a:lstStyle/>
+                    <a:p>
+                      <a:r>
+                        <a:rPr lang="en-US" dirty="0" smtClean="0"/>
+                        <a:t>75%</a:t>
+                      </a:r>
+                      <a:endParaRPr lang="en-US" dirty="0"/>
+                    </a:p>
+                  </a:txBody>
+                  <a:tcPr/>
+                </a:tc>
+                <a:tc>
+                  <a:txBody>
+                    <a:bodyPr/>
+                    <a:lstStyle/>
+                    <a:p>
+                      <a:r>
+                        <a:rPr lang="en-US" dirty="0" smtClean="0"/>
+                        <a:t>86%</a:t>
+                      </a:r>
+                      <a:endParaRPr lang="en-US" dirty="0"/>
+                    </a:p>
+                  </a:txBody>
+                  <a:tcPr/>
+                </a:tc>
+                <a:tc>
+                  <a:txBody>
+                    <a:bodyPr/>
+                    <a:lstStyle/>
+                    <a:p>
+                      <a:r>
+                        <a:rPr lang="en-US" dirty="0" smtClean="0"/>
+                        <a:t>92%</a:t>
+                      </a:r>
+                      <a:endParaRPr lang="en-US" dirty="0"/>
+                    </a:p>
+                  </a:txBody>
+                  <a:tcPr/>
+                </a:tc>
+              </a:tr>
+            </a:tbl>
+          </a:graphicData>
+        </a:graphic>
+      </p:graphicFrame>
+      <p:graphicFrame>
+        <p:nvGraphicFramePr>
+          <p:cNvPr id="8" name="Content Placeholder 4"/>
+          <p:cNvGraphicFramePr>
+            <a:graphicFrameLocks noGrp="1"/>
+          </p:cNvGraphicFramePr>
+          <p:nvPr>
+            <p:ph idx="1"/>
+            <p:extLst>
+              <p:ext uri="{D42A27DB-BD31-4B8C-83A1-F6EECF244321}">
+                <p14:modId xmlns:p14="http://schemas.microsoft.com/office/powerpoint/2010/main" val="1437990216"/>
+              </p:ext>
+            </p:extLst>
+          </p:nvPr>
+        </p:nvGraphicFramePr>
+        <p:xfrm>
+          <a:off x="838200" y="4859248"/>
+          <a:ext cx="10515600" cy="1828800"/>
+        </p:xfrm>
+        <a:graphic>
+          <a:graphicData uri="http://schemas.openxmlformats.org/drawingml/2006/table">
+            <a:tbl>
+              <a:tblPr firstRow="1" bandRow="1">
+                <a:tableStyleId>{5C22544A-7EE6-4342-B048-85BDC9FD1C3A}</a:tableStyleId>
+              </a:tblPr>
+              <a:tblGrid>
+                <a:gridCol w="1680713"/>
+                <a:gridCol w="1095555"/>
+                <a:gridCol w="1224951"/>
+                <a:gridCol w="1035170"/>
+                <a:gridCol w="1078302"/>
+                <a:gridCol w="1224951"/>
+                <a:gridCol w="1043796"/>
+                <a:gridCol w="963762"/>
+                <a:gridCol w="1168400"/>
+              </a:tblGrid>
+              <a:tr h="370840">
+                <a:tc>
+                  <a:txBody>
+                    <a:bodyPr/>
+                    <a:lstStyle/>
+                    <a:p>
+                      <a:r>
+                        <a:rPr lang="en-US" dirty="0" smtClean="0"/>
+                        <a:t>criterion</a:t>
+                      </a:r>
+                      <a:endParaRPr lang="en-US" dirty="0"/>
+                    </a:p>
+                  </a:txBody>
+                  <a:tcPr/>
+                </a:tc>
+                <a:tc>
+                  <a:txBody>
+                    <a:bodyPr/>
+                    <a:lstStyle/>
+                    <a:p>
+                      <a:r>
+                        <a:rPr lang="en-US" dirty="0" smtClean="0"/>
+                        <a:t>100%  of</a:t>
+                      </a:r>
+                      <a:r>
+                        <a:rPr lang="en-US" baseline="0" dirty="0" smtClean="0"/>
+                        <a:t> days </a:t>
+                      </a:r>
+                      <a:r>
+                        <a:rPr lang="en-US" dirty="0" smtClean="0"/>
+                        <a:t>within</a:t>
+                      </a:r>
+                      <a:endParaRPr lang="en-US" dirty="0"/>
+                    </a:p>
+                  </a:txBody>
+                  <a:tcPr/>
+                </a:tc>
+                <a:tc>
+                  <a:txBody>
+                    <a:bodyPr/>
+                    <a:lstStyle/>
+                    <a:p>
+                      <a:r>
+                        <a:rPr lang="en-US" dirty="0" smtClean="0"/>
+                        <a:t>95% of days within</a:t>
+                      </a:r>
+                      <a:endParaRPr lang="en-US" dirty="0"/>
+                    </a:p>
+                  </a:txBody>
+                  <a:tcPr/>
+                </a:tc>
+                <a:tc>
+                  <a:txBody>
+                    <a:bodyPr/>
+                    <a:lstStyle/>
+                    <a:p>
+                      <a:r>
+                        <a:rPr lang="en-US" dirty="0" smtClean="0"/>
+                        <a:t>90% or more</a:t>
+                      </a:r>
+                      <a:endParaRPr lang="en-US" dirty="0"/>
+                    </a:p>
+                  </a:txBody>
+                  <a:tcPr/>
+                </a:tc>
+                <a:tc>
+                  <a:txBody>
+                    <a:bodyPr/>
+                    <a:lstStyle/>
+                    <a:p>
+                      <a:r>
+                        <a:rPr lang="en-US" dirty="0" smtClean="0"/>
+                        <a:t>85%</a:t>
+                      </a:r>
+                      <a:endParaRPr lang="en-US" dirty="0"/>
+                    </a:p>
+                  </a:txBody>
+                  <a:tcPr/>
+                </a:tc>
+                <a:tc>
+                  <a:txBody>
+                    <a:bodyPr/>
+                    <a:lstStyle/>
+                    <a:p>
+                      <a:r>
+                        <a:rPr lang="en-US" dirty="0" smtClean="0"/>
+                        <a:t>80%</a:t>
+                      </a:r>
+                      <a:endParaRPr lang="en-US" dirty="0"/>
+                    </a:p>
+                  </a:txBody>
+                  <a:tcPr/>
+                </a:tc>
+                <a:tc>
+                  <a:txBody>
+                    <a:bodyPr/>
+                    <a:lstStyle/>
+                    <a:p>
+                      <a:r>
+                        <a:rPr lang="en-US" dirty="0" smtClean="0"/>
+                        <a:t>70%</a:t>
+                      </a:r>
+                      <a:endParaRPr lang="en-US" dirty="0"/>
+                    </a:p>
+                  </a:txBody>
+                  <a:tcPr/>
+                </a:tc>
+                <a:tc>
+                  <a:txBody>
+                    <a:bodyPr/>
+                    <a:lstStyle/>
+                    <a:p>
+                      <a:r>
+                        <a:rPr lang="en-US" dirty="0" smtClean="0"/>
+                        <a:t>60%</a:t>
+                      </a:r>
+                      <a:endParaRPr lang="en-US" dirty="0"/>
+                    </a:p>
+                  </a:txBody>
+                  <a:tcPr/>
+                </a:tc>
+                <a:tc>
+                  <a:txBody>
+                    <a:bodyPr/>
+                    <a:lstStyle/>
+                    <a:p>
+                      <a:r>
+                        <a:rPr lang="en-US" dirty="0" smtClean="0"/>
+                        <a:t>50%</a:t>
+                      </a:r>
+                      <a:endParaRPr lang="en-US" dirty="0"/>
+                    </a:p>
+                  </a:txBody>
+                  <a:tcPr/>
+                </a:tc>
+              </a:tr>
+              <a:tr h="370840">
+                <a:tc>
+                  <a:txBody>
+                    <a:bodyPr/>
+                    <a:lstStyle/>
+                    <a:p>
+                      <a:r>
+                        <a:rPr lang="en-US" dirty="0" smtClean="0"/>
+                        <a:t>Percent of placements within criterion</a:t>
+                      </a:r>
+                      <a:endParaRPr lang="en-US" dirty="0"/>
+                    </a:p>
+                  </a:txBody>
+                  <a:tcPr/>
+                </a:tc>
+                <a:tc>
+                  <a:txBody>
+                    <a:bodyPr/>
+                    <a:lstStyle/>
+                    <a:p>
+                      <a:r>
+                        <a:rPr lang="en-US" dirty="0" smtClean="0"/>
+                        <a:t>62%</a:t>
+                      </a:r>
+                      <a:endParaRPr lang="en-US" dirty="0"/>
+                    </a:p>
+                  </a:txBody>
+                  <a:tcPr/>
+                </a:tc>
+                <a:tc>
+                  <a:txBody>
+                    <a:bodyPr/>
+                    <a:lstStyle/>
+                    <a:p>
+                      <a:r>
+                        <a:rPr lang="en-US" dirty="0" smtClean="0"/>
+                        <a:t>62%</a:t>
+                      </a:r>
+                      <a:endParaRPr lang="en-US" dirty="0"/>
+                    </a:p>
+                  </a:txBody>
+                  <a:tcPr/>
+                </a:tc>
+                <a:tc>
+                  <a:txBody>
+                    <a:bodyPr/>
+                    <a:lstStyle/>
+                    <a:p>
+                      <a:r>
+                        <a:rPr lang="en-US" dirty="0" smtClean="0"/>
+                        <a:t>80%</a:t>
+                      </a:r>
+                      <a:endParaRPr lang="en-US" dirty="0"/>
+                    </a:p>
+                  </a:txBody>
+                  <a:tcPr/>
+                </a:tc>
+                <a:tc>
+                  <a:txBody>
+                    <a:bodyPr/>
+                    <a:lstStyle/>
+                    <a:p>
+                      <a:r>
+                        <a:rPr lang="en-US" dirty="0" smtClean="0"/>
+                        <a:t>86%</a:t>
+                      </a:r>
+                      <a:endParaRPr lang="en-US" dirty="0"/>
+                    </a:p>
+                  </a:txBody>
+                  <a:tcPr/>
+                </a:tc>
+                <a:tc>
+                  <a:txBody>
+                    <a:bodyPr/>
+                    <a:lstStyle/>
+                    <a:p>
+                      <a:r>
+                        <a:rPr lang="en-US" dirty="0" smtClean="0"/>
+                        <a:t>90%</a:t>
+                      </a:r>
+                      <a:endParaRPr lang="en-US" dirty="0"/>
+                    </a:p>
+                  </a:txBody>
+                  <a:tcPr/>
+                </a:tc>
+                <a:tc>
+                  <a:txBody>
+                    <a:bodyPr/>
+                    <a:lstStyle/>
+                    <a:p>
+                      <a:r>
+                        <a:rPr lang="en-US" dirty="0" smtClean="0"/>
+                        <a:t>94%</a:t>
+                      </a:r>
+                      <a:endParaRPr lang="en-US" dirty="0"/>
+                    </a:p>
+                  </a:txBody>
+                  <a:tcPr/>
+                </a:tc>
+                <a:tc>
+                  <a:txBody>
+                    <a:bodyPr/>
+                    <a:lstStyle/>
+                    <a:p>
+                      <a:r>
+                        <a:rPr lang="en-US" dirty="0" smtClean="0"/>
+                        <a:t>98%</a:t>
+                      </a:r>
+                      <a:endParaRPr lang="en-US" dirty="0"/>
+                    </a:p>
+                  </a:txBody>
+                  <a:tcPr/>
+                </a:tc>
+                <a:tc>
+                  <a:txBody>
+                    <a:bodyPr/>
+                    <a:lstStyle/>
+                    <a:p>
+                      <a:r>
+                        <a:rPr lang="en-US" dirty="0" smtClean="0"/>
+                        <a:t>99%</a:t>
+                      </a:r>
+                      <a:endParaRPr lang="en-US" dirty="0"/>
+                    </a:p>
+                  </a:txBody>
+                  <a:tcPr/>
+                </a:tc>
+              </a:tr>
+            </a:tbl>
+          </a:graphicData>
+        </a:graphic>
+      </p:graphicFrame>
+      <p:sp>
+        <p:nvSpPr>
+          <p:cNvPr id="9" name="Title 1"/>
+          <p:cNvSpPr txBox="1">
+            <a:spLocks/>
+          </p:cNvSpPr>
+          <p:nvPr/>
+        </p:nvSpPr>
+        <p:spPr>
+          <a:xfrm>
+            <a:off x="838200" y="3533685"/>
+            <a:ext cx="10515600" cy="1325563"/>
+          </a:xfrm>
+          <a:prstGeom prst="rect">
+            <a:avLst/>
+          </a:prstGeom>
+        </p:spPr>
+        <p:txBody>
+          <a:bodyPr vert="horz" lIns="91440" tIns="45720" rIns="91440" bIns="45720" rtlCol="0" anchor="ctr">
+            <a:normAutofit/>
+          </a:bodyPr>
+          <a:lstStyle>
+            <a:lvl1pPr algn="l" defTabSz="914400" rtl="0" eaLnBrk="1" latinLnBrk="0" hangingPunct="1">
+              <a:lnSpc>
+                <a:spcPct val="90000"/>
+              </a:lnSpc>
+              <a:spcBef>
+                <a:spcPct val="0"/>
+              </a:spcBef>
+              <a:buNone/>
+              <a:defRPr sz="4400" kern="1200">
+                <a:solidFill>
+                  <a:schemeClr val="tx1"/>
+                </a:solidFill>
+                <a:latin typeface="+mj-lt"/>
+                <a:ea typeface="+mj-ea"/>
+                <a:cs typeface="+mj-cs"/>
+              </a:defRPr>
+            </a:lvl1pPr>
+          </a:lstStyle>
+          <a:p>
+            <a:r>
+              <a:rPr lang="en-US" dirty="0" smtClean="0"/>
+              <a:t>Ratio of placement </a:t>
+            </a:r>
+            <a:r>
+              <a:rPr lang="en-US" dirty="0"/>
+              <a:t>by frequency </a:t>
+            </a:r>
+            <a:r>
+              <a:rPr lang="en-US" dirty="0" smtClean="0"/>
+              <a:t>of: days within </a:t>
+            </a:r>
+            <a:r>
+              <a:rPr lang="en-US" dirty="0"/>
+              <a:t>20% of actual value </a:t>
+            </a:r>
+          </a:p>
+        </p:txBody>
+      </p:sp>
+    </p:spTree>
+    <p:extLst>
+      <p:ext uri="{BB962C8B-B14F-4D97-AF65-F5344CB8AC3E}">
+        <p14:creationId xmlns:p14="http://schemas.microsoft.com/office/powerpoint/2010/main" val="4048368938"/>
+      </p:ext>
+    </p:extLst>
+  </p:cSld>
+  <p:clrMapOvr>
+    <a:masterClrMapping/>
+  </p:clrMapOvr>
+  <p:timing>
+    <p:tnLst>
+      <p:par>
+        <p:cTn id="1" dur="indefinite" restart="never" nodeType="tmRoot"/>
+      </p:par>
+    </p:tnLst>
+  </p:timing>
+</p:sld>
+</file>
+
+<file path=ppt/slides/slide7.xml><?xml version="1.0" encoding="utf-8"?>
+<p:sld xmlns:a="http://schemas.openxmlformats.org/drawingml/2006/main" xmlns:r="http://schemas.openxmlformats.org/officeDocument/2006/relationships" xmlns:p="http://schemas.openxmlformats.org/presentationml/2006/main">
+  <p:cSld>
+    <p:spTree>
+      <p:nvGrpSpPr>
+        <p:cNvPr id="1" name=""/>
+        <p:cNvGrpSpPr/>
+        <p:nvPr/>
+      </p:nvGrpSpPr>
+      <p:grpSpPr>
+        <a:xfrm>
+          <a:off x="0" y="0"/>
+          <a:ext cx="0" cy="0"/>
+          <a:chOff x="0" y="0"/>
+          <a:chExt cx="0" cy="0"/>
+        </a:xfrm>
+      </p:grpSpPr>
+      <p:sp>
+        <p:nvSpPr>
+          <p:cNvPr id="2" name="Title 1"/>
+          <p:cNvSpPr>
+            <a:spLocks noGrp="1"/>
+          </p:cNvSpPr>
+          <p:nvPr>
+            <p:ph type="title"/>
+          </p:nvPr>
+        </p:nvSpPr>
+        <p:spPr>
+          <a:xfrm>
+            <a:off x="838200" y="0"/>
+            <a:ext cx="10515600" cy="1325563"/>
+          </a:xfrm>
+        </p:spPr>
+        <p:txBody>
+          <a:bodyPr/>
+          <a:lstStyle/>
+          <a:p>
+            <a:r>
+              <a:rPr lang="en-US" dirty="0" smtClean="0"/>
+              <a:t>Another View</a:t>
+            </a:r>
+            <a:endParaRPr lang="en-US" dirty="0"/>
+          </a:p>
+        </p:txBody>
+      </p:sp>
+      <p:sp>
+        <p:nvSpPr>
+          <p:cNvPr id="3" name="Content Placeholder 2"/>
+          <p:cNvSpPr>
+            <a:spLocks noGrp="1"/>
+          </p:cNvSpPr>
+          <p:nvPr>
+            <p:ph idx="1"/>
+          </p:nvPr>
+        </p:nvSpPr>
+        <p:spPr>
+          <a:xfrm>
+            <a:off x="838200" y="1204523"/>
+            <a:ext cx="10515600" cy="2625605"/>
+          </a:xfrm>
+        </p:spPr>
+        <p:txBody>
+          <a:bodyPr>
+            <a:normAutofit/>
+          </a:bodyPr>
+          <a:lstStyle/>
+          <a:p>
+            <a:pPr marL="0" indent="0">
+              <a:buNone/>
+            </a:pPr>
+            <a:r>
+              <a:rPr lang="en-US" dirty="0" smtClean="0"/>
+              <a:t>If you’re a publisher, you can expect</a:t>
+            </a:r>
+          </a:p>
+          <a:p>
+            <a:r>
+              <a:rPr lang="en-US" dirty="0" smtClean="0"/>
+              <a:t>Accuracy level expected in 70% of days on 70% of placements: ±10%</a:t>
+            </a:r>
+          </a:p>
+          <a:p>
+            <a:r>
+              <a:rPr lang="en-US" dirty="0"/>
+              <a:t>Accuracy </a:t>
+            </a:r>
+            <a:r>
+              <a:rPr lang="en-US" dirty="0" smtClean="0"/>
+              <a:t>level expected </a:t>
+            </a:r>
+            <a:r>
+              <a:rPr lang="en-US" dirty="0"/>
+              <a:t>in </a:t>
+            </a:r>
+            <a:r>
+              <a:rPr lang="en-US" dirty="0" smtClean="0"/>
+              <a:t>80</a:t>
+            </a:r>
+            <a:r>
+              <a:rPr lang="en-US" dirty="0"/>
+              <a:t>% of days on </a:t>
+            </a:r>
+            <a:r>
+              <a:rPr lang="en-US" dirty="0" smtClean="0"/>
+              <a:t>80</a:t>
+            </a:r>
+            <a:r>
+              <a:rPr lang="en-US" dirty="0"/>
+              <a:t>% of placements: </a:t>
+            </a:r>
+            <a:r>
+              <a:rPr lang="en-US" dirty="0" smtClean="0"/>
+              <a:t>±15%</a:t>
+            </a:r>
+          </a:p>
+          <a:p>
+            <a:r>
+              <a:rPr lang="en-US" dirty="0"/>
+              <a:t>Accuracy </a:t>
+            </a:r>
+            <a:r>
+              <a:rPr lang="en-US" dirty="0" smtClean="0"/>
+              <a:t>level expected </a:t>
+            </a:r>
+            <a:r>
+              <a:rPr lang="en-US" dirty="0"/>
+              <a:t>in </a:t>
+            </a:r>
+            <a:r>
+              <a:rPr lang="en-US" dirty="0" smtClean="0"/>
+              <a:t>90</a:t>
+            </a:r>
+            <a:r>
+              <a:rPr lang="en-US" dirty="0"/>
+              <a:t>% of days on </a:t>
+            </a:r>
+            <a:r>
+              <a:rPr lang="en-US" dirty="0" smtClean="0"/>
+              <a:t>90</a:t>
+            </a:r>
+            <a:r>
+              <a:rPr lang="en-US" dirty="0"/>
+              <a:t>% of placements: </a:t>
+            </a:r>
+            <a:r>
+              <a:rPr lang="en-US" dirty="0" smtClean="0"/>
+              <a:t>±25%</a:t>
+            </a:r>
+            <a:endParaRPr lang="en-US" dirty="0"/>
+          </a:p>
+          <a:p>
+            <a:r>
+              <a:rPr lang="en-US" dirty="0" smtClean="0"/>
+              <a:t>Pending examination of within-publisher correlation</a:t>
+            </a:r>
+          </a:p>
+          <a:p>
+            <a:endParaRPr lang="en-US" dirty="0"/>
+          </a:p>
+        </p:txBody>
+      </p:sp>
+      <p:graphicFrame>
+        <p:nvGraphicFramePr>
+          <p:cNvPr id="5" name="Table 4"/>
+          <p:cNvGraphicFramePr>
+            <a:graphicFrameLocks noGrp="1"/>
+          </p:cNvGraphicFramePr>
+          <p:nvPr>
+            <p:extLst>
+              <p:ext uri="{D42A27DB-BD31-4B8C-83A1-F6EECF244321}">
+                <p14:modId xmlns:p14="http://schemas.microsoft.com/office/powerpoint/2010/main" val="1182388990"/>
+              </p:ext>
+            </p:extLst>
+          </p:nvPr>
+        </p:nvGraphicFramePr>
+        <p:xfrm>
+          <a:off x="1229743" y="4446277"/>
+          <a:ext cx="8128000" cy="1483360"/>
+        </p:xfrm>
+        <a:graphic>
+          <a:graphicData uri="http://schemas.openxmlformats.org/drawingml/2006/table">
+            <a:tbl>
+              <a:tblPr firstRow="1" bandRow="1">
+                <a:tableStyleId>{5C22544A-7EE6-4342-B048-85BDC9FD1C3A}</a:tableStyleId>
+              </a:tblPr>
+              <a:tblGrid>
+                <a:gridCol w="2177691"/>
+                <a:gridCol w="1886309"/>
+                <a:gridCol w="2032000"/>
+                <a:gridCol w="2032000"/>
+              </a:tblGrid>
+              <a:tr h="370840">
+                <a:tc>
+                  <a:txBody>
+                    <a:bodyPr/>
+                    <a:lstStyle/>
+                    <a:p>
+                      <a:r>
+                        <a:rPr lang="en-US" dirty="0" smtClean="0"/>
+                        <a:t>\/ Days</a:t>
+                      </a:r>
+                      <a:r>
+                        <a:rPr lang="en-US" baseline="0" dirty="0" smtClean="0"/>
+                        <a:t> \ placements</a:t>
+                      </a:r>
+                      <a:endParaRPr lang="en-US" dirty="0"/>
+                    </a:p>
+                  </a:txBody>
+                  <a:tcPr/>
+                </a:tc>
+                <a:tc>
+                  <a:txBody>
+                    <a:bodyPr/>
+                    <a:lstStyle/>
+                    <a:p>
+                      <a:r>
+                        <a:rPr lang="en-US" dirty="0" smtClean="0"/>
+                        <a:t>70</a:t>
+                      </a:r>
+                      <a:endParaRPr lang="en-US" dirty="0"/>
+                    </a:p>
+                  </a:txBody>
+                  <a:tcPr/>
+                </a:tc>
+                <a:tc>
+                  <a:txBody>
+                    <a:bodyPr/>
+                    <a:lstStyle/>
+                    <a:p>
+                      <a:r>
+                        <a:rPr lang="en-US" dirty="0" smtClean="0"/>
+                        <a:t>80</a:t>
+                      </a:r>
+                      <a:endParaRPr lang="en-US" dirty="0"/>
+                    </a:p>
+                  </a:txBody>
+                  <a:tcPr/>
+                </a:tc>
+                <a:tc>
+                  <a:txBody>
+                    <a:bodyPr/>
+                    <a:lstStyle/>
+                    <a:p>
+                      <a:r>
+                        <a:rPr lang="en-US" dirty="0" smtClean="0"/>
+                        <a:t>90</a:t>
+                      </a:r>
+                      <a:endParaRPr lang="en-US" dirty="0"/>
+                    </a:p>
+                  </a:txBody>
+                  <a:tcPr/>
+                </a:tc>
+              </a:tr>
+              <a:tr h="370840">
+                <a:tc>
+                  <a:txBody>
+                    <a:bodyPr/>
+                    <a:lstStyle/>
+                    <a:p>
+                      <a:r>
+                        <a:rPr lang="en-US" dirty="0" smtClean="0"/>
+                        <a:t>70</a:t>
+                      </a:r>
+                      <a:endParaRPr lang="en-US" dirty="0"/>
+                    </a:p>
+                  </a:txBody>
+                  <a:tcPr/>
+                </a:tc>
+                <a:tc>
+                  <a:txBody>
+                    <a:bodyPr/>
+                    <a:lstStyle/>
+                    <a:p>
+                      <a:r>
+                        <a:rPr lang="en-US" dirty="0" smtClean="0"/>
+                        <a:t>±10%</a:t>
+                      </a:r>
+                      <a:endParaRPr lang="en-US" dirty="0"/>
+                    </a:p>
+                  </a:txBody>
+                  <a:tcPr/>
+                </a:tc>
+                <a:tc>
+                  <a:txBody>
+                    <a:bodyPr/>
+                    <a:lstStyle/>
+                    <a:p>
+                      <a:r>
+                        <a:rPr lang="en-US" dirty="0" smtClean="0"/>
+                        <a:t>±12%</a:t>
+                      </a:r>
+                      <a:endParaRPr lang="en-US" dirty="0"/>
+                    </a:p>
+                  </a:txBody>
+                  <a:tcPr/>
+                </a:tc>
+                <a:tc>
+                  <a:txBody>
+                    <a:bodyPr/>
+                    <a:lstStyle/>
+                    <a:p>
+                      <a:r>
+                        <a:rPr lang="en-US" dirty="0" smtClean="0"/>
+                        <a:t>±17%</a:t>
+                      </a:r>
+                      <a:endParaRPr lang="en-US" dirty="0"/>
+                    </a:p>
+                  </a:txBody>
+                  <a:tcPr/>
+                </a:tc>
+              </a:tr>
+              <a:tr h="370840">
+                <a:tc>
+                  <a:txBody>
+                    <a:bodyPr/>
+                    <a:lstStyle/>
+                    <a:p>
+                      <a:r>
+                        <a:rPr lang="en-US" dirty="0" smtClean="0"/>
+                        <a:t>80</a:t>
+                      </a:r>
+                      <a:endParaRPr lang="en-US" dirty="0"/>
+                    </a:p>
+                  </a:txBody>
+                  <a:tcPr/>
+                </a:tc>
+                <a:tc>
+                  <a:txBody>
+                    <a:bodyPr/>
+                    <a:lstStyle/>
+                    <a:p>
+                      <a:r>
+                        <a:rPr lang="en-US" dirty="0" smtClean="0"/>
+                        <a:t>±12%</a:t>
+                      </a:r>
+                      <a:endParaRPr lang="en-US" dirty="0"/>
+                    </a:p>
+                  </a:txBody>
+                  <a:tcPr/>
+                </a:tc>
+                <a:tc>
+                  <a:txBody>
+                    <a:bodyPr/>
+                    <a:lstStyle/>
+                    <a:p>
+                      <a:r>
+                        <a:rPr lang="en-US" dirty="0" smtClean="0"/>
+                        <a:t>±15%</a:t>
+                      </a:r>
+                      <a:endParaRPr lang="en-US" dirty="0"/>
+                    </a:p>
+                  </a:txBody>
+                  <a:tcPr/>
+                </a:tc>
+                <a:tc>
+                  <a:txBody>
+                    <a:bodyPr/>
+                    <a:lstStyle/>
+                    <a:p>
+                      <a:r>
+                        <a:rPr lang="en-US" dirty="0" smtClean="0"/>
+                        <a:t>±21%</a:t>
+                      </a:r>
+                      <a:endParaRPr lang="en-US" dirty="0"/>
+                    </a:p>
+                  </a:txBody>
+                  <a:tcPr/>
+                </a:tc>
+              </a:tr>
+              <a:tr h="370840">
+                <a:tc>
+                  <a:txBody>
+                    <a:bodyPr/>
+                    <a:lstStyle/>
+                    <a:p>
+                      <a:r>
+                        <a:rPr lang="en-US" dirty="0" smtClean="0"/>
+                        <a:t>90</a:t>
+                      </a:r>
+                      <a:endParaRPr lang="en-US" dirty="0"/>
+                    </a:p>
+                  </a:txBody>
+                  <a:tcPr/>
+                </a:tc>
+                <a:tc>
+                  <a:txBody>
+                    <a:bodyPr/>
+                    <a:lstStyle/>
+                    <a:p>
+                      <a:r>
+                        <a:rPr lang="en-US" dirty="0" smtClean="0"/>
+                        <a:t>±15%</a:t>
+                      </a:r>
+                      <a:endParaRPr lang="en-US" dirty="0"/>
+                    </a:p>
+                  </a:txBody>
+                  <a:tcPr/>
+                </a:tc>
+                <a:tc>
+                  <a:txBody>
+                    <a:bodyPr/>
+                    <a:lstStyle/>
+                    <a:p>
+                      <a:r>
+                        <a:rPr lang="en-US" dirty="0" smtClean="0"/>
+                        <a:t>±19%</a:t>
+                      </a:r>
+                      <a:endParaRPr lang="en-US" dirty="0"/>
+                    </a:p>
+                  </a:txBody>
+                  <a:tcPr/>
+                </a:tc>
+                <a:tc>
+                  <a:txBody>
+                    <a:bodyPr/>
+                    <a:lstStyle/>
+                    <a:p>
+                      <a:r>
+                        <a:rPr lang="en-US" smtClean="0"/>
+                        <a:t>±25%</a:t>
+                      </a:r>
+                      <a:endParaRPr lang="en-US" dirty="0"/>
+                    </a:p>
+                  </a:txBody>
+                  <a:tcPr/>
+                </a:tc>
+              </a:tr>
+            </a:tbl>
+          </a:graphicData>
+        </a:graphic>
+      </p:graphicFrame>
+    </p:spTree>
+    <p:extLst>
+      <p:ext uri="{BB962C8B-B14F-4D97-AF65-F5344CB8AC3E}">
+        <p14:creationId xmlns:p14="http://schemas.microsoft.com/office/powerpoint/2010/main" val="3851021567"/>
+      </p:ext>
+    </p:extLst>
+  </p:cSld>
+  <p:clrMapOvr>
+    <a:masterClrMapping/>
+  </p:clrMapOvr>
+  <p:timing>
+    <p:tnLst>
+      <p:par>
+        <p:cTn id="1" dur="indefinite" restart="never" nodeType="tmRoot"/>
+      </p:par>
+    </p:tnLst>
+  </p:timing>
+</p:sld>
+</file>
+
+<file path=ppt/slides/slide8.xml><?xml version="1.0" encoding="utf-8"?>
+<p:sld xmlns:a="http://schemas.openxmlformats.org/drawingml/2006/main" xmlns:r="http://schemas.openxmlformats.org/officeDocument/2006/relationships" xmlns:p="http://schemas.openxmlformats.org/presentationml/2006/main" show="0">
   <p:cSld>
     <p:spTree>
       <p:nvGrpSpPr>
@@ -4069,926 +6900,14 @@
   <p:clrMapOvr>
     <a:masterClrMapping/>
   </p:clrMapOvr>
-  <p:timing>
-    <p:tnLst>
-      <p:par>
-        <p:cTn id="1" dur="indefinite" restart="never" nodeType="tmRoot"/>
-      </p:par>
-    </p:tnLst>
-  </p:timing>
-</p:sld>
-</file>
-
-<file path=ppt/slides/slide6.xml><?xml version="1.0" encoding="utf-8"?>
-<p:sld xmlns:a="http://schemas.openxmlformats.org/drawingml/2006/main" xmlns:r="http://schemas.openxmlformats.org/officeDocument/2006/relationships" xmlns:p="http://schemas.openxmlformats.org/presentationml/2006/main">
-  <p:cSld>
-    <p:spTree>
-      <p:nvGrpSpPr>
-        <p:cNvPr id="1" name=""/>
-        <p:cNvGrpSpPr/>
-        <p:nvPr/>
-      </p:nvGrpSpPr>
-      <p:grpSpPr>
-        <a:xfrm>
-          <a:off x="0" y="0"/>
-          <a:ext cx="0" cy="0"/>
-          <a:chOff x="0" y="0"/>
-          <a:chExt cx="0" cy="0"/>
-        </a:xfrm>
-      </p:grpSpPr>
-      <p:sp>
-        <p:nvSpPr>
-          <p:cNvPr id="2" name="Title 1"/>
-          <p:cNvSpPr>
-            <a:spLocks noGrp="1"/>
-          </p:cNvSpPr>
-          <p:nvPr>
-            <p:ph type="title"/>
-          </p:nvPr>
-        </p:nvSpPr>
-        <p:spPr/>
-        <p:txBody>
-          <a:bodyPr/>
-          <a:lstStyle/>
-          <a:p>
-            <a:r>
-              <a:rPr lang="en-US" dirty="0" smtClean="0"/>
-              <a:t>Important notes</a:t>
-            </a:r>
-            <a:endParaRPr lang="en-US" dirty="0"/>
-          </a:p>
-        </p:txBody>
-      </p:sp>
-      <p:sp>
-        <p:nvSpPr>
-          <p:cNvPr id="3" name="Content Placeholder 2"/>
-          <p:cNvSpPr>
-            <a:spLocks noGrp="1"/>
-          </p:cNvSpPr>
-          <p:nvPr>
-            <p:ph idx="1"/>
-          </p:nvPr>
-        </p:nvSpPr>
-        <p:spPr/>
-        <p:txBody>
-          <a:bodyPr>
-            <a:normAutofit fontScale="92500"/>
-          </a:bodyPr>
-          <a:lstStyle/>
-          <a:p>
-            <a:r>
-              <a:rPr lang="en-US" dirty="0" smtClean="0"/>
-              <a:t>For the dates 3/3 – 5/3, far fewer served events appeared in RS than actual number. This affected almost all placements and networks.  “Representation rate” dropped on these days from around 90% to about 40%. These dates were ignored in the analysis presented in earlier slides.</a:t>
-            </a:r>
-          </a:p>
-          <a:p>
-            <a:r>
-              <a:rPr lang="en-US" dirty="0" smtClean="0"/>
-              <a:t>AOL deviations have a similar pattern (deviation per day) across many placements from several users. This non-random effect should be investigated. See next slide.</a:t>
-            </a:r>
-          </a:p>
-          <a:p>
-            <a:r>
-              <a:rPr lang="en-US" dirty="0" err="1" smtClean="0"/>
-              <a:t>Smaato</a:t>
-            </a:r>
-            <a:r>
-              <a:rPr lang="en-US" dirty="0" smtClean="0"/>
-              <a:t> deviation is -98%, i.e. less than 2% of served events are detected.</a:t>
-            </a:r>
-          </a:p>
-          <a:p>
-            <a:r>
-              <a:rPr lang="en-US" dirty="0" err="1" smtClean="0"/>
-              <a:t>MySql</a:t>
-            </a:r>
-            <a:r>
-              <a:rPr lang="en-US" dirty="0" smtClean="0"/>
-              <a:t> data was substantially incomplete for both 13/3 and 14/3 (data was retrieved early afternoon on 15/3).</a:t>
-            </a:r>
-          </a:p>
-        </p:txBody>
-      </p:sp>
-    </p:spTree>
-    <p:extLst>
-      <p:ext uri="{BB962C8B-B14F-4D97-AF65-F5344CB8AC3E}">
-        <p14:creationId xmlns:p14="http://schemas.microsoft.com/office/powerpoint/2010/main" val="1036927113"/>
-      </p:ext>
-    </p:extLst>
-  </p:cSld>
-  <p:clrMapOvr>
-    <a:masterClrMapping/>
-  </p:clrMapOvr>
-  <p:timing>
-    <p:tnLst>
-      <p:par>
-        <p:cTn id="1" dur="indefinite" restart="never" nodeType="tmRoot"/>
-      </p:par>
-    </p:tnLst>
-  </p:timing>
-</p:sld>
-</file>
-
-<file path=ppt/slides/slide7.xml><?xml version="1.0" encoding="utf-8"?>
-<p:sld xmlns:a="http://schemas.openxmlformats.org/drawingml/2006/main" xmlns:r="http://schemas.openxmlformats.org/officeDocument/2006/relationships" xmlns:p="http://schemas.openxmlformats.org/presentationml/2006/main">
-  <p:cSld>
-    <p:spTree>
-      <p:nvGrpSpPr>
-        <p:cNvPr id="1" name=""/>
-        <p:cNvGrpSpPr/>
-        <p:nvPr/>
-      </p:nvGrpSpPr>
-      <p:grpSpPr>
-        <a:xfrm>
-          <a:off x="0" y="0"/>
-          <a:ext cx="0" cy="0"/>
-          <a:chOff x="0" y="0"/>
-          <a:chExt cx="0" cy="0"/>
-        </a:xfrm>
-      </p:grpSpPr>
-      <p:sp>
-        <p:nvSpPr>
-          <p:cNvPr id="2" name="Title 1"/>
-          <p:cNvSpPr>
-            <a:spLocks noGrp="1"/>
-          </p:cNvSpPr>
-          <p:nvPr>
-            <p:ph type="ctrTitle"/>
-          </p:nvPr>
-        </p:nvSpPr>
-        <p:spPr/>
-        <p:txBody>
-          <a:bodyPr/>
-          <a:lstStyle/>
-          <a:p>
-            <a:endParaRPr lang="en-US"/>
-          </a:p>
-        </p:txBody>
-      </p:sp>
-      <p:sp>
-        <p:nvSpPr>
-          <p:cNvPr id="3" name="Subtitle 2"/>
-          <p:cNvSpPr>
-            <a:spLocks noGrp="1"/>
-          </p:cNvSpPr>
-          <p:nvPr>
-            <p:ph type="subTitle" idx="1"/>
-          </p:nvPr>
-        </p:nvSpPr>
-        <p:spPr/>
-        <p:txBody>
-          <a:bodyPr/>
-          <a:lstStyle/>
-          <a:p>
-            <a:endParaRPr lang="en-US"/>
-          </a:p>
-        </p:txBody>
-      </p:sp>
-      <p:pic>
-        <p:nvPicPr>
-          <p:cNvPr id="5" name="Picture 4"/>
-          <p:cNvPicPr>
-            <a:picLocks noChangeAspect="1"/>
-          </p:cNvPicPr>
-          <p:nvPr/>
-        </p:nvPicPr>
-        <p:blipFill>
-          <a:blip r:embed="rId2"/>
-          <a:stretch>
-            <a:fillRect/>
-          </a:stretch>
-        </p:blipFill>
-        <p:spPr>
-          <a:xfrm>
-            <a:off x="124905" y="574926"/>
-            <a:ext cx="12207874" cy="6377342"/>
-          </a:xfrm>
-          <a:prstGeom prst="rect">
-            <a:avLst/>
-          </a:prstGeom>
-        </p:spPr>
-      </p:pic>
-      <p:sp>
-        <p:nvSpPr>
-          <p:cNvPr id="4" name="TextBox 3"/>
-          <p:cNvSpPr txBox="1"/>
-          <p:nvPr/>
-        </p:nvSpPr>
-        <p:spPr>
-          <a:xfrm>
-            <a:off x="245098" y="75414"/>
-            <a:ext cx="11946902" cy="646331"/>
-          </a:xfrm>
-          <a:prstGeom prst="rect">
-            <a:avLst/>
-          </a:prstGeom>
-          <a:noFill/>
-        </p:spPr>
-        <p:txBody>
-          <a:bodyPr wrap="square" rtlCol="0">
-            <a:spAutoFit/>
-          </a:bodyPr>
-          <a:lstStyle/>
-          <a:p>
-            <a:r>
-              <a:rPr lang="en-US" dirty="0" smtClean="0"/>
-              <a:t>Deviation time-series: tile = placement, color=network. The “bad days” are the dip in the middle of each x-axis. Placements with similar AOL pattern are circled.</a:t>
-            </a:r>
-            <a:endParaRPr lang="en-US" dirty="0"/>
-          </a:p>
-        </p:txBody>
-      </p:sp>
-      <p:sp>
-        <p:nvSpPr>
-          <p:cNvPr id="6" name="Rectangle 5"/>
-          <p:cNvSpPr/>
-          <p:nvPr/>
-        </p:nvSpPr>
-        <p:spPr>
-          <a:xfrm>
-            <a:off x="8663233" y="556181"/>
-            <a:ext cx="829559" cy="566182"/>
-          </a:xfrm>
-          <a:prstGeom prst="rect">
-            <a:avLst/>
-          </a:prstGeom>
-          <a:noFill/>
-          <a:ln w="19050">
-            <a:solidFill>
-              <a:srgbClr val="FF0000"/>
-            </a:solidFill>
-          </a:ln>
-        </p:spPr>
-        <p:style>
-          <a:lnRef idx="2">
-            <a:schemeClr val="accent1">
-              <a:shade val="50000"/>
-            </a:schemeClr>
-          </a:lnRef>
-          <a:fillRef idx="1">
-            <a:schemeClr val="accent1"/>
-          </a:fillRef>
-          <a:effectRef idx="0">
-            <a:schemeClr val="accent1"/>
-          </a:effectRef>
-          <a:fontRef idx="minor">
-            <a:schemeClr val="lt1"/>
-          </a:fontRef>
-        </p:style>
-        <p:txBody>
-          <a:bodyPr rtlCol="0" anchor="ctr"/>
-          <a:lstStyle/>
-          <a:p>
-            <a:pPr algn="ctr"/>
-            <a:endParaRPr lang="en-US"/>
-          </a:p>
-        </p:txBody>
-      </p:sp>
-      <p:sp>
-        <p:nvSpPr>
-          <p:cNvPr id="8" name="Rectangle 7"/>
-          <p:cNvSpPr/>
-          <p:nvPr/>
-        </p:nvSpPr>
-        <p:spPr>
-          <a:xfrm>
-            <a:off x="9494051" y="557836"/>
-            <a:ext cx="829559" cy="566182"/>
-          </a:xfrm>
-          <a:prstGeom prst="rect">
-            <a:avLst/>
-          </a:prstGeom>
-          <a:noFill/>
-          <a:ln w="19050">
-            <a:solidFill>
-              <a:srgbClr val="FF0000"/>
-            </a:solidFill>
-          </a:ln>
-        </p:spPr>
-        <p:style>
-          <a:lnRef idx="2">
-            <a:schemeClr val="accent1">
-              <a:shade val="50000"/>
-            </a:schemeClr>
-          </a:lnRef>
-          <a:fillRef idx="1">
-            <a:schemeClr val="accent1"/>
-          </a:fillRef>
-          <a:effectRef idx="0">
-            <a:schemeClr val="accent1"/>
-          </a:effectRef>
-          <a:fontRef idx="minor">
-            <a:schemeClr val="lt1"/>
-          </a:fontRef>
-        </p:style>
-        <p:txBody>
-          <a:bodyPr rtlCol="0" anchor="ctr"/>
-          <a:lstStyle/>
-          <a:p>
-            <a:pPr algn="ctr"/>
-            <a:endParaRPr lang="en-US"/>
-          </a:p>
-        </p:txBody>
-      </p:sp>
-      <p:sp>
-        <p:nvSpPr>
-          <p:cNvPr id="9" name="Rectangle 8"/>
-          <p:cNvSpPr/>
-          <p:nvPr/>
-        </p:nvSpPr>
-        <p:spPr>
-          <a:xfrm>
-            <a:off x="9473511" y="1002797"/>
-            <a:ext cx="829559" cy="566182"/>
-          </a:xfrm>
-          <a:prstGeom prst="rect">
-            <a:avLst/>
-          </a:prstGeom>
-          <a:noFill/>
-          <a:ln w="19050">
-            <a:solidFill>
-              <a:srgbClr val="FF0000"/>
-            </a:solidFill>
-          </a:ln>
-        </p:spPr>
-        <p:style>
-          <a:lnRef idx="2">
-            <a:schemeClr val="accent1">
-              <a:shade val="50000"/>
-            </a:schemeClr>
-          </a:lnRef>
-          <a:fillRef idx="1">
-            <a:schemeClr val="accent1"/>
-          </a:fillRef>
-          <a:effectRef idx="0">
-            <a:schemeClr val="accent1"/>
-          </a:effectRef>
-          <a:fontRef idx="minor">
-            <a:schemeClr val="lt1"/>
-          </a:fontRef>
-        </p:style>
-        <p:txBody>
-          <a:bodyPr rtlCol="0" anchor="ctr"/>
-          <a:lstStyle/>
-          <a:p>
-            <a:pPr algn="ctr"/>
-            <a:endParaRPr lang="en-US"/>
-          </a:p>
-        </p:txBody>
-      </p:sp>
-      <p:sp>
-        <p:nvSpPr>
-          <p:cNvPr id="10" name="Rectangle 9"/>
-          <p:cNvSpPr/>
-          <p:nvPr/>
-        </p:nvSpPr>
-        <p:spPr>
-          <a:xfrm>
-            <a:off x="8653593" y="989475"/>
-            <a:ext cx="829559" cy="566182"/>
-          </a:xfrm>
-          <a:prstGeom prst="rect">
-            <a:avLst/>
-          </a:prstGeom>
-          <a:noFill/>
-          <a:ln w="19050">
-            <a:solidFill>
-              <a:srgbClr val="FF0000"/>
-            </a:solidFill>
-          </a:ln>
-        </p:spPr>
-        <p:style>
-          <a:lnRef idx="2">
-            <a:schemeClr val="accent1">
-              <a:shade val="50000"/>
-            </a:schemeClr>
-          </a:lnRef>
-          <a:fillRef idx="1">
-            <a:schemeClr val="accent1"/>
-          </a:fillRef>
-          <a:effectRef idx="0">
-            <a:schemeClr val="accent1"/>
-          </a:effectRef>
-          <a:fontRef idx="minor">
-            <a:schemeClr val="lt1"/>
-          </a:fontRef>
-        </p:style>
-        <p:txBody>
-          <a:bodyPr rtlCol="0" anchor="ctr"/>
-          <a:lstStyle/>
-          <a:p>
-            <a:pPr algn="ctr"/>
-            <a:endParaRPr lang="en-US"/>
-          </a:p>
-        </p:txBody>
-      </p:sp>
-      <p:sp>
-        <p:nvSpPr>
-          <p:cNvPr id="11" name="Rectangle 10"/>
-          <p:cNvSpPr/>
-          <p:nvPr/>
-        </p:nvSpPr>
-        <p:spPr>
-          <a:xfrm>
-            <a:off x="7833675" y="976153"/>
-            <a:ext cx="829559" cy="566182"/>
-          </a:xfrm>
-          <a:prstGeom prst="rect">
-            <a:avLst/>
-          </a:prstGeom>
-          <a:noFill/>
-          <a:ln w="19050">
-            <a:solidFill>
-              <a:srgbClr val="FF0000"/>
-            </a:solidFill>
-          </a:ln>
-        </p:spPr>
-        <p:style>
-          <a:lnRef idx="2">
-            <a:schemeClr val="accent1">
-              <a:shade val="50000"/>
-            </a:schemeClr>
-          </a:lnRef>
-          <a:fillRef idx="1">
-            <a:schemeClr val="accent1"/>
-          </a:fillRef>
-          <a:effectRef idx="0">
-            <a:schemeClr val="accent1"/>
-          </a:effectRef>
-          <a:fontRef idx="minor">
-            <a:schemeClr val="lt1"/>
-          </a:fontRef>
-        </p:style>
-        <p:txBody>
-          <a:bodyPr rtlCol="0" anchor="ctr"/>
-          <a:lstStyle/>
-          <a:p>
-            <a:pPr algn="ctr"/>
-            <a:endParaRPr lang="en-US"/>
-          </a:p>
-        </p:txBody>
-      </p:sp>
-      <p:sp>
-        <p:nvSpPr>
-          <p:cNvPr id="12" name="Rectangle 11"/>
-          <p:cNvSpPr/>
-          <p:nvPr/>
-        </p:nvSpPr>
-        <p:spPr>
-          <a:xfrm>
-            <a:off x="7828224" y="542859"/>
-            <a:ext cx="829559" cy="566182"/>
-          </a:xfrm>
-          <a:prstGeom prst="rect">
-            <a:avLst/>
-          </a:prstGeom>
-          <a:noFill/>
-          <a:ln w="19050">
-            <a:solidFill>
-              <a:srgbClr val="FF0000"/>
-            </a:solidFill>
-          </a:ln>
-        </p:spPr>
-        <p:style>
-          <a:lnRef idx="2">
-            <a:schemeClr val="accent1">
-              <a:shade val="50000"/>
-            </a:schemeClr>
-          </a:lnRef>
-          <a:fillRef idx="1">
-            <a:schemeClr val="accent1"/>
-          </a:fillRef>
-          <a:effectRef idx="0">
-            <a:schemeClr val="accent1"/>
-          </a:effectRef>
-          <a:fontRef idx="minor">
-            <a:schemeClr val="lt1"/>
-          </a:fontRef>
-        </p:style>
-        <p:txBody>
-          <a:bodyPr rtlCol="0" anchor="ctr"/>
-          <a:lstStyle/>
-          <a:p>
-            <a:pPr algn="ctr"/>
-            <a:endParaRPr lang="en-US"/>
-          </a:p>
-        </p:txBody>
-      </p:sp>
-      <p:sp>
-        <p:nvSpPr>
-          <p:cNvPr id="13" name="Rectangle 12"/>
-          <p:cNvSpPr/>
-          <p:nvPr/>
-        </p:nvSpPr>
-        <p:spPr>
-          <a:xfrm>
-            <a:off x="11098711" y="1068639"/>
-            <a:ext cx="829559" cy="566182"/>
-          </a:xfrm>
-          <a:prstGeom prst="rect">
-            <a:avLst/>
-          </a:prstGeom>
-          <a:noFill/>
-          <a:ln w="19050">
-            <a:solidFill>
-              <a:srgbClr val="FF0000"/>
-            </a:solidFill>
-          </a:ln>
-        </p:spPr>
-        <p:style>
-          <a:lnRef idx="2">
-            <a:schemeClr val="accent1">
-              <a:shade val="50000"/>
-            </a:schemeClr>
-          </a:lnRef>
-          <a:fillRef idx="1">
-            <a:schemeClr val="accent1"/>
-          </a:fillRef>
-          <a:effectRef idx="0">
-            <a:schemeClr val="accent1"/>
-          </a:effectRef>
-          <a:fontRef idx="minor">
-            <a:schemeClr val="lt1"/>
-          </a:fontRef>
-        </p:style>
-        <p:txBody>
-          <a:bodyPr rtlCol="0" anchor="ctr"/>
-          <a:lstStyle/>
-          <a:p>
-            <a:pPr algn="ctr"/>
-            <a:endParaRPr lang="en-US"/>
-          </a:p>
-        </p:txBody>
-      </p:sp>
-      <p:sp>
-        <p:nvSpPr>
-          <p:cNvPr id="14" name="Rectangle 13"/>
-          <p:cNvSpPr/>
-          <p:nvPr/>
-        </p:nvSpPr>
-        <p:spPr>
-          <a:xfrm>
-            <a:off x="10303070" y="2316163"/>
-            <a:ext cx="829559" cy="566182"/>
-          </a:xfrm>
-          <a:prstGeom prst="rect">
-            <a:avLst/>
-          </a:prstGeom>
-          <a:noFill/>
-          <a:ln w="19050">
-            <a:solidFill>
-              <a:srgbClr val="FF0000"/>
-            </a:solidFill>
-          </a:ln>
-        </p:spPr>
-        <p:style>
-          <a:lnRef idx="2">
-            <a:schemeClr val="accent1">
-              <a:shade val="50000"/>
-            </a:schemeClr>
-          </a:lnRef>
-          <a:fillRef idx="1">
-            <a:schemeClr val="accent1"/>
-          </a:fillRef>
-          <a:effectRef idx="0">
-            <a:schemeClr val="accent1"/>
-          </a:effectRef>
-          <a:fontRef idx="minor">
-            <a:schemeClr val="lt1"/>
-          </a:fontRef>
-        </p:style>
-        <p:txBody>
-          <a:bodyPr rtlCol="0" anchor="ctr"/>
-          <a:lstStyle/>
-          <a:p>
-            <a:pPr algn="ctr"/>
-            <a:endParaRPr lang="en-US"/>
-          </a:p>
-        </p:txBody>
-      </p:sp>
-      <p:sp>
-        <p:nvSpPr>
-          <p:cNvPr id="15" name="Rectangle 14"/>
-          <p:cNvSpPr/>
-          <p:nvPr/>
-        </p:nvSpPr>
-        <p:spPr>
-          <a:xfrm>
-            <a:off x="9473510" y="4135926"/>
-            <a:ext cx="829559" cy="566182"/>
-          </a:xfrm>
-          <a:prstGeom prst="rect">
-            <a:avLst/>
-          </a:prstGeom>
-          <a:noFill/>
-          <a:ln w="19050">
-            <a:solidFill>
-              <a:srgbClr val="FF0000"/>
-            </a:solidFill>
-          </a:ln>
-        </p:spPr>
-        <p:style>
-          <a:lnRef idx="2">
-            <a:schemeClr val="accent1">
-              <a:shade val="50000"/>
-            </a:schemeClr>
-          </a:lnRef>
-          <a:fillRef idx="1">
-            <a:schemeClr val="accent1"/>
-          </a:fillRef>
-          <a:effectRef idx="0">
-            <a:schemeClr val="accent1"/>
-          </a:effectRef>
-          <a:fontRef idx="minor">
-            <a:schemeClr val="lt1"/>
-          </a:fontRef>
-        </p:style>
-        <p:txBody>
-          <a:bodyPr rtlCol="0" anchor="ctr"/>
-          <a:lstStyle/>
-          <a:p>
-            <a:pPr algn="ctr"/>
-            <a:endParaRPr lang="en-US"/>
-          </a:p>
-        </p:txBody>
-      </p:sp>
-      <p:sp>
-        <p:nvSpPr>
-          <p:cNvPr id="16" name="Rectangle 15"/>
-          <p:cNvSpPr/>
-          <p:nvPr/>
-        </p:nvSpPr>
-        <p:spPr>
-          <a:xfrm>
-            <a:off x="9494051" y="5821943"/>
-            <a:ext cx="829559" cy="566182"/>
-          </a:xfrm>
-          <a:prstGeom prst="rect">
-            <a:avLst/>
-          </a:prstGeom>
-          <a:noFill/>
-          <a:ln w="19050">
-            <a:solidFill>
-              <a:srgbClr val="FF0000"/>
-            </a:solidFill>
-          </a:ln>
-        </p:spPr>
-        <p:style>
-          <a:lnRef idx="2">
-            <a:schemeClr val="accent1">
-              <a:shade val="50000"/>
-            </a:schemeClr>
-          </a:lnRef>
-          <a:fillRef idx="1">
-            <a:schemeClr val="accent1"/>
-          </a:fillRef>
-          <a:effectRef idx="0">
-            <a:schemeClr val="accent1"/>
-          </a:effectRef>
-          <a:fontRef idx="minor">
-            <a:schemeClr val="lt1"/>
-          </a:fontRef>
-        </p:style>
-        <p:txBody>
-          <a:bodyPr rtlCol="0" anchor="ctr"/>
-          <a:lstStyle/>
-          <a:p>
-            <a:pPr algn="ctr"/>
-            <a:endParaRPr lang="en-US"/>
-          </a:p>
-        </p:txBody>
-      </p:sp>
-      <p:sp>
-        <p:nvSpPr>
-          <p:cNvPr id="17" name="Rectangle 16"/>
-          <p:cNvSpPr/>
-          <p:nvPr/>
-        </p:nvSpPr>
-        <p:spPr>
-          <a:xfrm>
-            <a:off x="11098710" y="5914830"/>
-            <a:ext cx="829559" cy="566182"/>
-          </a:xfrm>
-          <a:prstGeom prst="rect">
-            <a:avLst/>
-          </a:prstGeom>
-          <a:noFill/>
-          <a:ln w="19050">
-            <a:solidFill>
-              <a:srgbClr val="FF0000"/>
-            </a:solidFill>
-          </a:ln>
-        </p:spPr>
-        <p:style>
-          <a:lnRef idx="2">
-            <a:schemeClr val="accent1">
-              <a:shade val="50000"/>
-            </a:schemeClr>
-          </a:lnRef>
-          <a:fillRef idx="1">
-            <a:schemeClr val="accent1"/>
-          </a:fillRef>
-          <a:effectRef idx="0">
-            <a:schemeClr val="accent1"/>
-          </a:effectRef>
-          <a:fontRef idx="minor">
-            <a:schemeClr val="lt1"/>
-          </a:fontRef>
-        </p:style>
-        <p:txBody>
-          <a:bodyPr rtlCol="0" anchor="ctr"/>
-          <a:lstStyle/>
-          <a:p>
-            <a:pPr algn="ctr"/>
-            <a:endParaRPr lang="en-US"/>
-          </a:p>
-        </p:txBody>
-      </p:sp>
-      <p:sp>
-        <p:nvSpPr>
-          <p:cNvPr id="18" name="Rectangle 17"/>
-          <p:cNvSpPr/>
-          <p:nvPr/>
-        </p:nvSpPr>
-        <p:spPr>
-          <a:xfrm>
-            <a:off x="1193241" y="2786100"/>
-            <a:ext cx="829559" cy="566182"/>
-          </a:xfrm>
-          <a:prstGeom prst="rect">
-            <a:avLst/>
-          </a:prstGeom>
-          <a:noFill/>
-          <a:ln w="19050">
-            <a:solidFill>
-              <a:srgbClr val="FF0000"/>
-            </a:solidFill>
-          </a:ln>
-        </p:spPr>
-        <p:style>
-          <a:lnRef idx="2">
-            <a:schemeClr val="accent1">
-              <a:shade val="50000"/>
-            </a:schemeClr>
-          </a:lnRef>
-          <a:fillRef idx="1">
-            <a:schemeClr val="accent1"/>
-          </a:fillRef>
-          <a:effectRef idx="0">
-            <a:schemeClr val="accent1"/>
-          </a:effectRef>
-          <a:fontRef idx="minor">
-            <a:schemeClr val="lt1"/>
-          </a:fontRef>
-        </p:style>
-        <p:txBody>
-          <a:bodyPr rtlCol="0" anchor="ctr"/>
-          <a:lstStyle/>
-          <a:p>
-            <a:pPr algn="ctr"/>
-            <a:endParaRPr lang="en-US"/>
-          </a:p>
-        </p:txBody>
-      </p:sp>
-    </p:spTree>
-    <p:extLst>
-      <p:ext uri="{BB962C8B-B14F-4D97-AF65-F5344CB8AC3E}">
-        <p14:creationId xmlns:p14="http://schemas.microsoft.com/office/powerpoint/2010/main" val="2679827199"/>
-      </p:ext>
-    </p:extLst>
-  </p:cSld>
-  <p:clrMapOvr>
-    <a:masterClrMapping/>
-  </p:clrMapOvr>
-  <p:timing>
-    <p:tnLst>
-      <p:par>
-        <p:cTn id="1" dur="indefinite" restart="never" nodeType="tmRoot"/>
-      </p:par>
-    </p:tnLst>
-  </p:timing>
-</p:sld>
-</file>
-
-<file path=ppt/slides/slide8.xml><?xml version="1.0" encoding="utf-8"?>
-<p:sld xmlns:a="http://schemas.openxmlformats.org/drawingml/2006/main" xmlns:r="http://schemas.openxmlformats.org/officeDocument/2006/relationships" xmlns:p="http://schemas.openxmlformats.org/presentationml/2006/main">
-  <p:cSld>
-    <p:spTree>
-      <p:nvGrpSpPr>
-        <p:cNvPr id="1" name=""/>
-        <p:cNvGrpSpPr/>
-        <p:nvPr/>
-      </p:nvGrpSpPr>
-      <p:grpSpPr>
-        <a:xfrm>
-          <a:off x="0" y="0"/>
-          <a:ext cx="0" cy="0"/>
-          <a:chOff x="0" y="0"/>
-          <a:chExt cx="0" cy="0"/>
-        </a:xfrm>
-      </p:grpSpPr>
-      <p:sp>
-        <p:nvSpPr>
-          <p:cNvPr id="2" name="Title 1"/>
-          <p:cNvSpPr>
-            <a:spLocks noGrp="1"/>
-          </p:cNvSpPr>
-          <p:nvPr>
-            <p:ph type="title"/>
-          </p:nvPr>
-        </p:nvSpPr>
-        <p:spPr/>
-        <p:txBody>
-          <a:bodyPr/>
-          <a:lstStyle/>
-          <a:p>
-            <a:endParaRPr lang="en-US"/>
-          </a:p>
-        </p:txBody>
-      </p:sp>
-      <p:sp>
-        <p:nvSpPr>
-          <p:cNvPr id="3" name="Content Placeholder 2"/>
-          <p:cNvSpPr>
-            <a:spLocks noGrp="1"/>
-          </p:cNvSpPr>
-          <p:nvPr>
-            <p:ph idx="1"/>
-          </p:nvPr>
-        </p:nvSpPr>
-        <p:spPr/>
-        <p:txBody>
-          <a:bodyPr/>
-          <a:lstStyle/>
-          <a:p>
-            <a:endParaRPr lang="en-US"/>
-          </a:p>
-        </p:txBody>
-      </p:sp>
-      <p:pic>
-        <p:nvPicPr>
-          <p:cNvPr id="4" name="Picture 3"/>
-          <p:cNvPicPr>
-            <a:picLocks noChangeAspect="1"/>
-          </p:cNvPicPr>
-          <p:nvPr/>
-        </p:nvPicPr>
-        <p:blipFill>
-          <a:blip r:embed="rId2"/>
-          <a:stretch>
-            <a:fillRect/>
-          </a:stretch>
-        </p:blipFill>
-        <p:spPr>
-          <a:xfrm>
-            <a:off x="380999" y="365125"/>
-            <a:ext cx="11551921" cy="6034675"/>
-          </a:xfrm>
-          <a:prstGeom prst="rect">
-            <a:avLst/>
-          </a:prstGeom>
-        </p:spPr>
-      </p:pic>
-      <p:sp>
-        <p:nvSpPr>
-          <p:cNvPr id="5" name="TextBox 4"/>
-          <p:cNvSpPr txBox="1"/>
-          <p:nvPr/>
-        </p:nvSpPr>
-        <p:spPr>
-          <a:xfrm>
-            <a:off x="1300899" y="75414"/>
-            <a:ext cx="8154186" cy="369332"/>
-          </a:xfrm>
-          <a:prstGeom prst="rect">
-            <a:avLst/>
-          </a:prstGeom>
-          <a:noFill/>
-        </p:spPr>
-        <p:txBody>
-          <a:bodyPr wrap="square" rtlCol="0">
-            <a:spAutoFit/>
-          </a:bodyPr>
-          <a:lstStyle/>
-          <a:p>
-            <a:r>
-              <a:rPr lang="en-US" dirty="0" smtClean="0"/>
-              <a:t>served day over day relative change: tile = placement, color=network</a:t>
-            </a:r>
-            <a:endParaRPr lang="en-US" dirty="0"/>
-          </a:p>
-        </p:txBody>
-      </p:sp>
-    </p:spTree>
-    <p:extLst>
-      <p:ext uri="{BB962C8B-B14F-4D97-AF65-F5344CB8AC3E}">
-        <p14:creationId xmlns:p14="http://schemas.microsoft.com/office/powerpoint/2010/main" val="2516549617"/>
-      </p:ext>
-    </p:extLst>
-  </p:cSld>
-  <p:clrMapOvr>
-    <a:masterClrMapping/>
-  </p:clrMapOvr>
+  <mc:AlternateContent xmlns:mc="http://schemas.openxmlformats.org/markup-compatibility/2006" xmlns:p14="http://schemas.microsoft.com/office/powerpoint/2010/main">
+    <mc:Choice Requires="p14">
+      <p:transition spd="slow" p14:dur="2000"/>
+    </mc:Choice>
+    <mc:Fallback xmlns="">
+      <p:transition spd="slow"/>
+    </mc:Fallback>
+  </mc:AlternateContent>
   <p:timing>
     <p:tnLst>
       <p:par>
@@ -5033,7 +6952,7 @@
           <a:p>
             <a:r>
               <a:rPr lang="en-US" dirty="0" smtClean="0"/>
-              <a:t>Technical details</a:t>
+              <a:t>Important notes</a:t>
             </a:r>
             <a:endParaRPr lang="en-US" dirty="0"/>
           </a:p>
@@ -5052,117 +6971,47 @@
         <p:spPr/>
         <p:txBody>
           <a:bodyPr>
-            <a:normAutofit lnSpcReduction="10000"/>
+            <a:normAutofit fontScale="92500"/>
           </a:bodyPr>
           <a:lstStyle/>
           <a:p>
             <a:r>
               <a:rPr lang="en-US" dirty="0" smtClean="0"/>
-              <a:t>RS rows:</a:t>
-            </a:r>
-          </a:p>
-          <a:p>
-            <a:pPr lvl="1"/>
-            <a:r>
-              <a:rPr lang="en-US" dirty="0" smtClean="0"/>
-              <a:t>Total: 25763 </a:t>
-            </a:r>
-          </a:p>
-          <a:p>
-            <a:pPr lvl="1"/>
-            <a:r>
-              <a:rPr lang="en-US" dirty="0" smtClean="0"/>
-              <a:t>Served network == “h”: 5399 </a:t>
-            </a:r>
-          </a:p>
-          <a:p>
-            <a:pPr lvl="1"/>
-            <a:r>
-              <a:rPr lang="en-US" dirty="0" smtClean="0"/>
-              <a:t>Served network blank: 5387 (21%)</a:t>
-            </a:r>
-          </a:p>
-          <a:p>
-            <a:pPr lvl="1"/>
-            <a:r>
-              <a:rPr lang="en-US" dirty="0" smtClean="0">
-                <a:sym typeface="Wingdings" panose="05000000000000000000" pitchFamily="2" charset="2"/>
-              </a:rPr>
-              <a:t>--&gt; </a:t>
-            </a:r>
-            <a:r>
-              <a:rPr lang="en-US" dirty="0" smtClean="0"/>
-              <a:t>Rows expected to be matched in </a:t>
-            </a:r>
+              <a:t>For the dates 3/3 – 5/3, far fewer served events appeared in RS than actual number. This affected almost all placements and networks.  “Representation rate” dropped on these days from around 90% to about 40%. These dates were ignored in the analysis presented in earlier slides.</a:t>
+            </a:r>
+          </a:p>
+          <a:p>
+            <a:r>
+              <a:rPr lang="en-US" dirty="0" smtClean="0"/>
+              <a:t>AOL deviations have a similar pattern (deviation per day) across many placements from several users. This non-random effect should be investigated. See next slide.</a:t>
+            </a:r>
+          </a:p>
+          <a:p>
             <a:r>
               <a:rPr lang="en-US" dirty="0" err="1" smtClean="0"/>
-              <a:t>mysql</a:t>
-            </a:r>
-            <a:r>
-              <a:rPr lang="en-US" dirty="0" smtClean="0"/>
-              <a:t>: 14977</a:t>
-            </a:r>
-          </a:p>
-          <a:p>
-            <a:r>
-              <a:rPr lang="en-US" dirty="0" smtClean="0"/>
-              <a:t>RS rows unmatched by a corresponding </a:t>
-            </a:r>
+              <a:t>Smaato</a:t>
+            </a:r>
+            <a:r>
+              <a:rPr lang="en-US" dirty="0" smtClean="0"/>
+              <a:t> deviation is -98%, i.e. less than 2% of served events are detected.</a:t>
+            </a:r>
+          </a:p>
+          <a:p>
             <a:r>
               <a:rPr lang="en-US" dirty="0" err="1" smtClean="0"/>
               <a:t>MySql</a:t>
             </a:r>
             <a:r>
               <a:rPr lang="en-US" dirty="0" smtClean="0"/>
-              <a:t> row: 999, most of them from 13/3 and 14/3 (data was collected on 15/3). </a:t>
-            </a:r>
-          </a:p>
-          <a:p>
-            <a:r>
-              <a:rPr lang="en-US" dirty="0" smtClean="0"/>
-              <a:t>Rows from </a:t>
-            </a:r>
-            <a:r>
-              <a:rPr lang="en-US" dirty="0" err="1" smtClean="0"/>
-              <a:t>MySql</a:t>
-            </a:r>
-            <a:r>
-              <a:rPr lang="en-US" dirty="0" smtClean="0"/>
-              <a:t> with at least 10 served, but no matching RS data: 22 rows.</a:t>
-            </a:r>
-          </a:p>
-          <a:p>
-            <a:pPr lvl="1"/>
-            <a:r>
-              <a:rPr lang="en-US" dirty="0" smtClean="0"/>
-              <a:t>16 of them are </a:t>
-            </a:r>
-            <a:r>
-              <a:rPr lang="en-US" dirty="0" err="1" smtClean="0"/>
-              <a:t>smaato</a:t>
-            </a:r>
-            <a:r>
-              <a:rPr lang="en-US" dirty="0" smtClean="0"/>
-              <a:t>.</a:t>
-            </a:r>
-          </a:p>
-          <a:p>
-            <a:pPr lvl="1"/>
-            <a:r>
-              <a:rPr lang="en-US" dirty="0" smtClean="0"/>
-              <a:t>Average served count in these 22 unmatched rows: 97.</a:t>
-            </a:r>
-          </a:p>
-          <a:p>
-            <a:pPr lvl="1"/>
-            <a:endParaRPr lang="en-US" dirty="0"/>
+              <a:t> data was substantially incomplete for both 13/3 and 14/3 (data was retrieved early afternoon on 15/3).</a:t>
+            </a:r>
           </a:p>
         </p:txBody>
       </p:sp>
     </p:spTree>
     <p:extLst>
       <p:ext uri="{BB962C8B-B14F-4D97-AF65-F5344CB8AC3E}">
-        <p14:creationId xmlns:p14="http://schemas.microsoft.com/office/powerpoint/2010/main" val="1641192365"/>
+        <p14:creationId xmlns:p14="http://schemas.microsoft.com/office/powerpoint/2010/main" val="1036927113"/>
       </p:ext>
     </p:extLst>
   </p:cSld>

</xml_diff>

<commit_message>
publisher report: calculate prediction error at site level
Former-commit-id: ee20b91c67305f256fe58ad5a9fa3df8e4150ef7
</commit_message>
<xml_diff>
--- a/RedShift/PublisherReport/served 1-day prediction using redshift data.pptx
+++ b/RedShift/PublisherReport/served 1-day prediction using redshift data.pptx
@@ -11,14 +11,15 @@
     <p:sldId id="263" r:id="rId5"/>
     <p:sldId id="264" r:id="rId6"/>
     <p:sldId id="266" r:id="rId7"/>
-    <p:sldId id="267" r:id="rId8"/>
-    <p:sldId id="261" r:id="rId9"/>
-    <p:sldId id="262" r:id="rId10"/>
-    <p:sldId id="256" r:id="rId11"/>
-    <p:sldId id="257" r:id="rId12"/>
-    <p:sldId id="260" r:id="rId13"/>
-    <p:sldId id="268" r:id="rId14"/>
-    <p:sldId id="269" r:id="rId15"/>
+    <p:sldId id="270" r:id="rId8"/>
+    <p:sldId id="267" r:id="rId9"/>
+    <p:sldId id="261" r:id="rId10"/>
+    <p:sldId id="262" r:id="rId11"/>
+    <p:sldId id="256" r:id="rId12"/>
+    <p:sldId id="257" r:id="rId13"/>
+    <p:sldId id="260" r:id="rId14"/>
+    <p:sldId id="268" r:id="rId15"/>
+    <p:sldId id="269" r:id="rId16"/>
   </p:sldIdLst>
   <p:sldSz cx="12192000" cy="6858000"/>
   <p:notesSz cx="6858000" cy="9144000"/>
@@ -256,7 +257,7 @@
           <a:p>
             <a:fld id="{2CD3CBAC-0DE8-4C84-B15C-961A73A0026C}" type="datetimeFigureOut">
               <a:rPr lang="en-US" smtClean="0"/>
-              <a:t>4/4/2016</a:t>
+              <a:t>5/17/2016</a:t>
             </a:fld>
             <a:endParaRPr lang="en-US"/>
           </a:p>
@@ -426,7 +427,7 @@
           <a:p>
             <a:fld id="{2CD3CBAC-0DE8-4C84-B15C-961A73A0026C}" type="datetimeFigureOut">
               <a:rPr lang="en-US" smtClean="0"/>
-              <a:t>4/4/2016</a:t>
+              <a:t>5/17/2016</a:t>
             </a:fld>
             <a:endParaRPr lang="en-US"/>
           </a:p>
@@ -606,7 +607,7 @@
           <a:p>
             <a:fld id="{2CD3CBAC-0DE8-4C84-B15C-961A73A0026C}" type="datetimeFigureOut">
               <a:rPr lang="en-US" smtClean="0"/>
-              <a:t>4/4/2016</a:t>
+              <a:t>5/17/2016</a:t>
             </a:fld>
             <a:endParaRPr lang="en-US"/>
           </a:p>
@@ -776,7 +777,7 @@
           <a:p>
             <a:fld id="{2CD3CBAC-0DE8-4C84-B15C-961A73A0026C}" type="datetimeFigureOut">
               <a:rPr lang="en-US" smtClean="0"/>
-              <a:t>4/4/2016</a:t>
+              <a:t>5/17/2016</a:t>
             </a:fld>
             <a:endParaRPr lang="en-US"/>
           </a:p>
@@ -1022,7 +1023,7 @@
           <a:p>
             <a:fld id="{2CD3CBAC-0DE8-4C84-B15C-961A73A0026C}" type="datetimeFigureOut">
               <a:rPr lang="en-US" smtClean="0"/>
-              <a:t>4/4/2016</a:t>
+              <a:t>5/17/2016</a:t>
             </a:fld>
             <a:endParaRPr lang="en-US"/>
           </a:p>
@@ -1254,7 +1255,7 @@
           <a:p>
             <a:fld id="{2CD3CBAC-0DE8-4C84-B15C-961A73A0026C}" type="datetimeFigureOut">
               <a:rPr lang="en-US" smtClean="0"/>
-              <a:t>4/4/2016</a:t>
+              <a:t>5/17/2016</a:t>
             </a:fld>
             <a:endParaRPr lang="en-US"/>
           </a:p>
@@ -1621,7 +1622,7 @@
           <a:p>
             <a:fld id="{2CD3CBAC-0DE8-4C84-B15C-961A73A0026C}" type="datetimeFigureOut">
               <a:rPr lang="en-US" smtClean="0"/>
-              <a:t>4/4/2016</a:t>
+              <a:t>5/17/2016</a:t>
             </a:fld>
             <a:endParaRPr lang="en-US"/>
           </a:p>
@@ -1739,7 +1740,7 @@
           <a:p>
             <a:fld id="{2CD3CBAC-0DE8-4C84-B15C-961A73A0026C}" type="datetimeFigureOut">
               <a:rPr lang="en-US" smtClean="0"/>
-              <a:t>4/4/2016</a:t>
+              <a:t>5/17/2016</a:t>
             </a:fld>
             <a:endParaRPr lang="en-US"/>
           </a:p>
@@ -1834,7 +1835,7 @@
           <a:p>
             <a:fld id="{2CD3CBAC-0DE8-4C84-B15C-961A73A0026C}" type="datetimeFigureOut">
               <a:rPr lang="en-US" smtClean="0"/>
-              <a:t>4/4/2016</a:t>
+              <a:t>5/17/2016</a:t>
             </a:fld>
             <a:endParaRPr lang="en-US"/>
           </a:p>
@@ -2111,7 +2112,7 @@
           <a:p>
             <a:fld id="{2CD3CBAC-0DE8-4C84-B15C-961A73A0026C}" type="datetimeFigureOut">
               <a:rPr lang="en-US" smtClean="0"/>
-              <a:t>4/4/2016</a:t>
+              <a:t>5/17/2016</a:t>
             </a:fld>
             <a:endParaRPr lang="en-US"/>
           </a:p>
@@ -2364,7 +2365,7 @@
           <a:p>
             <a:fld id="{2CD3CBAC-0DE8-4C84-B15C-961A73A0026C}" type="datetimeFigureOut">
               <a:rPr lang="en-US" smtClean="0"/>
-              <a:t>4/4/2016</a:t>
+              <a:t>5/17/2016</a:t>
             </a:fld>
             <a:endParaRPr lang="en-US"/>
           </a:p>
@@ -2577,7 +2578,7 @@
           <a:p>
             <a:fld id="{2CD3CBAC-0DE8-4C84-B15C-961A73A0026C}" type="datetimeFigureOut">
               <a:rPr lang="en-US" smtClean="0"/>
-              <a:t>4/4/2016</a:t>
+              <a:t>5/17/2016</a:t>
             </a:fld>
             <a:endParaRPr lang="en-US"/>
           </a:p>
@@ -3127,7 +3128,7 @@
             <a:spLocks noGrp="1"/>
           </p:cNvSpPr>
           <p:nvPr>
-            <p:ph type="ctrTitle"/>
+            <p:ph type="title"/>
           </p:nvPr>
         </p:nvSpPr>
         <p:spPr/>
@@ -3135,643 +3136,68 @@
           <a:bodyPr/>
           <a:lstStyle/>
           <a:p>
-            <a:endParaRPr lang="en-US"/>
-          </a:p>
-        </p:txBody>
-      </p:sp>
-      <p:sp>
-        <p:nvSpPr>
-          <p:cNvPr id="3" name="Subtitle 2"/>
-          <p:cNvSpPr>
-            <a:spLocks noGrp="1"/>
-          </p:cNvSpPr>
-          <p:nvPr>
-            <p:ph type="subTitle" idx="1"/>
+            <a:r>
+              <a:rPr lang="en-US" dirty="0" smtClean="0"/>
+              <a:t>Important notes</a:t>
+            </a:r>
+            <a:endParaRPr lang="en-US" dirty="0"/>
+          </a:p>
+        </p:txBody>
+      </p:sp>
+      <p:sp>
+        <p:nvSpPr>
+          <p:cNvPr id="3" name="Content Placeholder 2"/>
+          <p:cNvSpPr>
+            <a:spLocks noGrp="1"/>
+          </p:cNvSpPr>
+          <p:nvPr>
+            <p:ph idx="1"/>
           </p:nvPr>
         </p:nvSpPr>
         <p:spPr/>
         <p:txBody>
-          <a:bodyPr/>
-          <a:lstStyle/>
-          <a:p>
-            <a:endParaRPr lang="en-US"/>
-          </a:p>
-        </p:txBody>
-      </p:sp>
-      <p:pic>
-        <p:nvPicPr>
-          <p:cNvPr id="5" name="Picture 4"/>
-          <p:cNvPicPr>
-            <a:picLocks noChangeAspect="1"/>
-          </p:cNvPicPr>
-          <p:nvPr/>
-        </p:nvPicPr>
-        <p:blipFill>
-          <a:blip r:embed="rId2"/>
-          <a:stretch>
-            <a:fillRect/>
-          </a:stretch>
-        </p:blipFill>
-        <p:spPr>
-          <a:xfrm>
-            <a:off x="0" y="556181"/>
-            <a:ext cx="12207874" cy="6377342"/>
-          </a:xfrm>
-          <a:prstGeom prst="rect">
-            <a:avLst/>
-          </a:prstGeom>
-        </p:spPr>
-      </p:pic>
-      <p:sp>
-        <p:nvSpPr>
-          <p:cNvPr id="4" name="TextBox 3"/>
-          <p:cNvSpPr txBox="1"/>
-          <p:nvPr/>
-        </p:nvSpPr>
-        <p:spPr>
-          <a:xfrm>
-            <a:off x="245098" y="75414"/>
-            <a:ext cx="11946902" cy="646331"/>
-          </a:xfrm>
-          <a:prstGeom prst="rect">
-            <a:avLst/>
-          </a:prstGeom>
-          <a:noFill/>
-        </p:spPr>
-        <p:txBody>
-          <a:bodyPr wrap="square" rtlCol="0">
-            <a:spAutoFit/>
+          <a:bodyPr>
+            <a:normAutofit fontScale="92500"/>
           </a:bodyPr>
           <a:lstStyle/>
           <a:p>
             <a:r>
               <a:rPr lang="en-US" dirty="0" smtClean="0"/>
-              <a:t>Deviation time-series: tile = placement, color=network. The “bad days” are the dip in the middle of each x-axis. Placements with similar AOL pattern are </a:t>
-            </a:r>
+              <a:t>For the dates 3/3 – 5/3, far fewer served events appeared in RS than actual number. This affected almost all placements and networks.  “Representation rate” dropped on these days from around 90% to about 40%. These dates were ignored in the analysis presented in earlier slides.</a:t>
+            </a:r>
+          </a:p>
+          <a:p>
             <a:r>
               <a:rPr lang="en-US" dirty="0" smtClean="0"/>
-              <a:t>framed.</a:t>
-            </a:r>
-            <a:endParaRPr lang="en-US" dirty="0"/>
-          </a:p>
-        </p:txBody>
-      </p:sp>
-      <p:sp>
-        <p:nvSpPr>
-          <p:cNvPr id="6" name="Rectangle 5"/>
-          <p:cNvSpPr/>
-          <p:nvPr/>
-        </p:nvSpPr>
-        <p:spPr>
-          <a:xfrm>
-            <a:off x="8663233" y="556181"/>
-            <a:ext cx="829559" cy="566182"/>
-          </a:xfrm>
-          <a:prstGeom prst="rect">
-            <a:avLst/>
-          </a:prstGeom>
-          <a:noFill/>
-          <a:ln w="19050">
-            <a:solidFill>
-              <a:srgbClr val="FF0000"/>
-            </a:solidFill>
-          </a:ln>
-        </p:spPr>
-        <p:style>
-          <a:lnRef idx="2">
-            <a:schemeClr val="accent1">
-              <a:shade val="50000"/>
-            </a:schemeClr>
-          </a:lnRef>
-          <a:fillRef idx="1">
-            <a:schemeClr val="accent1"/>
-          </a:fillRef>
-          <a:effectRef idx="0">
-            <a:schemeClr val="accent1"/>
-          </a:effectRef>
-          <a:fontRef idx="minor">
-            <a:schemeClr val="lt1"/>
-          </a:fontRef>
-        </p:style>
-        <p:txBody>
-          <a:bodyPr rtlCol="0" anchor="ctr"/>
-          <a:lstStyle/>
-          <a:p>
-            <a:pPr algn="ctr"/>
-            <a:endParaRPr lang="en-US"/>
-          </a:p>
-        </p:txBody>
-      </p:sp>
-      <p:sp>
-        <p:nvSpPr>
-          <p:cNvPr id="8" name="Rectangle 7"/>
-          <p:cNvSpPr/>
-          <p:nvPr/>
-        </p:nvSpPr>
-        <p:spPr>
-          <a:xfrm>
-            <a:off x="9494051" y="557836"/>
-            <a:ext cx="829559" cy="566182"/>
-          </a:xfrm>
-          <a:prstGeom prst="rect">
-            <a:avLst/>
-          </a:prstGeom>
-          <a:noFill/>
-          <a:ln w="19050">
-            <a:solidFill>
-              <a:srgbClr val="FF0000"/>
-            </a:solidFill>
-          </a:ln>
-        </p:spPr>
-        <p:style>
-          <a:lnRef idx="2">
-            <a:schemeClr val="accent1">
-              <a:shade val="50000"/>
-            </a:schemeClr>
-          </a:lnRef>
-          <a:fillRef idx="1">
-            <a:schemeClr val="accent1"/>
-          </a:fillRef>
-          <a:effectRef idx="0">
-            <a:schemeClr val="accent1"/>
-          </a:effectRef>
-          <a:fontRef idx="minor">
-            <a:schemeClr val="lt1"/>
-          </a:fontRef>
-        </p:style>
-        <p:txBody>
-          <a:bodyPr rtlCol="0" anchor="ctr"/>
-          <a:lstStyle/>
-          <a:p>
-            <a:pPr algn="ctr"/>
-            <a:endParaRPr lang="en-US"/>
-          </a:p>
-        </p:txBody>
-      </p:sp>
-      <p:sp>
-        <p:nvSpPr>
-          <p:cNvPr id="9" name="Rectangle 8"/>
-          <p:cNvSpPr/>
-          <p:nvPr/>
-        </p:nvSpPr>
-        <p:spPr>
-          <a:xfrm>
-            <a:off x="9473511" y="1002797"/>
-            <a:ext cx="829559" cy="566182"/>
-          </a:xfrm>
-          <a:prstGeom prst="rect">
-            <a:avLst/>
-          </a:prstGeom>
-          <a:noFill/>
-          <a:ln w="19050">
-            <a:solidFill>
-              <a:srgbClr val="FF0000"/>
-            </a:solidFill>
-          </a:ln>
-        </p:spPr>
-        <p:style>
-          <a:lnRef idx="2">
-            <a:schemeClr val="accent1">
-              <a:shade val="50000"/>
-            </a:schemeClr>
-          </a:lnRef>
-          <a:fillRef idx="1">
-            <a:schemeClr val="accent1"/>
-          </a:fillRef>
-          <a:effectRef idx="0">
-            <a:schemeClr val="accent1"/>
-          </a:effectRef>
-          <a:fontRef idx="minor">
-            <a:schemeClr val="lt1"/>
-          </a:fontRef>
-        </p:style>
-        <p:txBody>
-          <a:bodyPr rtlCol="0" anchor="ctr"/>
-          <a:lstStyle/>
-          <a:p>
-            <a:pPr algn="ctr"/>
-            <a:endParaRPr lang="en-US"/>
-          </a:p>
-        </p:txBody>
-      </p:sp>
-      <p:sp>
-        <p:nvSpPr>
-          <p:cNvPr id="10" name="Rectangle 9"/>
-          <p:cNvSpPr/>
-          <p:nvPr/>
-        </p:nvSpPr>
-        <p:spPr>
-          <a:xfrm>
-            <a:off x="8653593" y="989475"/>
-            <a:ext cx="829559" cy="566182"/>
-          </a:xfrm>
-          <a:prstGeom prst="rect">
-            <a:avLst/>
-          </a:prstGeom>
-          <a:noFill/>
-          <a:ln w="19050">
-            <a:solidFill>
-              <a:srgbClr val="FF0000"/>
-            </a:solidFill>
-          </a:ln>
-        </p:spPr>
-        <p:style>
-          <a:lnRef idx="2">
-            <a:schemeClr val="accent1">
-              <a:shade val="50000"/>
-            </a:schemeClr>
-          </a:lnRef>
-          <a:fillRef idx="1">
-            <a:schemeClr val="accent1"/>
-          </a:fillRef>
-          <a:effectRef idx="0">
-            <a:schemeClr val="accent1"/>
-          </a:effectRef>
-          <a:fontRef idx="minor">
-            <a:schemeClr val="lt1"/>
-          </a:fontRef>
-        </p:style>
-        <p:txBody>
-          <a:bodyPr rtlCol="0" anchor="ctr"/>
-          <a:lstStyle/>
-          <a:p>
-            <a:pPr algn="ctr"/>
-            <a:endParaRPr lang="en-US"/>
-          </a:p>
-        </p:txBody>
-      </p:sp>
-      <p:sp>
-        <p:nvSpPr>
-          <p:cNvPr id="11" name="Rectangle 10"/>
-          <p:cNvSpPr/>
-          <p:nvPr/>
-        </p:nvSpPr>
-        <p:spPr>
-          <a:xfrm>
-            <a:off x="7833675" y="976153"/>
-            <a:ext cx="829559" cy="566182"/>
-          </a:xfrm>
-          <a:prstGeom prst="rect">
-            <a:avLst/>
-          </a:prstGeom>
-          <a:noFill/>
-          <a:ln w="19050">
-            <a:solidFill>
-              <a:srgbClr val="FF0000"/>
-            </a:solidFill>
-          </a:ln>
-        </p:spPr>
-        <p:style>
-          <a:lnRef idx="2">
-            <a:schemeClr val="accent1">
-              <a:shade val="50000"/>
-            </a:schemeClr>
-          </a:lnRef>
-          <a:fillRef idx="1">
-            <a:schemeClr val="accent1"/>
-          </a:fillRef>
-          <a:effectRef idx="0">
-            <a:schemeClr val="accent1"/>
-          </a:effectRef>
-          <a:fontRef idx="minor">
-            <a:schemeClr val="lt1"/>
-          </a:fontRef>
-        </p:style>
-        <p:txBody>
-          <a:bodyPr rtlCol="0" anchor="ctr"/>
-          <a:lstStyle/>
-          <a:p>
-            <a:pPr algn="ctr"/>
-            <a:endParaRPr lang="en-US"/>
-          </a:p>
-        </p:txBody>
-      </p:sp>
-      <p:sp>
-        <p:nvSpPr>
-          <p:cNvPr id="12" name="Rectangle 11"/>
-          <p:cNvSpPr/>
-          <p:nvPr/>
-        </p:nvSpPr>
-        <p:spPr>
-          <a:xfrm>
-            <a:off x="7828224" y="542859"/>
-            <a:ext cx="829559" cy="566182"/>
-          </a:xfrm>
-          <a:prstGeom prst="rect">
-            <a:avLst/>
-          </a:prstGeom>
-          <a:noFill/>
-          <a:ln w="19050">
-            <a:solidFill>
-              <a:srgbClr val="FF0000"/>
-            </a:solidFill>
-          </a:ln>
-        </p:spPr>
-        <p:style>
-          <a:lnRef idx="2">
-            <a:schemeClr val="accent1">
-              <a:shade val="50000"/>
-            </a:schemeClr>
-          </a:lnRef>
-          <a:fillRef idx="1">
-            <a:schemeClr val="accent1"/>
-          </a:fillRef>
-          <a:effectRef idx="0">
-            <a:schemeClr val="accent1"/>
-          </a:effectRef>
-          <a:fontRef idx="minor">
-            <a:schemeClr val="lt1"/>
-          </a:fontRef>
-        </p:style>
-        <p:txBody>
-          <a:bodyPr rtlCol="0" anchor="ctr"/>
-          <a:lstStyle/>
-          <a:p>
-            <a:pPr algn="ctr"/>
-            <a:endParaRPr lang="en-US"/>
-          </a:p>
-        </p:txBody>
-      </p:sp>
-      <p:sp>
-        <p:nvSpPr>
-          <p:cNvPr id="13" name="Rectangle 12"/>
-          <p:cNvSpPr/>
-          <p:nvPr/>
-        </p:nvSpPr>
-        <p:spPr>
-          <a:xfrm>
-            <a:off x="11098711" y="1068639"/>
-            <a:ext cx="829559" cy="566182"/>
-          </a:xfrm>
-          <a:prstGeom prst="rect">
-            <a:avLst/>
-          </a:prstGeom>
-          <a:noFill/>
-          <a:ln w="19050">
-            <a:solidFill>
-              <a:srgbClr val="FF0000"/>
-            </a:solidFill>
-          </a:ln>
-        </p:spPr>
-        <p:style>
-          <a:lnRef idx="2">
-            <a:schemeClr val="accent1">
-              <a:shade val="50000"/>
-            </a:schemeClr>
-          </a:lnRef>
-          <a:fillRef idx="1">
-            <a:schemeClr val="accent1"/>
-          </a:fillRef>
-          <a:effectRef idx="0">
-            <a:schemeClr val="accent1"/>
-          </a:effectRef>
-          <a:fontRef idx="minor">
-            <a:schemeClr val="lt1"/>
-          </a:fontRef>
-        </p:style>
-        <p:txBody>
-          <a:bodyPr rtlCol="0" anchor="ctr"/>
-          <a:lstStyle/>
-          <a:p>
-            <a:pPr algn="ctr"/>
-            <a:endParaRPr lang="en-US"/>
-          </a:p>
-        </p:txBody>
-      </p:sp>
-      <p:sp>
-        <p:nvSpPr>
-          <p:cNvPr id="14" name="Rectangle 13"/>
-          <p:cNvSpPr/>
-          <p:nvPr/>
-        </p:nvSpPr>
-        <p:spPr>
-          <a:xfrm>
-            <a:off x="10303070" y="2316163"/>
-            <a:ext cx="829559" cy="566182"/>
-          </a:xfrm>
-          <a:prstGeom prst="rect">
-            <a:avLst/>
-          </a:prstGeom>
-          <a:noFill/>
-          <a:ln w="19050">
-            <a:solidFill>
-              <a:srgbClr val="FF0000"/>
-            </a:solidFill>
-          </a:ln>
-        </p:spPr>
-        <p:style>
-          <a:lnRef idx="2">
-            <a:schemeClr val="accent1">
-              <a:shade val="50000"/>
-            </a:schemeClr>
-          </a:lnRef>
-          <a:fillRef idx="1">
-            <a:schemeClr val="accent1"/>
-          </a:fillRef>
-          <a:effectRef idx="0">
-            <a:schemeClr val="accent1"/>
-          </a:effectRef>
-          <a:fontRef idx="minor">
-            <a:schemeClr val="lt1"/>
-          </a:fontRef>
-        </p:style>
-        <p:txBody>
-          <a:bodyPr rtlCol="0" anchor="ctr"/>
-          <a:lstStyle/>
-          <a:p>
-            <a:pPr algn="ctr"/>
-            <a:endParaRPr lang="en-US"/>
-          </a:p>
-        </p:txBody>
-      </p:sp>
-      <p:sp>
-        <p:nvSpPr>
-          <p:cNvPr id="15" name="Rectangle 14"/>
-          <p:cNvSpPr/>
-          <p:nvPr/>
-        </p:nvSpPr>
-        <p:spPr>
-          <a:xfrm>
-            <a:off x="9473510" y="4135926"/>
-            <a:ext cx="829559" cy="566182"/>
-          </a:xfrm>
-          <a:prstGeom prst="rect">
-            <a:avLst/>
-          </a:prstGeom>
-          <a:noFill/>
-          <a:ln w="19050">
-            <a:solidFill>
-              <a:srgbClr val="FF0000"/>
-            </a:solidFill>
-          </a:ln>
-        </p:spPr>
-        <p:style>
-          <a:lnRef idx="2">
-            <a:schemeClr val="accent1">
-              <a:shade val="50000"/>
-            </a:schemeClr>
-          </a:lnRef>
-          <a:fillRef idx="1">
-            <a:schemeClr val="accent1"/>
-          </a:fillRef>
-          <a:effectRef idx="0">
-            <a:schemeClr val="accent1"/>
-          </a:effectRef>
-          <a:fontRef idx="minor">
-            <a:schemeClr val="lt1"/>
-          </a:fontRef>
-        </p:style>
-        <p:txBody>
-          <a:bodyPr rtlCol="0" anchor="ctr"/>
-          <a:lstStyle/>
-          <a:p>
-            <a:pPr algn="ctr"/>
-            <a:endParaRPr lang="en-US"/>
-          </a:p>
-        </p:txBody>
-      </p:sp>
-      <p:sp>
-        <p:nvSpPr>
-          <p:cNvPr id="16" name="Rectangle 15"/>
-          <p:cNvSpPr/>
-          <p:nvPr/>
-        </p:nvSpPr>
-        <p:spPr>
-          <a:xfrm>
-            <a:off x="9494051" y="5821943"/>
-            <a:ext cx="829559" cy="566182"/>
-          </a:xfrm>
-          <a:prstGeom prst="rect">
-            <a:avLst/>
-          </a:prstGeom>
-          <a:noFill/>
-          <a:ln w="19050">
-            <a:solidFill>
-              <a:srgbClr val="FF0000"/>
-            </a:solidFill>
-          </a:ln>
-        </p:spPr>
-        <p:style>
-          <a:lnRef idx="2">
-            <a:schemeClr val="accent1">
-              <a:shade val="50000"/>
-            </a:schemeClr>
-          </a:lnRef>
-          <a:fillRef idx="1">
-            <a:schemeClr val="accent1"/>
-          </a:fillRef>
-          <a:effectRef idx="0">
-            <a:schemeClr val="accent1"/>
-          </a:effectRef>
-          <a:fontRef idx="minor">
-            <a:schemeClr val="lt1"/>
-          </a:fontRef>
-        </p:style>
-        <p:txBody>
-          <a:bodyPr rtlCol="0" anchor="ctr"/>
-          <a:lstStyle/>
-          <a:p>
-            <a:pPr algn="ctr"/>
-            <a:endParaRPr lang="en-US"/>
-          </a:p>
-        </p:txBody>
-      </p:sp>
-      <p:sp>
-        <p:nvSpPr>
-          <p:cNvPr id="17" name="Rectangle 16"/>
-          <p:cNvSpPr/>
-          <p:nvPr/>
-        </p:nvSpPr>
-        <p:spPr>
-          <a:xfrm>
-            <a:off x="11098710" y="5914830"/>
-            <a:ext cx="829559" cy="566182"/>
-          </a:xfrm>
-          <a:prstGeom prst="rect">
-            <a:avLst/>
-          </a:prstGeom>
-          <a:noFill/>
-          <a:ln w="19050">
-            <a:solidFill>
-              <a:srgbClr val="FF0000"/>
-            </a:solidFill>
-          </a:ln>
-        </p:spPr>
-        <p:style>
-          <a:lnRef idx="2">
-            <a:schemeClr val="accent1">
-              <a:shade val="50000"/>
-            </a:schemeClr>
-          </a:lnRef>
-          <a:fillRef idx="1">
-            <a:schemeClr val="accent1"/>
-          </a:fillRef>
-          <a:effectRef idx="0">
-            <a:schemeClr val="accent1"/>
-          </a:effectRef>
-          <a:fontRef idx="minor">
-            <a:schemeClr val="lt1"/>
-          </a:fontRef>
-        </p:style>
-        <p:txBody>
-          <a:bodyPr rtlCol="0" anchor="ctr"/>
-          <a:lstStyle/>
-          <a:p>
-            <a:pPr algn="ctr"/>
-            <a:endParaRPr lang="en-US"/>
-          </a:p>
-        </p:txBody>
-      </p:sp>
-      <p:sp>
-        <p:nvSpPr>
-          <p:cNvPr id="18" name="Rectangle 17"/>
-          <p:cNvSpPr/>
-          <p:nvPr/>
-        </p:nvSpPr>
-        <p:spPr>
-          <a:xfrm>
-            <a:off x="1193241" y="2786100"/>
-            <a:ext cx="829559" cy="566182"/>
-          </a:xfrm>
-          <a:prstGeom prst="rect">
-            <a:avLst/>
-          </a:prstGeom>
-          <a:noFill/>
-          <a:ln w="19050">
-            <a:solidFill>
-              <a:srgbClr val="FF0000"/>
-            </a:solidFill>
-          </a:ln>
-        </p:spPr>
-        <p:style>
-          <a:lnRef idx="2">
-            <a:schemeClr val="accent1">
-              <a:shade val="50000"/>
-            </a:schemeClr>
-          </a:lnRef>
-          <a:fillRef idx="1">
-            <a:schemeClr val="accent1"/>
-          </a:fillRef>
-          <a:effectRef idx="0">
-            <a:schemeClr val="accent1"/>
-          </a:effectRef>
-          <a:fontRef idx="minor">
-            <a:schemeClr val="lt1"/>
-          </a:fontRef>
-        </p:style>
-        <p:txBody>
-          <a:bodyPr rtlCol="0" anchor="ctr"/>
-          <a:lstStyle/>
-          <a:p>
-            <a:pPr algn="ctr"/>
-            <a:endParaRPr lang="en-US"/>
+              <a:t>AOL deviations have a similar pattern (deviation per day) across many placements from several users. This non-random effect should be investigated. See next slide.</a:t>
+            </a:r>
+          </a:p>
+          <a:p>
+            <a:r>
+              <a:rPr lang="en-US" dirty="0" err="1" smtClean="0"/>
+              <a:t>Smaato</a:t>
+            </a:r>
+            <a:r>
+              <a:rPr lang="en-US" dirty="0" smtClean="0"/>
+              <a:t> deviation is -98%, i.e. less than 2% of served events are detected.</a:t>
+            </a:r>
+          </a:p>
+          <a:p>
+            <a:r>
+              <a:rPr lang="en-US" dirty="0" err="1" smtClean="0"/>
+              <a:t>MySql</a:t>
+            </a:r>
+            <a:r>
+              <a:rPr lang="en-US" dirty="0" smtClean="0"/>
+              <a:t> data was substantially incomplete for both 13/3 and 14/3 (data was retrieved early afternoon on 15/3).</a:t>
+            </a:r>
           </a:p>
         </p:txBody>
       </p:sp>
     </p:spTree>
     <p:extLst>
       <p:ext uri="{BB962C8B-B14F-4D97-AF65-F5344CB8AC3E}">
-        <p14:creationId xmlns:p14="http://schemas.microsoft.com/office/powerpoint/2010/main" val="2679827199"/>
+        <p14:creationId xmlns:p14="http://schemas.microsoft.com/office/powerpoint/2010/main" val="1036927113"/>
       </p:ext>
     </p:extLst>
   </p:cSld>
@@ -3820,7 +3246,7 @@
             <a:spLocks noGrp="1"/>
           </p:cNvSpPr>
           <p:nvPr>
-            <p:ph type="title"/>
+            <p:ph type="ctrTitle"/>
           </p:nvPr>
         </p:nvSpPr>
         <p:spPr/>
@@ -3834,12 +3260,12 @@
       </p:sp>
       <p:sp>
         <p:nvSpPr>
-          <p:cNvPr id="3" name="Content Placeholder 2"/>
-          <p:cNvSpPr>
-            <a:spLocks noGrp="1"/>
-          </p:cNvSpPr>
-          <p:nvPr>
-            <p:ph idx="1"/>
+          <p:cNvPr id="3" name="Subtitle 2"/>
+          <p:cNvSpPr>
+            <a:spLocks noGrp="1"/>
+          </p:cNvSpPr>
+          <p:nvPr>
+            <p:ph type="subTitle" idx="1"/>
           </p:nvPr>
         </p:nvSpPr>
         <p:spPr/>
@@ -3853,7 +3279,7 @@
       </p:sp>
       <p:pic>
         <p:nvPicPr>
-          <p:cNvPr id="4" name="Picture 3"/>
+          <p:cNvPr id="5" name="Picture 4"/>
           <p:cNvPicPr>
             <a:picLocks noChangeAspect="1"/>
           </p:cNvPicPr>
@@ -3867,8 +3293,8 @@
         </p:blipFill>
         <p:spPr>
           <a:xfrm>
-            <a:off x="380999" y="365125"/>
-            <a:ext cx="11551921" cy="6034675"/>
+            <a:off x="0" y="556181"/>
+            <a:ext cx="12207874" cy="6377342"/>
           </a:xfrm>
           <a:prstGeom prst="rect">
             <a:avLst/>
@@ -3877,14 +3303,14 @@
       </p:pic>
       <p:sp>
         <p:nvSpPr>
-          <p:cNvPr id="5" name="TextBox 4"/>
+          <p:cNvPr id="4" name="TextBox 3"/>
           <p:cNvSpPr txBox="1"/>
           <p:nvPr/>
         </p:nvSpPr>
         <p:spPr>
           <a:xfrm>
-            <a:off x="1300899" y="75414"/>
-            <a:ext cx="8154186" cy="369332"/>
+            <a:off x="245098" y="75414"/>
+            <a:ext cx="11946902" cy="646331"/>
           </a:xfrm>
           <a:prstGeom prst="rect">
             <a:avLst/>
@@ -3899,16 +3325,568 @@
           <a:p>
             <a:r>
               <a:rPr lang="en-US" dirty="0" smtClean="0"/>
-              <a:t>served day over day relative change: tile = placement, color=network</a:t>
+              <a:t>Deviation time-series: tile = placement, color=network. The “bad days” are the dip in the middle of each x-axis. Placements with similar AOL pattern are framed.</a:t>
             </a:r>
             <a:endParaRPr lang="en-US" dirty="0"/>
+          </a:p>
+        </p:txBody>
+      </p:sp>
+      <p:sp>
+        <p:nvSpPr>
+          <p:cNvPr id="6" name="Rectangle 5"/>
+          <p:cNvSpPr/>
+          <p:nvPr/>
+        </p:nvSpPr>
+        <p:spPr>
+          <a:xfrm>
+            <a:off x="8663233" y="556181"/>
+            <a:ext cx="829559" cy="566182"/>
+          </a:xfrm>
+          <a:prstGeom prst="rect">
+            <a:avLst/>
+          </a:prstGeom>
+          <a:noFill/>
+          <a:ln w="19050">
+            <a:solidFill>
+              <a:srgbClr val="FF0000"/>
+            </a:solidFill>
+          </a:ln>
+        </p:spPr>
+        <p:style>
+          <a:lnRef idx="2">
+            <a:schemeClr val="accent1">
+              <a:shade val="50000"/>
+            </a:schemeClr>
+          </a:lnRef>
+          <a:fillRef idx="1">
+            <a:schemeClr val="accent1"/>
+          </a:fillRef>
+          <a:effectRef idx="0">
+            <a:schemeClr val="accent1"/>
+          </a:effectRef>
+          <a:fontRef idx="minor">
+            <a:schemeClr val="lt1"/>
+          </a:fontRef>
+        </p:style>
+        <p:txBody>
+          <a:bodyPr rtlCol="0" anchor="ctr"/>
+          <a:lstStyle/>
+          <a:p>
+            <a:pPr algn="ctr"/>
+            <a:endParaRPr lang="en-US"/>
+          </a:p>
+        </p:txBody>
+      </p:sp>
+      <p:sp>
+        <p:nvSpPr>
+          <p:cNvPr id="8" name="Rectangle 7"/>
+          <p:cNvSpPr/>
+          <p:nvPr/>
+        </p:nvSpPr>
+        <p:spPr>
+          <a:xfrm>
+            <a:off x="9494051" y="557836"/>
+            <a:ext cx="829559" cy="566182"/>
+          </a:xfrm>
+          <a:prstGeom prst="rect">
+            <a:avLst/>
+          </a:prstGeom>
+          <a:noFill/>
+          <a:ln w="19050">
+            <a:solidFill>
+              <a:srgbClr val="FF0000"/>
+            </a:solidFill>
+          </a:ln>
+        </p:spPr>
+        <p:style>
+          <a:lnRef idx="2">
+            <a:schemeClr val="accent1">
+              <a:shade val="50000"/>
+            </a:schemeClr>
+          </a:lnRef>
+          <a:fillRef idx="1">
+            <a:schemeClr val="accent1"/>
+          </a:fillRef>
+          <a:effectRef idx="0">
+            <a:schemeClr val="accent1"/>
+          </a:effectRef>
+          <a:fontRef idx="minor">
+            <a:schemeClr val="lt1"/>
+          </a:fontRef>
+        </p:style>
+        <p:txBody>
+          <a:bodyPr rtlCol="0" anchor="ctr"/>
+          <a:lstStyle/>
+          <a:p>
+            <a:pPr algn="ctr"/>
+            <a:endParaRPr lang="en-US"/>
+          </a:p>
+        </p:txBody>
+      </p:sp>
+      <p:sp>
+        <p:nvSpPr>
+          <p:cNvPr id="9" name="Rectangle 8"/>
+          <p:cNvSpPr/>
+          <p:nvPr/>
+        </p:nvSpPr>
+        <p:spPr>
+          <a:xfrm>
+            <a:off x="9473511" y="1002797"/>
+            <a:ext cx="829559" cy="566182"/>
+          </a:xfrm>
+          <a:prstGeom prst="rect">
+            <a:avLst/>
+          </a:prstGeom>
+          <a:noFill/>
+          <a:ln w="19050">
+            <a:solidFill>
+              <a:srgbClr val="FF0000"/>
+            </a:solidFill>
+          </a:ln>
+        </p:spPr>
+        <p:style>
+          <a:lnRef idx="2">
+            <a:schemeClr val="accent1">
+              <a:shade val="50000"/>
+            </a:schemeClr>
+          </a:lnRef>
+          <a:fillRef idx="1">
+            <a:schemeClr val="accent1"/>
+          </a:fillRef>
+          <a:effectRef idx="0">
+            <a:schemeClr val="accent1"/>
+          </a:effectRef>
+          <a:fontRef idx="minor">
+            <a:schemeClr val="lt1"/>
+          </a:fontRef>
+        </p:style>
+        <p:txBody>
+          <a:bodyPr rtlCol="0" anchor="ctr"/>
+          <a:lstStyle/>
+          <a:p>
+            <a:pPr algn="ctr"/>
+            <a:endParaRPr lang="en-US"/>
+          </a:p>
+        </p:txBody>
+      </p:sp>
+      <p:sp>
+        <p:nvSpPr>
+          <p:cNvPr id="10" name="Rectangle 9"/>
+          <p:cNvSpPr/>
+          <p:nvPr/>
+        </p:nvSpPr>
+        <p:spPr>
+          <a:xfrm>
+            <a:off x="8653593" y="989475"/>
+            <a:ext cx="829559" cy="566182"/>
+          </a:xfrm>
+          <a:prstGeom prst="rect">
+            <a:avLst/>
+          </a:prstGeom>
+          <a:noFill/>
+          <a:ln w="19050">
+            <a:solidFill>
+              <a:srgbClr val="FF0000"/>
+            </a:solidFill>
+          </a:ln>
+        </p:spPr>
+        <p:style>
+          <a:lnRef idx="2">
+            <a:schemeClr val="accent1">
+              <a:shade val="50000"/>
+            </a:schemeClr>
+          </a:lnRef>
+          <a:fillRef idx="1">
+            <a:schemeClr val="accent1"/>
+          </a:fillRef>
+          <a:effectRef idx="0">
+            <a:schemeClr val="accent1"/>
+          </a:effectRef>
+          <a:fontRef idx="minor">
+            <a:schemeClr val="lt1"/>
+          </a:fontRef>
+        </p:style>
+        <p:txBody>
+          <a:bodyPr rtlCol="0" anchor="ctr"/>
+          <a:lstStyle/>
+          <a:p>
+            <a:pPr algn="ctr"/>
+            <a:endParaRPr lang="en-US"/>
+          </a:p>
+        </p:txBody>
+      </p:sp>
+      <p:sp>
+        <p:nvSpPr>
+          <p:cNvPr id="11" name="Rectangle 10"/>
+          <p:cNvSpPr/>
+          <p:nvPr/>
+        </p:nvSpPr>
+        <p:spPr>
+          <a:xfrm>
+            <a:off x="7833675" y="976153"/>
+            <a:ext cx="829559" cy="566182"/>
+          </a:xfrm>
+          <a:prstGeom prst="rect">
+            <a:avLst/>
+          </a:prstGeom>
+          <a:noFill/>
+          <a:ln w="19050">
+            <a:solidFill>
+              <a:srgbClr val="FF0000"/>
+            </a:solidFill>
+          </a:ln>
+        </p:spPr>
+        <p:style>
+          <a:lnRef idx="2">
+            <a:schemeClr val="accent1">
+              <a:shade val="50000"/>
+            </a:schemeClr>
+          </a:lnRef>
+          <a:fillRef idx="1">
+            <a:schemeClr val="accent1"/>
+          </a:fillRef>
+          <a:effectRef idx="0">
+            <a:schemeClr val="accent1"/>
+          </a:effectRef>
+          <a:fontRef idx="minor">
+            <a:schemeClr val="lt1"/>
+          </a:fontRef>
+        </p:style>
+        <p:txBody>
+          <a:bodyPr rtlCol="0" anchor="ctr"/>
+          <a:lstStyle/>
+          <a:p>
+            <a:pPr algn="ctr"/>
+            <a:endParaRPr lang="en-US"/>
+          </a:p>
+        </p:txBody>
+      </p:sp>
+      <p:sp>
+        <p:nvSpPr>
+          <p:cNvPr id="12" name="Rectangle 11"/>
+          <p:cNvSpPr/>
+          <p:nvPr/>
+        </p:nvSpPr>
+        <p:spPr>
+          <a:xfrm>
+            <a:off x="7828224" y="542859"/>
+            <a:ext cx="829559" cy="566182"/>
+          </a:xfrm>
+          <a:prstGeom prst="rect">
+            <a:avLst/>
+          </a:prstGeom>
+          <a:noFill/>
+          <a:ln w="19050">
+            <a:solidFill>
+              <a:srgbClr val="FF0000"/>
+            </a:solidFill>
+          </a:ln>
+        </p:spPr>
+        <p:style>
+          <a:lnRef idx="2">
+            <a:schemeClr val="accent1">
+              <a:shade val="50000"/>
+            </a:schemeClr>
+          </a:lnRef>
+          <a:fillRef idx="1">
+            <a:schemeClr val="accent1"/>
+          </a:fillRef>
+          <a:effectRef idx="0">
+            <a:schemeClr val="accent1"/>
+          </a:effectRef>
+          <a:fontRef idx="minor">
+            <a:schemeClr val="lt1"/>
+          </a:fontRef>
+        </p:style>
+        <p:txBody>
+          <a:bodyPr rtlCol="0" anchor="ctr"/>
+          <a:lstStyle/>
+          <a:p>
+            <a:pPr algn="ctr"/>
+            <a:endParaRPr lang="en-US"/>
+          </a:p>
+        </p:txBody>
+      </p:sp>
+      <p:sp>
+        <p:nvSpPr>
+          <p:cNvPr id="13" name="Rectangle 12"/>
+          <p:cNvSpPr/>
+          <p:nvPr/>
+        </p:nvSpPr>
+        <p:spPr>
+          <a:xfrm>
+            <a:off x="11098711" y="1068639"/>
+            <a:ext cx="829559" cy="566182"/>
+          </a:xfrm>
+          <a:prstGeom prst="rect">
+            <a:avLst/>
+          </a:prstGeom>
+          <a:noFill/>
+          <a:ln w="19050">
+            <a:solidFill>
+              <a:srgbClr val="FF0000"/>
+            </a:solidFill>
+          </a:ln>
+        </p:spPr>
+        <p:style>
+          <a:lnRef idx="2">
+            <a:schemeClr val="accent1">
+              <a:shade val="50000"/>
+            </a:schemeClr>
+          </a:lnRef>
+          <a:fillRef idx="1">
+            <a:schemeClr val="accent1"/>
+          </a:fillRef>
+          <a:effectRef idx="0">
+            <a:schemeClr val="accent1"/>
+          </a:effectRef>
+          <a:fontRef idx="minor">
+            <a:schemeClr val="lt1"/>
+          </a:fontRef>
+        </p:style>
+        <p:txBody>
+          <a:bodyPr rtlCol="0" anchor="ctr"/>
+          <a:lstStyle/>
+          <a:p>
+            <a:pPr algn="ctr"/>
+            <a:endParaRPr lang="en-US"/>
+          </a:p>
+        </p:txBody>
+      </p:sp>
+      <p:sp>
+        <p:nvSpPr>
+          <p:cNvPr id="14" name="Rectangle 13"/>
+          <p:cNvSpPr/>
+          <p:nvPr/>
+        </p:nvSpPr>
+        <p:spPr>
+          <a:xfrm>
+            <a:off x="10303070" y="2316163"/>
+            <a:ext cx="829559" cy="566182"/>
+          </a:xfrm>
+          <a:prstGeom prst="rect">
+            <a:avLst/>
+          </a:prstGeom>
+          <a:noFill/>
+          <a:ln w="19050">
+            <a:solidFill>
+              <a:srgbClr val="FF0000"/>
+            </a:solidFill>
+          </a:ln>
+        </p:spPr>
+        <p:style>
+          <a:lnRef idx="2">
+            <a:schemeClr val="accent1">
+              <a:shade val="50000"/>
+            </a:schemeClr>
+          </a:lnRef>
+          <a:fillRef idx="1">
+            <a:schemeClr val="accent1"/>
+          </a:fillRef>
+          <a:effectRef idx="0">
+            <a:schemeClr val="accent1"/>
+          </a:effectRef>
+          <a:fontRef idx="minor">
+            <a:schemeClr val="lt1"/>
+          </a:fontRef>
+        </p:style>
+        <p:txBody>
+          <a:bodyPr rtlCol="0" anchor="ctr"/>
+          <a:lstStyle/>
+          <a:p>
+            <a:pPr algn="ctr"/>
+            <a:endParaRPr lang="en-US"/>
+          </a:p>
+        </p:txBody>
+      </p:sp>
+      <p:sp>
+        <p:nvSpPr>
+          <p:cNvPr id="15" name="Rectangle 14"/>
+          <p:cNvSpPr/>
+          <p:nvPr/>
+        </p:nvSpPr>
+        <p:spPr>
+          <a:xfrm>
+            <a:off x="9473510" y="4135926"/>
+            <a:ext cx="829559" cy="566182"/>
+          </a:xfrm>
+          <a:prstGeom prst="rect">
+            <a:avLst/>
+          </a:prstGeom>
+          <a:noFill/>
+          <a:ln w="19050">
+            <a:solidFill>
+              <a:srgbClr val="FF0000"/>
+            </a:solidFill>
+          </a:ln>
+        </p:spPr>
+        <p:style>
+          <a:lnRef idx="2">
+            <a:schemeClr val="accent1">
+              <a:shade val="50000"/>
+            </a:schemeClr>
+          </a:lnRef>
+          <a:fillRef idx="1">
+            <a:schemeClr val="accent1"/>
+          </a:fillRef>
+          <a:effectRef idx="0">
+            <a:schemeClr val="accent1"/>
+          </a:effectRef>
+          <a:fontRef idx="minor">
+            <a:schemeClr val="lt1"/>
+          </a:fontRef>
+        </p:style>
+        <p:txBody>
+          <a:bodyPr rtlCol="0" anchor="ctr"/>
+          <a:lstStyle/>
+          <a:p>
+            <a:pPr algn="ctr"/>
+            <a:endParaRPr lang="en-US"/>
+          </a:p>
+        </p:txBody>
+      </p:sp>
+      <p:sp>
+        <p:nvSpPr>
+          <p:cNvPr id="16" name="Rectangle 15"/>
+          <p:cNvSpPr/>
+          <p:nvPr/>
+        </p:nvSpPr>
+        <p:spPr>
+          <a:xfrm>
+            <a:off x="9494051" y="5821943"/>
+            <a:ext cx="829559" cy="566182"/>
+          </a:xfrm>
+          <a:prstGeom prst="rect">
+            <a:avLst/>
+          </a:prstGeom>
+          <a:noFill/>
+          <a:ln w="19050">
+            <a:solidFill>
+              <a:srgbClr val="FF0000"/>
+            </a:solidFill>
+          </a:ln>
+        </p:spPr>
+        <p:style>
+          <a:lnRef idx="2">
+            <a:schemeClr val="accent1">
+              <a:shade val="50000"/>
+            </a:schemeClr>
+          </a:lnRef>
+          <a:fillRef idx="1">
+            <a:schemeClr val="accent1"/>
+          </a:fillRef>
+          <a:effectRef idx="0">
+            <a:schemeClr val="accent1"/>
+          </a:effectRef>
+          <a:fontRef idx="minor">
+            <a:schemeClr val="lt1"/>
+          </a:fontRef>
+        </p:style>
+        <p:txBody>
+          <a:bodyPr rtlCol="0" anchor="ctr"/>
+          <a:lstStyle/>
+          <a:p>
+            <a:pPr algn="ctr"/>
+            <a:endParaRPr lang="en-US"/>
+          </a:p>
+        </p:txBody>
+      </p:sp>
+      <p:sp>
+        <p:nvSpPr>
+          <p:cNvPr id="17" name="Rectangle 16"/>
+          <p:cNvSpPr/>
+          <p:nvPr/>
+        </p:nvSpPr>
+        <p:spPr>
+          <a:xfrm>
+            <a:off x="11098710" y="5914830"/>
+            <a:ext cx="829559" cy="566182"/>
+          </a:xfrm>
+          <a:prstGeom prst="rect">
+            <a:avLst/>
+          </a:prstGeom>
+          <a:noFill/>
+          <a:ln w="19050">
+            <a:solidFill>
+              <a:srgbClr val="FF0000"/>
+            </a:solidFill>
+          </a:ln>
+        </p:spPr>
+        <p:style>
+          <a:lnRef idx="2">
+            <a:schemeClr val="accent1">
+              <a:shade val="50000"/>
+            </a:schemeClr>
+          </a:lnRef>
+          <a:fillRef idx="1">
+            <a:schemeClr val="accent1"/>
+          </a:fillRef>
+          <a:effectRef idx="0">
+            <a:schemeClr val="accent1"/>
+          </a:effectRef>
+          <a:fontRef idx="minor">
+            <a:schemeClr val="lt1"/>
+          </a:fontRef>
+        </p:style>
+        <p:txBody>
+          <a:bodyPr rtlCol="0" anchor="ctr"/>
+          <a:lstStyle/>
+          <a:p>
+            <a:pPr algn="ctr"/>
+            <a:endParaRPr lang="en-US"/>
+          </a:p>
+        </p:txBody>
+      </p:sp>
+      <p:sp>
+        <p:nvSpPr>
+          <p:cNvPr id="18" name="Rectangle 17"/>
+          <p:cNvSpPr/>
+          <p:nvPr/>
+        </p:nvSpPr>
+        <p:spPr>
+          <a:xfrm>
+            <a:off x="1193241" y="2786100"/>
+            <a:ext cx="829559" cy="566182"/>
+          </a:xfrm>
+          <a:prstGeom prst="rect">
+            <a:avLst/>
+          </a:prstGeom>
+          <a:noFill/>
+          <a:ln w="19050">
+            <a:solidFill>
+              <a:srgbClr val="FF0000"/>
+            </a:solidFill>
+          </a:ln>
+        </p:spPr>
+        <p:style>
+          <a:lnRef idx="2">
+            <a:schemeClr val="accent1">
+              <a:shade val="50000"/>
+            </a:schemeClr>
+          </a:lnRef>
+          <a:fillRef idx="1">
+            <a:schemeClr val="accent1"/>
+          </a:fillRef>
+          <a:effectRef idx="0">
+            <a:schemeClr val="accent1"/>
+          </a:effectRef>
+          <a:fontRef idx="minor">
+            <a:schemeClr val="lt1"/>
+          </a:fontRef>
+        </p:style>
+        <p:txBody>
+          <a:bodyPr rtlCol="0" anchor="ctr"/>
+          <a:lstStyle/>
+          <a:p>
+            <a:pPr algn="ctr"/>
+            <a:endParaRPr lang="en-US"/>
           </a:p>
         </p:txBody>
       </p:sp>
     </p:spTree>
     <p:extLst>
       <p:ext uri="{BB962C8B-B14F-4D97-AF65-F5344CB8AC3E}">
-        <p14:creationId xmlns:p14="http://schemas.microsoft.com/office/powerpoint/2010/main" val="2516549617"/>
+        <p14:creationId xmlns:p14="http://schemas.microsoft.com/office/powerpoint/2010/main" val="2679827199"/>
       </p:ext>
     </p:extLst>
   </p:cSld>
@@ -3965,6 +3943,143 @@
           <a:bodyPr/>
           <a:lstStyle/>
           <a:p>
+            <a:endParaRPr lang="en-US"/>
+          </a:p>
+        </p:txBody>
+      </p:sp>
+      <p:sp>
+        <p:nvSpPr>
+          <p:cNvPr id="3" name="Content Placeholder 2"/>
+          <p:cNvSpPr>
+            <a:spLocks noGrp="1"/>
+          </p:cNvSpPr>
+          <p:nvPr>
+            <p:ph idx="1"/>
+          </p:nvPr>
+        </p:nvSpPr>
+        <p:spPr/>
+        <p:txBody>
+          <a:bodyPr/>
+          <a:lstStyle/>
+          <a:p>
+            <a:endParaRPr lang="en-US"/>
+          </a:p>
+        </p:txBody>
+      </p:sp>
+      <p:pic>
+        <p:nvPicPr>
+          <p:cNvPr id="4" name="Picture 3"/>
+          <p:cNvPicPr>
+            <a:picLocks noChangeAspect="1"/>
+          </p:cNvPicPr>
+          <p:nvPr/>
+        </p:nvPicPr>
+        <p:blipFill>
+          <a:blip r:embed="rId2"/>
+          <a:stretch>
+            <a:fillRect/>
+          </a:stretch>
+        </p:blipFill>
+        <p:spPr>
+          <a:xfrm>
+            <a:off x="380999" y="365125"/>
+            <a:ext cx="11551921" cy="6034675"/>
+          </a:xfrm>
+          <a:prstGeom prst="rect">
+            <a:avLst/>
+          </a:prstGeom>
+        </p:spPr>
+      </p:pic>
+      <p:sp>
+        <p:nvSpPr>
+          <p:cNvPr id="5" name="TextBox 4"/>
+          <p:cNvSpPr txBox="1"/>
+          <p:nvPr/>
+        </p:nvSpPr>
+        <p:spPr>
+          <a:xfrm>
+            <a:off x="1300899" y="75414"/>
+            <a:ext cx="8154186" cy="369332"/>
+          </a:xfrm>
+          <a:prstGeom prst="rect">
+            <a:avLst/>
+          </a:prstGeom>
+          <a:noFill/>
+        </p:spPr>
+        <p:txBody>
+          <a:bodyPr wrap="square" rtlCol="0">
+            <a:spAutoFit/>
+          </a:bodyPr>
+          <a:lstStyle/>
+          <a:p>
+            <a:r>
+              <a:rPr lang="en-US" dirty="0" smtClean="0"/>
+              <a:t>served day over day relative change: tile = placement, color=network</a:t>
+            </a:r>
+            <a:endParaRPr lang="en-US" dirty="0"/>
+          </a:p>
+        </p:txBody>
+      </p:sp>
+    </p:spTree>
+    <p:extLst>
+      <p:ext uri="{BB962C8B-B14F-4D97-AF65-F5344CB8AC3E}">
+        <p14:creationId xmlns:p14="http://schemas.microsoft.com/office/powerpoint/2010/main" val="2516549617"/>
+      </p:ext>
+    </p:extLst>
+  </p:cSld>
+  <p:clrMapOvr>
+    <a:masterClrMapping/>
+  </p:clrMapOvr>
+  <mc:AlternateContent xmlns:mc="http://schemas.openxmlformats.org/markup-compatibility/2006" xmlns:p14="http://schemas.microsoft.com/office/powerpoint/2010/main">
+    <mc:Choice Requires="p14">
+      <p:transition spd="slow" p14:dur="2000"/>
+    </mc:Choice>
+    <mc:Fallback xmlns="">
+      <p:transition spd="slow"/>
+    </mc:Fallback>
+  </mc:AlternateContent>
+  <p:timing>
+    <p:tnLst>
+      <p:par>
+        <p:cTn id="1" dur="indefinite" restart="never" nodeType="tmRoot"/>
+      </p:par>
+    </p:tnLst>
+  </p:timing>
+</p:sld>
+</file>
+
+<file path=ppt/slides/slide13.xml><?xml version="1.0" encoding="utf-8"?>
+<p:sld xmlns:a="http://schemas.openxmlformats.org/drawingml/2006/main" xmlns:r="http://schemas.openxmlformats.org/officeDocument/2006/relationships" xmlns:p="http://schemas.openxmlformats.org/presentationml/2006/main" show="0">
+  <p:cSld>
+    <p:spTree>
+      <p:nvGrpSpPr>
+        <p:cNvPr id="1" name=""/>
+        <p:cNvGrpSpPr/>
+        <p:nvPr/>
+      </p:nvGrpSpPr>
+      <p:grpSpPr>
+        <a:xfrm>
+          <a:off x="0" y="0"/>
+          <a:ext cx="0" cy="0"/>
+          <a:chOff x="0" y="0"/>
+          <a:chExt cx="0" cy="0"/>
+        </a:xfrm>
+      </p:grpSpPr>
+      <p:sp>
+        <p:nvSpPr>
+          <p:cNvPr id="2" name="Title 1"/>
+          <p:cNvSpPr>
+            <a:spLocks noGrp="1"/>
+          </p:cNvSpPr>
+          <p:nvPr>
+            <p:ph type="title"/>
+          </p:nvPr>
+        </p:nvSpPr>
+        <p:spPr/>
+        <p:txBody>
+          <a:bodyPr/>
+          <a:lstStyle/>
+          <a:p>
             <a:r>
               <a:rPr lang="en-US" dirty="0" smtClean="0"/>
               <a:t>Technical details</a:t>
@@ -4121,7 +4236,7 @@
 </p:sld>
 </file>
 
-<file path=ppt/slides/slide13.xml><?xml version="1.0" encoding="utf-8"?>
+<file path=ppt/slides/slide14.xml><?xml version="1.0" encoding="utf-8"?>
 <p:sld xmlns:a="http://schemas.openxmlformats.org/drawingml/2006/main" xmlns:r="http://schemas.openxmlformats.org/officeDocument/2006/relationships" xmlns:p="http://schemas.openxmlformats.org/presentationml/2006/main">
   <p:cSld>
     <p:spTree>
@@ -4231,7 +4346,7 @@
 </p:sld>
 </file>
 
-<file path=ppt/slides/slide14.xml><?xml version="1.0" encoding="utf-8"?>
+<file path=ppt/slides/slide15.xml><?xml version="1.0" encoding="utf-8"?>
 <p:sld xmlns:a="http://schemas.openxmlformats.org/drawingml/2006/main" xmlns:r="http://schemas.openxmlformats.org/officeDocument/2006/relationships" xmlns:p="http://schemas.openxmlformats.org/presentationml/2006/main">
   <p:cSld>
     <p:spTree>
@@ -5973,6 +6088,1029 @@
         </p:nvSpPr>
         <p:spPr>
           <a:xfrm>
+            <a:off x="838200" y="201224"/>
+            <a:ext cx="10515600" cy="816694"/>
+          </a:xfrm>
+        </p:spPr>
+        <p:txBody>
+          <a:bodyPr>
+            <a:noAutofit/>
+          </a:bodyPr>
+          <a:lstStyle/>
+          <a:p>
+            <a:r>
+              <a:rPr lang="en-US" sz="3200" dirty="0" smtClean="0"/>
+              <a:t>Ratio of placement by frequency of: days within </a:t>
+            </a:r>
+            <a:r>
+              <a:rPr lang="en-US" sz="3200" dirty="0"/>
+              <a:t>10% of actual value </a:t>
+            </a:r>
+          </a:p>
+        </p:txBody>
+      </p:sp>
+      <p:graphicFrame>
+        <p:nvGraphicFramePr>
+          <p:cNvPr id="5" name="Content Placeholder 4"/>
+          <p:cNvGraphicFramePr>
+            <a:graphicFrameLocks noGrp="1"/>
+          </p:cNvGraphicFramePr>
+          <p:nvPr>
+            <p:ph idx="1"/>
+            <p:extLst>
+              <p:ext uri="{D42A27DB-BD31-4B8C-83A1-F6EECF244321}">
+                <p14:modId xmlns:p14="http://schemas.microsoft.com/office/powerpoint/2010/main" val="1708416121"/>
+              </p:ext>
+            </p:extLst>
+          </p:nvPr>
+        </p:nvGraphicFramePr>
+        <p:xfrm>
+          <a:off x="838200" y="1109041"/>
+          <a:ext cx="10515600" cy="2308745"/>
+        </p:xfrm>
+        <a:graphic>
+          <a:graphicData uri="http://schemas.openxmlformats.org/drawingml/2006/table">
+            <a:tbl>
+              <a:tblPr firstRow="1" bandRow="1">
+                <a:tableStyleId>{5C22544A-7EE6-4342-B048-85BDC9FD1C3A}</a:tableStyleId>
+              </a:tblPr>
+              <a:tblGrid>
+                <a:gridCol w="1680713"/>
+                <a:gridCol w="1095555"/>
+                <a:gridCol w="1224951"/>
+                <a:gridCol w="1035170"/>
+                <a:gridCol w="1078302"/>
+                <a:gridCol w="1224951"/>
+                <a:gridCol w="1043796"/>
+                <a:gridCol w="963762"/>
+                <a:gridCol w="1168400"/>
+              </a:tblGrid>
+              <a:tr h="370840">
+                <a:tc>
+                  <a:txBody>
+                    <a:bodyPr/>
+                    <a:lstStyle/>
+                    <a:p>
+                      <a:r>
+                        <a:rPr lang="en-US" dirty="0" smtClean="0"/>
+                        <a:t>criterion</a:t>
+                      </a:r>
+                      <a:endParaRPr lang="en-US" dirty="0"/>
+                    </a:p>
+                  </a:txBody>
+                  <a:tcPr/>
+                </a:tc>
+                <a:tc>
+                  <a:txBody>
+                    <a:bodyPr/>
+                    <a:lstStyle/>
+                    <a:p>
+                      <a:r>
+                        <a:rPr lang="en-US" dirty="0" smtClean="0"/>
+                        <a:t>100%  of</a:t>
+                      </a:r>
+                      <a:r>
+                        <a:rPr lang="en-US" baseline="0" dirty="0" smtClean="0"/>
+                        <a:t> days </a:t>
+                      </a:r>
+                      <a:r>
+                        <a:rPr lang="en-US" dirty="0" smtClean="0"/>
+                        <a:t>within</a:t>
+                      </a:r>
+                      <a:endParaRPr lang="en-US" dirty="0"/>
+                    </a:p>
+                  </a:txBody>
+                  <a:tcPr/>
+                </a:tc>
+                <a:tc>
+                  <a:txBody>
+                    <a:bodyPr/>
+                    <a:lstStyle/>
+                    <a:p>
+                      <a:r>
+                        <a:rPr lang="en-US" dirty="0" smtClean="0"/>
+                        <a:t>95% of days within</a:t>
+                      </a:r>
+                      <a:endParaRPr lang="en-US" dirty="0"/>
+                    </a:p>
+                  </a:txBody>
+                  <a:tcPr/>
+                </a:tc>
+                <a:tc>
+                  <a:txBody>
+                    <a:bodyPr/>
+                    <a:lstStyle/>
+                    <a:p>
+                      <a:r>
+                        <a:rPr lang="en-US" dirty="0" smtClean="0"/>
+                        <a:t>90% or more</a:t>
+                      </a:r>
+                      <a:endParaRPr lang="en-US" dirty="0"/>
+                    </a:p>
+                  </a:txBody>
+                  <a:tcPr/>
+                </a:tc>
+                <a:tc>
+                  <a:txBody>
+                    <a:bodyPr/>
+                    <a:lstStyle/>
+                    <a:p>
+                      <a:r>
+                        <a:rPr lang="en-US" dirty="0" smtClean="0"/>
+                        <a:t>85%</a:t>
+                      </a:r>
+                      <a:endParaRPr lang="en-US" dirty="0"/>
+                    </a:p>
+                  </a:txBody>
+                  <a:tcPr/>
+                </a:tc>
+                <a:tc>
+                  <a:txBody>
+                    <a:bodyPr/>
+                    <a:lstStyle/>
+                    <a:p>
+                      <a:r>
+                        <a:rPr lang="en-US" dirty="0" smtClean="0"/>
+                        <a:t>80%</a:t>
+                      </a:r>
+                      <a:endParaRPr lang="en-US" dirty="0"/>
+                    </a:p>
+                  </a:txBody>
+                  <a:tcPr/>
+                </a:tc>
+                <a:tc>
+                  <a:txBody>
+                    <a:bodyPr/>
+                    <a:lstStyle/>
+                    <a:p>
+                      <a:r>
+                        <a:rPr lang="en-US" dirty="0" smtClean="0"/>
+                        <a:t>70%</a:t>
+                      </a:r>
+                      <a:endParaRPr lang="en-US" dirty="0"/>
+                    </a:p>
+                  </a:txBody>
+                  <a:tcPr/>
+                </a:tc>
+                <a:tc>
+                  <a:txBody>
+                    <a:bodyPr/>
+                    <a:lstStyle/>
+                    <a:p>
+                      <a:r>
+                        <a:rPr lang="en-US" dirty="0" smtClean="0"/>
+                        <a:t>60%</a:t>
+                      </a:r>
+                      <a:endParaRPr lang="en-US" dirty="0"/>
+                    </a:p>
+                  </a:txBody>
+                  <a:tcPr/>
+                </a:tc>
+                <a:tc>
+                  <a:txBody>
+                    <a:bodyPr/>
+                    <a:lstStyle/>
+                    <a:p>
+                      <a:r>
+                        <a:rPr lang="en-US" dirty="0" smtClean="0"/>
+                        <a:t>50%</a:t>
+                      </a:r>
+                      <a:endParaRPr lang="en-US" dirty="0"/>
+                    </a:p>
+                  </a:txBody>
+                  <a:tcPr/>
+                </a:tc>
+              </a:tr>
+              <a:tr h="754265">
+                <a:tc>
+                  <a:txBody>
+                    <a:bodyPr/>
+                    <a:lstStyle/>
+                    <a:p>
+                      <a:r>
+                        <a:rPr lang="en-US" dirty="0" smtClean="0"/>
+                        <a:t>% </a:t>
+                      </a:r>
+                      <a:r>
+                        <a:rPr lang="en-US" dirty="0" smtClean="0"/>
+                        <a:t>placements within criterion</a:t>
+                      </a:r>
+                      <a:endParaRPr lang="en-US" dirty="0"/>
+                    </a:p>
+                  </a:txBody>
+                  <a:tcPr/>
+                </a:tc>
+                <a:tc>
+                  <a:txBody>
+                    <a:bodyPr/>
+                    <a:lstStyle/>
+                    <a:p>
+                      <a:r>
+                        <a:rPr lang="en-US" dirty="0" smtClean="0"/>
+                        <a:t>26%</a:t>
+                      </a:r>
+                      <a:endParaRPr lang="en-US" dirty="0"/>
+                    </a:p>
+                  </a:txBody>
+                  <a:tcPr/>
+                </a:tc>
+                <a:tc>
+                  <a:txBody>
+                    <a:bodyPr/>
+                    <a:lstStyle/>
+                    <a:p>
+                      <a:r>
+                        <a:rPr lang="en-US" dirty="0" smtClean="0"/>
+                        <a:t>26%</a:t>
+                      </a:r>
+                      <a:endParaRPr lang="en-US" dirty="0"/>
+                    </a:p>
+                  </a:txBody>
+                  <a:tcPr/>
+                </a:tc>
+                <a:tc>
+                  <a:txBody>
+                    <a:bodyPr/>
+                    <a:lstStyle/>
+                    <a:p>
+                      <a:r>
+                        <a:rPr lang="en-US" dirty="0" smtClean="0"/>
+                        <a:t>40%</a:t>
+                      </a:r>
+                      <a:endParaRPr lang="en-US" dirty="0"/>
+                    </a:p>
+                  </a:txBody>
+                  <a:tcPr/>
+                </a:tc>
+                <a:tc>
+                  <a:txBody>
+                    <a:bodyPr/>
+                    <a:lstStyle/>
+                    <a:p>
+                      <a:r>
+                        <a:rPr lang="en-US" dirty="0" smtClean="0"/>
+                        <a:t>54%</a:t>
+                      </a:r>
+                      <a:endParaRPr lang="en-US" dirty="0"/>
+                    </a:p>
+                  </a:txBody>
+                  <a:tcPr/>
+                </a:tc>
+                <a:tc>
+                  <a:txBody>
+                    <a:bodyPr/>
+                    <a:lstStyle/>
+                    <a:p>
+                      <a:r>
+                        <a:rPr lang="en-US" dirty="0" smtClean="0"/>
+                        <a:t>63%</a:t>
+                      </a:r>
+                      <a:endParaRPr lang="en-US" dirty="0"/>
+                    </a:p>
+                  </a:txBody>
+                  <a:tcPr/>
+                </a:tc>
+                <a:tc>
+                  <a:txBody>
+                    <a:bodyPr/>
+                    <a:lstStyle/>
+                    <a:p>
+                      <a:r>
+                        <a:rPr lang="en-US" dirty="0" smtClean="0"/>
+                        <a:t>75%</a:t>
+                      </a:r>
+                      <a:endParaRPr lang="en-US" dirty="0"/>
+                    </a:p>
+                  </a:txBody>
+                  <a:tcPr/>
+                </a:tc>
+                <a:tc>
+                  <a:txBody>
+                    <a:bodyPr/>
+                    <a:lstStyle/>
+                    <a:p>
+                      <a:r>
+                        <a:rPr lang="en-US" dirty="0" smtClean="0"/>
+                        <a:t>86%</a:t>
+                      </a:r>
+                      <a:endParaRPr lang="en-US" dirty="0"/>
+                    </a:p>
+                  </a:txBody>
+                  <a:tcPr/>
+                </a:tc>
+                <a:tc>
+                  <a:txBody>
+                    <a:bodyPr/>
+                    <a:lstStyle/>
+                    <a:p>
+                      <a:r>
+                        <a:rPr lang="en-US" dirty="0" smtClean="0"/>
+                        <a:t>92%</a:t>
+                      </a:r>
+                      <a:endParaRPr lang="en-US" dirty="0"/>
+                    </a:p>
+                  </a:txBody>
+                  <a:tcPr/>
+                </a:tc>
+              </a:tr>
+              <a:tr h="370840">
+                <a:tc>
+                  <a:txBody>
+                    <a:bodyPr/>
+                    <a:lstStyle/>
+                    <a:p>
+                      <a:r>
+                        <a:rPr lang="en-US" dirty="0" smtClean="0"/>
+                        <a:t>%</a:t>
+                      </a:r>
+                      <a:r>
+                        <a:rPr lang="en-US" baseline="0" dirty="0" smtClean="0"/>
+                        <a:t> sites within criterion</a:t>
+                      </a:r>
+                      <a:endParaRPr lang="en-US" dirty="0"/>
+                    </a:p>
+                  </a:txBody>
+                  <a:tcPr/>
+                </a:tc>
+                <a:tc>
+                  <a:txBody>
+                    <a:bodyPr/>
+                    <a:lstStyle/>
+                    <a:p>
+                      <a:r>
+                        <a:rPr lang="en-US" dirty="0" smtClean="0"/>
+                        <a:t>42%</a:t>
+                      </a:r>
+                      <a:endParaRPr lang="en-US" dirty="0"/>
+                    </a:p>
+                  </a:txBody>
+                  <a:tcPr/>
+                </a:tc>
+                <a:tc>
+                  <a:txBody>
+                    <a:bodyPr/>
+                    <a:lstStyle/>
+                    <a:p>
+                      <a:r>
+                        <a:rPr lang="en-US" dirty="0" smtClean="0"/>
+                        <a:t>42%</a:t>
+                      </a:r>
+                      <a:endParaRPr lang="en-US" dirty="0"/>
+                    </a:p>
+                  </a:txBody>
+                  <a:tcPr/>
+                </a:tc>
+                <a:tc>
+                  <a:txBody>
+                    <a:bodyPr/>
+                    <a:lstStyle/>
+                    <a:p>
+                      <a:r>
+                        <a:rPr lang="en-US" dirty="0" smtClean="0"/>
+                        <a:t>57%</a:t>
+                      </a:r>
+                      <a:endParaRPr lang="en-US" dirty="0"/>
+                    </a:p>
+                  </a:txBody>
+                  <a:tcPr/>
+                </a:tc>
+                <a:tc>
+                  <a:txBody>
+                    <a:bodyPr/>
+                    <a:lstStyle/>
+                    <a:p>
+                      <a:r>
+                        <a:rPr lang="en-US" dirty="0" smtClean="0"/>
+                        <a:t>68%</a:t>
+                      </a:r>
+                      <a:endParaRPr lang="en-US" dirty="0"/>
+                    </a:p>
+                  </a:txBody>
+                  <a:tcPr/>
+                </a:tc>
+                <a:tc>
+                  <a:txBody>
+                    <a:bodyPr/>
+                    <a:lstStyle/>
+                    <a:p>
+                      <a:r>
+                        <a:rPr lang="en-US" dirty="0" smtClean="0"/>
+                        <a:t>84%</a:t>
+                      </a:r>
+                      <a:endParaRPr lang="en-US" dirty="0"/>
+                    </a:p>
+                  </a:txBody>
+                  <a:tcPr/>
+                </a:tc>
+                <a:tc>
+                  <a:txBody>
+                    <a:bodyPr/>
+                    <a:lstStyle/>
+                    <a:p>
+                      <a:r>
+                        <a:rPr lang="en-US" dirty="0" smtClean="0"/>
+                        <a:t>94%</a:t>
+                      </a:r>
+                      <a:endParaRPr lang="en-US" dirty="0"/>
+                    </a:p>
+                  </a:txBody>
+                  <a:tcPr/>
+                </a:tc>
+                <a:tc>
+                  <a:txBody>
+                    <a:bodyPr/>
+                    <a:lstStyle/>
+                    <a:p>
+                      <a:r>
+                        <a:rPr lang="en-US" dirty="0" smtClean="0"/>
+                        <a:t>94%</a:t>
+                      </a:r>
+                      <a:endParaRPr lang="en-US" dirty="0"/>
+                    </a:p>
+                  </a:txBody>
+                  <a:tcPr/>
+                </a:tc>
+                <a:tc>
+                  <a:txBody>
+                    <a:bodyPr/>
+                    <a:lstStyle/>
+                    <a:p>
+                      <a:r>
+                        <a:rPr lang="en-US" dirty="0" smtClean="0"/>
+                        <a:t>94%</a:t>
+                      </a:r>
+                      <a:endParaRPr lang="en-US" dirty="0"/>
+                    </a:p>
+                  </a:txBody>
+                  <a:tcPr/>
+                </a:tc>
+              </a:tr>
+            </a:tbl>
+          </a:graphicData>
+        </a:graphic>
+      </p:graphicFrame>
+      <p:graphicFrame>
+        <p:nvGraphicFramePr>
+          <p:cNvPr id="8" name="Content Placeholder 4"/>
+          <p:cNvGraphicFramePr>
+            <a:graphicFrameLocks noGrp="1"/>
+          </p:cNvGraphicFramePr>
+          <p:nvPr>
+            <p:ph idx="1"/>
+            <p:extLst>
+              <p:ext uri="{D42A27DB-BD31-4B8C-83A1-F6EECF244321}">
+                <p14:modId xmlns:p14="http://schemas.microsoft.com/office/powerpoint/2010/main" val="1145893798"/>
+              </p:ext>
+            </p:extLst>
+          </p:nvPr>
+        </p:nvGraphicFramePr>
+        <p:xfrm>
+          <a:off x="838200" y="4204822"/>
+          <a:ext cx="10515600" cy="2194560"/>
+        </p:xfrm>
+        <a:graphic>
+          <a:graphicData uri="http://schemas.openxmlformats.org/drawingml/2006/table">
+            <a:tbl>
+              <a:tblPr firstRow="1" bandRow="1">
+                <a:tableStyleId>{5C22544A-7EE6-4342-B048-85BDC9FD1C3A}</a:tableStyleId>
+              </a:tblPr>
+              <a:tblGrid>
+                <a:gridCol w="1680713"/>
+                <a:gridCol w="1095555"/>
+                <a:gridCol w="1224951"/>
+                <a:gridCol w="1035170"/>
+                <a:gridCol w="1078302"/>
+                <a:gridCol w="1224951"/>
+                <a:gridCol w="1043796"/>
+                <a:gridCol w="963762"/>
+                <a:gridCol w="1168400"/>
+              </a:tblGrid>
+              <a:tr h="370840">
+                <a:tc>
+                  <a:txBody>
+                    <a:bodyPr/>
+                    <a:lstStyle/>
+                    <a:p>
+                      <a:r>
+                        <a:rPr lang="en-US" dirty="0" smtClean="0"/>
+                        <a:t>criterion</a:t>
+                      </a:r>
+                      <a:endParaRPr lang="en-US" dirty="0"/>
+                    </a:p>
+                  </a:txBody>
+                  <a:tcPr/>
+                </a:tc>
+                <a:tc>
+                  <a:txBody>
+                    <a:bodyPr/>
+                    <a:lstStyle/>
+                    <a:p>
+                      <a:r>
+                        <a:rPr lang="en-US" dirty="0" smtClean="0"/>
+                        <a:t>100%  of</a:t>
+                      </a:r>
+                      <a:r>
+                        <a:rPr lang="en-US" baseline="0" dirty="0" smtClean="0"/>
+                        <a:t> days </a:t>
+                      </a:r>
+                      <a:r>
+                        <a:rPr lang="en-US" dirty="0" smtClean="0"/>
+                        <a:t>within</a:t>
+                      </a:r>
+                      <a:endParaRPr lang="en-US" dirty="0"/>
+                    </a:p>
+                  </a:txBody>
+                  <a:tcPr/>
+                </a:tc>
+                <a:tc>
+                  <a:txBody>
+                    <a:bodyPr/>
+                    <a:lstStyle/>
+                    <a:p>
+                      <a:r>
+                        <a:rPr lang="en-US" dirty="0" smtClean="0"/>
+                        <a:t>95% of days within</a:t>
+                      </a:r>
+                      <a:endParaRPr lang="en-US" dirty="0"/>
+                    </a:p>
+                  </a:txBody>
+                  <a:tcPr/>
+                </a:tc>
+                <a:tc>
+                  <a:txBody>
+                    <a:bodyPr/>
+                    <a:lstStyle/>
+                    <a:p>
+                      <a:r>
+                        <a:rPr lang="en-US" dirty="0" smtClean="0"/>
+                        <a:t>90% or more</a:t>
+                      </a:r>
+                      <a:endParaRPr lang="en-US" dirty="0"/>
+                    </a:p>
+                  </a:txBody>
+                  <a:tcPr/>
+                </a:tc>
+                <a:tc>
+                  <a:txBody>
+                    <a:bodyPr/>
+                    <a:lstStyle/>
+                    <a:p>
+                      <a:r>
+                        <a:rPr lang="en-US" dirty="0" smtClean="0"/>
+                        <a:t>85%</a:t>
+                      </a:r>
+                      <a:endParaRPr lang="en-US" dirty="0"/>
+                    </a:p>
+                  </a:txBody>
+                  <a:tcPr/>
+                </a:tc>
+                <a:tc>
+                  <a:txBody>
+                    <a:bodyPr/>
+                    <a:lstStyle/>
+                    <a:p>
+                      <a:r>
+                        <a:rPr lang="en-US" dirty="0" smtClean="0"/>
+                        <a:t>80%</a:t>
+                      </a:r>
+                      <a:endParaRPr lang="en-US" dirty="0"/>
+                    </a:p>
+                  </a:txBody>
+                  <a:tcPr/>
+                </a:tc>
+                <a:tc>
+                  <a:txBody>
+                    <a:bodyPr/>
+                    <a:lstStyle/>
+                    <a:p>
+                      <a:r>
+                        <a:rPr lang="en-US" dirty="0" smtClean="0"/>
+                        <a:t>70%</a:t>
+                      </a:r>
+                      <a:endParaRPr lang="en-US" dirty="0"/>
+                    </a:p>
+                  </a:txBody>
+                  <a:tcPr/>
+                </a:tc>
+                <a:tc>
+                  <a:txBody>
+                    <a:bodyPr/>
+                    <a:lstStyle/>
+                    <a:p>
+                      <a:r>
+                        <a:rPr lang="en-US" dirty="0" smtClean="0"/>
+                        <a:t>60%</a:t>
+                      </a:r>
+                      <a:endParaRPr lang="en-US" dirty="0"/>
+                    </a:p>
+                  </a:txBody>
+                  <a:tcPr/>
+                </a:tc>
+                <a:tc>
+                  <a:txBody>
+                    <a:bodyPr/>
+                    <a:lstStyle/>
+                    <a:p>
+                      <a:r>
+                        <a:rPr lang="en-US" dirty="0" smtClean="0"/>
+                        <a:t>50%</a:t>
+                      </a:r>
+                      <a:endParaRPr lang="en-US" dirty="0"/>
+                    </a:p>
+                  </a:txBody>
+                  <a:tcPr/>
+                </a:tc>
+              </a:tr>
+              <a:tr h="370840">
+                <a:tc>
+                  <a:txBody>
+                    <a:bodyPr/>
+                    <a:lstStyle/>
+                    <a:p>
+                      <a:r>
+                        <a:rPr lang="en-US" dirty="0" smtClean="0"/>
+                        <a:t>% placements within criterion</a:t>
+                      </a:r>
+                      <a:endParaRPr lang="en-US" dirty="0"/>
+                    </a:p>
+                  </a:txBody>
+                  <a:tcPr/>
+                </a:tc>
+                <a:tc>
+                  <a:txBody>
+                    <a:bodyPr/>
+                    <a:lstStyle/>
+                    <a:p>
+                      <a:r>
+                        <a:rPr lang="en-US" dirty="0" smtClean="0"/>
+                        <a:t>62%</a:t>
+                      </a:r>
+                      <a:endParaRPr lang="en-US" dirty="0"/>
+                    </a:p>
+                  </a:txBody>
+                  <a:tcPr/>
+                </a:tc>
+                <a:tc>
+                  <a:txBody>
+                    <a:bodyPr/>
+                    <a:lstStyle/>
+                    <a:p>
+                      <a:r>
+                        <a:rPr lang="en-US" dirty="0" smtClean="0"/>
+                        <a:t>62%</a:t>
+                      </a:r>
+                      <a:endParaRPr lang="en-US" dirty="0"/>
+                    </a:p>
+                  </a:txBody>
+                  <a:tcPr/>
+                </a:tc>
+                <a:tc>
+                  <a:txBody>
+                    <a:bodyPr/>
+                    <a:lstStyle/>
+                    <a:p>
+                      <a:r>
+                        <a:rPr lang="en-US" dirty="0" smtClean="0"/>
+                        <a:t>80%</a:t>
+                      </a:r>
+                      <a:endParaRPr lang="en-US" dirty="0"/>
+                    </a:p>
+                  </a:txBody>
+                  <a:tcPr/>
+                </a:tc>
+                <a:tc>
+                  <a:txBody>
+                    <a:bodyPr/>
+                    <a:lstStyle/>
+                    <a:p>
+                      <a:r>
+                        <a:rPr lang="en-US" dirty="0" smtClean="0"/>
+                        <a:t>86%</a:t>
+                      </a:r>
+                      <a:endParaRPr lang="en-US" dirty="0"/>
+                    </a:p>
+                  </a:txBody>
+                  <a:tcPr/>
+                </a:tc>
+                <a:tc>
+                  <a:txBody>
+                    <a:bodyPr/>
+                    <a:lstStyle/>
+                    <a:p>
+                      <a:r>
+                        <a:rPr lang="en-US" dirty="0" smtClean="0"/>
+                        <a:t>90%</a:t>
+                      </a:r>
+                      <a:endParaRPr lang="en-US" dirty="0"/>
+                    </a:p>
+                  </a:txBody>
+                  <a:tcPr/>
+                </a:tc>
+                <a:tc>
+                  <a:txBody>
+                    <a:bodyPr/>
+                    <a:lstStyle/>
+                    <a:p>
+                      <a:r>
+                        <a:rPr lang="en-US" dirty="0" smtClean="0"/>
+                        <a:t>94%</a:t>
+                      </a:r>
+                      <a:endParaRPr lang="en-US" dirty="0"/>
+                    </a:p>
+                  </a:txBody>
+                  <a:tcPr/>
+                </a:tc>
+                <a:tc>
+                  <a:txBody>
+                    <a:bodyPr/>
+                    <a:lstStyle/>
+                    <a:p>
+                      <a:r>
+                        <a:rPr lang="en-US" dirty="0" smtClean="0"/>
+                        <a:t>98%</a:t>
+                      </a:r>
+                      <a:endParaRPr lang="en-US" dirty="0"/>
+                    </a:p>
+                  </a:txBody>
+                  <a:tcPr/>
+                </a:tc>
+                <a:tc>
+                  <a:txBody>
+                    <a:bodyPr/>
+                    <a:lstStyle/>
+                    <a:p>
+                      <a:r>
+                        <a:rPr lang="en-US" dirty="0" smtClean="0"/>
+                        <a:t>99%</a:t>
+                      </a:r>
+                      <a:endParaRPr lang="en-US" dirty="0"/>
+                    </a:p>
+                  </a:txBody>
+                  <a:tcPr/>
+                </a:tc>
+              </a:tr>
+              <a:tr h="370840">
+                <a:tc>
+                  <a:txBody>
+                    <a:bodyPr/>
+                    <a:lstStyle/>
+                    <a:p>
+                      <a:pPr marL="0" marR="0" indent="0" algn="l" defTabSz="914400" rtl="0" eaLnBrk="1" fontAlgn="auto" latinLnBrk="0" hangingPunct="1">
+                        <a:lnSpc>
+                          <a:spcPct val="100000"/>
+                        </a:lnSpc>
+                        <a:spcBef>
+                          <a:spcPts val="0"/>
+                        </a:spcBef>
+                        <a:spcAft>
+                          <a:spcPts val="0"/>
+                        </a:spcAft>
+                        <a:buClrTx/>
+                        <a:buSzTx/>
+                        <a:buFontTx/>
+                        <a:buNone/>
+                        <a:tabLst/>
+                        <a:defRPr/>
+                      </a:pPr>
+                      <a:r>
+                        <a:rPr lang="en-US" dirty="0" smtClean="0"/>
+                        <a:t>%</a:t>
+                      </a:r>
+                      <a:r>
+                        <a:rPr lang="en-US" baseline="0" dirty="0" smtClean="0"/>
+                        <a:t> sites within criterion</a:t>
+                      </a:r>
+                      <a:endParaRPr lang="en-US" dirty="0" smtClean="0"/>
+                    </a:p>
+                  </a:txBody>
+                  <a:tcPr/>
+                </a:tc>
+                <a:tc>
+                  <a:txBody>
+                    <a:bodyPr/>
+                    <a:lstStyle/>
+                    <a:p>
+                      <a:r>
+                        <a:rPr lang="en-US" dirty="0" smtClean="0"/>
+                        <a:t>68%</a:t>
+                      </a:r>
+                      <a:endParaRPr lang="en-US" dirty="0"/>
+                    </a:p>
+                  </a:txBody>
+                  <a:tcPr/>
+                </a:tc>
+                <a:tc>
+                  <a:txBody>
+                    <a:bodyPr/>
+                    <a:lstStyle/>
+                    <a:p>
+                      <a:r>
+                        <a:rPr lang="en-US" dirty="0" smtClean="0"/>
+                        <a:t>68%</a:t>
+                      </a:r>
+                      <a:endParaRPr lang="en-US" dirty="0"/>
+                    </a:p>
+                  </a:txBody>
+                  <a:tcPr/>
+                </a:tc>
+                <a:tc>
+                  <a:txBody>
+                    <a:bodyPr/>
+                    <a:lstStyle/>
+                    <a:p>
+                      <a:r>
+                        <a:rPr lang="en-US" dirty="0" smtClean="0"/>
+                        <a:t>79%</a:t>
+                      </a:r>
+                      <a:endParaRPr lang="en-US" dirty="0"/>
+                    </a:p>
+                  </a:txBody>
+                  <a:tcPr/>
+                </a:tc>
+                <a:tc>
+                  <a:txBody>
+                    <a:bodyPr/>
+                    <a:lstStyle/>
+                    <a:p>
+                      <a:r>
+                        <a:rPr lang="en-US" dirty="0" smtClean="0"/>
+                        <a:t>84%</a:t>
+                      </a:r>
+                      <a:endParaRPr lang="en-US" dirty="0"/>
+                    </a:p>
+                  </a:txBody>
+                  <a:tcPr/>
+                </a:tc>
+                <a:tc>
+                  <a:txBody>
+                    <a:bodyPr/>
+                    <a:lstStyle/>
+                    <a:p>
+                      <a:r>
+                        <a:rPr lang="en-US" dirty="0" smtClean="0"/>
+                        <a:t>90%</a:t>
+                      </a:r>
+                      <a:endParaRPr lang="en-US" dirty="0"/>
+                    </a:p>
+                  </a:txBody>
+                  <a:tcPr/>
+                </a:tc>
+                <a:tc>
+                  <a:txBody>
+                    <a:bodyPr/>
+                    <a:lstStyle/>
+                    <a:p>
+                      <a:r>
+                        <a:rPr lang="en-US" dirty="0" smtClean="0"/>
+                        <a:t>94%</a:t>
+                      </a:r>
+                      <a:endParaRPr lang="en-US" dirty="0"/>
+                    </a:p>
+                  </a:txBody>
+                  <a:tcPr/>
+                </a:tc>
+                <a:tc>
+                  <a:txBody>
+                    <a:bodyPr/>
+                    <a:lstStyle/>
+                    <a:p>
+                      <a:r>
+                        <a:rPr lang="en-US" dirty="0" smtClean="0"/>
+                        <a:t>100%</a:t>
+                      </a:r>
+                      <a:endParaRPr lang="en-US" dirty="0"/>
+                    </a:p>
+                  </a:txBody>
+                  <a:tcPr/>
+                </a:tc>
+                <a:tc>
+                  <a:txBody>
+                    <a:bodyPr/>
+                    <a:lstStyle/>
+                    <a:p>
+                      <a:r>
+                        <a:rPr lang="en-US" dirty="0" smtClean="0"/>
+                        <a:t>100%</a:t>
+                      </a:r>
+                      <a:endParaRPr lang="en-US" dirty="0"/>
+                    </a:p>
+                  </a:txBody>
+                  <a:tcPr/>
+                </a:tc>
+              </a:tr>
+            </a:tbl>
+          </a:graphicData>
+        </a:graphic>
+      </p:graphicFrame>
+      <p:sp>
+        <p:nvSpPr>
+          <p:cNvPr id="9" name="Title 1"/>
+          <p:cNvSpPr txBox="1">
+            <a:spLocks/>
+          </p:cNvSpPr>
+          <p:nvPr/>
+        </p:nvSpPr>
+        <p:spPr>
+          <a:xfrm>
+            <a:off x="838200" y="3533686"/>
+            <a:ext cx="10515600" cy="555236"/>
+          </a:xfrm>
+          <a:prstGeom prst="rect">
+            <a:avLst/>
+          </a:prstGeom>
+        </p:spPr>
+        <p:txBody>
+          <a:bodyPr vert="horz" lIns="91440" tIns="45720" rIns="91440" bIns="45720" rtlCol="0" anchor="ctr">
+            <a:normAutofit/>
+          </a:bodyPr>
+          <a:lstStyle>
+            <a:lvl1pPr algn="l" defTabSz="914400" rtl="0" eaLnBrk="1" latinLnBrk="0" hangingPunct="1">
+              <a:lnSpc>
+                <a:spcPct val="90000"/>
+              </a:lnSpc>
+              <a:spcBef>
+                <a:spcPct val="0"/>
+              </a:spcBef>
+              <a:buNone/>
+              <a:defRPr sz="4400" kern="1200">
+                <a:solidFill>
+                  <a:schemeClr val="tx1"/>
+                </a:solidFill>
+                <a:latin typeface="+mj-lt"/>
+                <a:ea typeface="+mj-ea"/>
+                <a:cs typeface="+mj-cs"/>
+              </a:defRPr>
+            </a:lvl1pPr>
+          </a:lstStyle>
+          <a:p>
+            <a:r>
+              <a:rPr lang="en-US" sz="2800" dirty="0" smtClean="0"/>
+              <a:t>Ratio of placement </a:t>
+            </a:r>
+            <a:r>
+              <a:rPr lang="en-US" sz="2800" dirty="0"/>
+              <a:t>by frequency </a:t>
+            </a:r>
+            <a:r>
+              <a:rPr lang="en-US" sz="2800" dirty="0" smtClean="0"/>
+              <a:t>of: days within </a:t>
+            </a:r>
+            <a:r>
+              <a:rPr lang="en-US" sz="2800" dirty="0"/>
+              <a:t>20% of actual value </a:t>
+            </a:r>
+          </a:p>
+        </p:txBody>
+      </p:sp>
+    </p:spTree>
+    <p:extLst>
+      <p:ext uri="{BB962C8B-B14F-4D97-AF65-F5344CB8AC3E}">
+        <p14:creationId xmlns:p14="http://schemas.microsoft.com/office/powerpoint/2010/main" val="1112292978"/>
+      </p:ext>
+    </p:extLst>
+  </p:cSld>
+  <p:clrMapOvr>
+    <a:masterClrMapping/>
+  </p:clrMapOvr>
+  <p:timing>
+    <p:tnLst>
+      <p:par>
+        <p:cTn id="1" dur="indefinite" restart="never" nodeType="tmRoot"/>
+      </p:par>
+    </p:tnLst>
+  </p:timing>
+</p:sld>
+</file>
+
+<file path=ppt/slides/slide8.xml><?xml version="1.0" encoding="utf-8"?>
+<p:sld xmlns:a="http://schemas.openxmlformats.org/drawingml/2006/main" xmlns:r="http://schemas.openxmlformats.org/officeDocument/2006/relationships" xmlns:p="http://schemas.openxmlformats.org/presentationml/2006/main">
+  <p:cSld>
+    <p:spTree>
+      <p:nvGrpSpPr>
+        <p:cNvPr id="1" name=""/>
+        <p:cNvGrpSpPr/>
+        <p:nvPr/>
+      </p:nvGrpSpPr>
+      <p:grpSpPr>
+        <a:xfrm>
+          <a:off x="0" y="0"/>
+          <a:ext cx="0" cy="0"/>
+          <a:chOff x="0" y="0"/>
+          <a:chExt cx="0" cy="0"/>
+        </a:xfrm>
+      </p:grpSpPr>
+      <p:sp>
+        <p:nvSpPr>
+          <p:cNvPr id="2" name="Title 1"/>
+          <p:cNvSpPr>
+            <a:spLocks noGrp="1"/>
+          </p:cNvSpPr>
+          <p:nvPr>
+            <p:ph type="title"/>
+          </p:nvPr>
+        </p:nvSpPr>
+        <p:spPr>
+          <a:xfrm>
             <a:off x="838200" y="0"/>
             <a:ext cx="10515600" cy="1325563"/>
           </a:xfrm>
@@ -6395,7 +7533,7 @@
 </p:sld>
 </file>
 
-<file path=ppt/slides/slide8.xml><?xml version="1.0" encoding="utf-8"?>
+<file path=ppt/slides/slide9.xml><?xml version="1.0" encoding="utf-8"?>
 <p:sld xmlns:a="http://schemas.openxmlformats.org/drawingml/2006/main" xmlns:r="http://schemas.openxmlformats.org/officeDocument/2006/relationships" xmlns:p="http://schemas.openxmlformats.org/presentationml/2006/main" show="0">
   <p:cSld>
     <p:spTree>
@@ -6894,124 +8032,6 @@
     <p:extLst>
       <p:ext uri="{BB962C8B-B14F-4D97-AF65-F5344CB8AC3E}">
         <p14:creationId xmlns:p14="http://schemas.microsoft.com/office/powerpoint/2010/main" val="3568551172"/>
-      </p:ext>
-    </p:extLst>
-  </p:cSld>
-  <p:clrMapOvr>
-    <a:masterClrMapping/>
-  </p:clrMapOvr>
-  <mc:AlternateContent xmlns:mc="http://schemas.openxmlformats.org/markup-compatibility/2006" xmlns:p14="http://schemas.microsoft.com/office/powerpoint/2010/main">
-    <mc:Choice Requires="p14">
-      <p:transition spd="slow" p14:dur="2000"/>
-    </mc:Choice>
-    <mc:Fallback xmlns="">
-      <p:transition spd="slow"/>
-    </mc:Fallback>
-  </mc:AlternateContent>
-  <p:timing>
-    <p:tnLst>
-      <p:par>
-        <p:cTn id="1" dur="indefinite" restart="never" nodeType="tmRoot"/>
-      </p:par>
-    </p:tnLst>
-  </p:timing>
-</p:sld>
-</file>
-
-<file path=ppt/slides/slide9.xml><?xml version="1.0" encoding="utf-8"?>
-<p:sld xmlns:a="http://schemas.openxmlformats.org/drawingml/2006/main" xmlns:r="http://schemas.openxmlformats.org/officeDocument/2006/relationships" xmlns:p="http://schemas.openxmlformats.org/presentationml/2006/main" show="0">
-  <p:cSld>
-    <p:spTree>
-      <p:nvGrpSpPr>
-        <p:cNvPr id="1" name=""/>
-        <p:cNvGrpSpPr/>
-        <p:nvPr/>
-      </p:nvGrpSpPr>
-      <p:grpSpPr>
-        <a:xfrm>
-          <a:off x="0" y="0"/>
-          <a:ext cx="0" cy="0"/>
-          <a:chOff x="0" y="0"/>
-          <a:chExt cx="0" cy="0"/>
-        </a:xfrm>
-      </p:grpSpPr>
-      <p:sp>
-        <p:nvSpPr>
-          <p:cNvPr id="2" name="Title 1"/>
-          <p:cNvSpPr>
-            <a:spLocks noGrp="1"/>
-          </p:cNvSpPr>
-          <p:nvPr>
-            <p:ph type="title"/>
-          </p:nvPr>
-        </p:nvSpPr>
-        <p:spPr/>
-        <p:txBody>
-          <a:bodyPr/>
-          <a:lstStyle/>
-          <a:p>
-            <a:r>
-              <a:rPr lang="en-US" dirty="0" smtClean="0"/>
-              <a:t>Important notes</a:t>
-            </a:r>
-            <a:endParaRPr lang="en-US" dirty="0"/>
-          </a:p>
-        </p:txBody>
-      </p:sp>
-      <p:sp>
-        <p:nvSpPr>
-          <p:cNvPr id="3" name="Content Placeholder 2"/>
-          <p:cNvSpPr>
-            <a:spLocks noGrp="1"/>
-          </p:cNvSpPr>
-          <p:nvPr>
-            <p:ph idx="1"/>
-          </p:nvPr>
-        </p:nvSpPr>
-        <p:spPr/>
-        <p:txBody>
-          <a:bodyPr>
-            <a:normAutofit fontScale="92500"/>
-          </a:bodyPr>
-          <a:lstStyle/>
-          <a:p>
-            <a:r>
-              <a:rPr lang="en-US" dirty="0" smtClean="0"/>
-              <a:t>For the dates 3/3 – 5/3, far fewer served events appeared in RS than actual number. This affected almost all placements and networks.  “Representation rate” dropped on these days from around 90% to about 40%. These dates were ignored in the analysis presented in earlier slides.</a:t>
-            </a:r>
-          </a:p>
-          <a:p>
-            <a:r>
-              <a:rPr lang="en-US" dirty="0" smtClean="0"/>
-              <a:t>AOL deviations have a similar pattern (deviation per day) across many placements from several users. This non-random effect should be investigated. See next slide.</a:t>
-            </a:r>
-          </a:p>
-          <a:p>
-            <a:r>
-              <a:rPr lang="en-US" dirty="0" err="1" smtClean="0"/>
-              <a:t>Smaato</a:t>
-            </a:r>
-            <a:r>
-              <a:rPr lang="en-US" dirty="0" smtClean="0"/>
-              <a:t> deviation is -98%, i.e. less than 2% of served events are detected.</a:t>
-            </a:r>
-          </a:p>
-          <a:p>
-            <a:r>
-              <a:rPr lang="en-US" dirty="0" err="1" smtClean="0"/>
-              <a:t>MySql</a:t>
-            </a:r>
-            <a:r>
-              <a:rPr lang="en-US" dirty="0" smtClean="0"/>
-              <a:t> data was substantially incomplete for both 13/3 and 14/3 (data was retrieved early afternoon on 15/3).</a:t>
-            </a:r>
-          </a:p>
-        </p:txBody>
-      </p:sp>
-    </p:spTree>
-    <p:extLst>
-      <p:ext uri="{BB962C8B-B14F-4D97-AF65-F5344CB8AC3E}">
-        <p14:creationId xmlns:p14="http://schemas.microsoft.com/office/powerpoint/2010/main" val="1036927113"/>
       </p:ext>
     </p:extLst>
   </p:cSld>

</xml_diff>